<commit_message>
Added mac_tx_tfirst output to assist coupling to MAC layers that require a start of frame indication.
</commit_message>
<xml_diff>
--- a/doc/src/UDP_IP_Stack.pptx
+++ b/doc/src/UDP_IP_Stack.pptx
@@ -13,19 +13,20 @@
     <p:sldId id="259" r:id="rId7"/>
     <p:sldId id="260" r:id="rId8"/>
     <p:sldId id="275" r:id="rId9"/>
-    <p:sldId id="265" r:id="rId10"/>
-    <p:sldId id="264" r:id="rId11"/>
-    <p:sldId id="263" r:id="rId12"/>
-    <p:sldId id="266" r:id="rId13"/>
-    <p:sldId id="267" r:id="rId14"/>
-    <p:sldId id="268" r:id="rId15"/>
-    <p:sldId id="269" r:id="rId16"/>
-    <p:sldId id="270" r:id="rId17"/>
-    <p:sldId id="271" r:id="rId18"/>
-    <p:sldId id="272" r:id="rId19"/>
-    <p:sldId id="261" r:id="rId20"/>
-    <p:sldId id="276" r:id="rId21"/>
-    <p:sldId id="273" r:id="rId22"/>
+    <p:sldId id="277" r:id="rId10"/>
+    <p:sldId id="265" r:id="rId11"/>
+    <p:sldId id="264" r:id="rId12"/>
+    <p:sldId id="263" r:id="rId13"/>
+    <p:sldId id="266" r:id="rId14"/>
+    <p:sldId id="267" r:id="rId15"/>
+    <p:sldId id="268" r:id="rId16"/>
+    <p:sldId id="269" r:id="rId17"/>
+    <p:sldId id="270" r:id="rId18"/>
+    <p:sldId id="271" r:id="rId19"/>
+    <p:sldId id="272" r:id="rId20"/>
+    <p:sldId id="261" r:id="rId21"/>
+    <p:sldId id="276" r:id="rId22"/>
+    <p:sldId id="273" r:id="rId23"/>
   </p:sldIdLst>
   <p:sldSz cx="9144000" cy="6858000" type="screen4x3"/>
   <p:notesSz cx="6858000" cy="9144000"/>
@@ -596,7 +597,7 @@
             <a:fld id="{1D8BD707-D9CF-40AE-B4C6-C98DA3205C09}" type="datetimeFigureOut">
               <a:rPr lang="en-US" smtClean="0"/>
               <a:pPr/>
-              <a:t>10/14/2011</a:t>
+              <a:t>3/3/2012</a:t>
             </a:fld>
             <a:endParaRPr lang="en-US"/>
           </a:p>
@@ -763,7 +764,7 @@
             <a:fld id="{1D8BD707-D9CF-40AE-B4C6-C98DA3205C09}" type="datetimeFigureOut">
               <a:rPr lang="en-US" smtClean="0"/>
               <a:pPr/>
-              <a:t>10/14/2011</a:t>
+              <a:t>3/3/2012</a:t>
             </a:fld>
             <a:endParaRPr lang="en-US"/>
           </a:p>
@@ -940,7 +941,7 @@
             <a:fld id="{1D8BD707-D9CF-40AE-B4C6-C98DA3205C09}" type="datetimeFigureOut">
               <a:rPr lang="en-US" smtClean="0"/>
               <a:pPr/>
-              <a:t>10/14/2011</a:t>
+              <a:t>3/3/2012</a:t>
             </a:fld>
             <a:endParaRPr lang="en-US"/>
           </a:p>
@@ -1107,7 +1108,7 @@
             <a:fld id="{1D8BD707-D9CF-40AE-B4C6-C98DA3205C09}" type="datetimeFigureOut">
               <a:rPr lang="en-US" smtClean="0"/>
               <a:pPr/>
-              <a:t>10/14/2011</a:t>
+              <a:t>3/3/2012</a:t>
             </a:fld>
             <a:endParaRPr lang="en-US"/>
           </a:p>
@@ -1662,7 +1663,7 @@
             <a:fld id="{1D8BD707-D9CF-40AE-B4C6-C98DA3205C09}" type="datetimeFigureOut">
               <a:rPr lang="en-US" smtClean="0"/>
               <a:pPr/>
-              <a:t>10/14/2011</a:t>
+              <a:t>3/3/2012</a:t>
             </a:fld>
             <a:endParaRPr lang="en-US"/>
           </a:p>
@@ -1924,7 +1925,7 @@
             <a:fld id="{1D8BD707-D9CF-40AE-B4C6-C98DA3205C09}" type="datetimeFigureOut">
               <a:rPr lang="en-US" smtClean="0"/>
               <a:pPr/>
-              <a:t>10/14/2011</a:t>
+              <a:t>3/3/2012</a:t>
             </a:fld>
             <a:endParaRPr lang="en-US"/>
           </a:p>
@@ -2414,7 +2415,7 @@
             <a:fld id="{1D8BD707-D9CF-40AE-B4C6-C98DA3205C09}" type="datetimeFigureOut">
               <a:rPr lang="en-US" smtClean="0"/>
               <a:pPr/>
-              <a:t>10/14/2011</a:t>
+              <a:t>3/3/2012</a:t>
             </a:fld>
             <a:endParaRPr lang="en-US"/>
           </a:p>
@@ -2529,7 +2530,7 @@
             <a:fld id="{1D8BD707-D9CF-40AE-B4C6-C98DA3205C09}" type="datetimeFigureOut">
               <a:rPr lang="en-US" smtClean="0"/>
               <a:pPr/>
-              <a:t>10/14/2011</a:t>
+              <a:t>3/3/2012</a:t>
             </a:fld>
             <a:endParaRPr lang="en-US"/>
           </a:p>
@@ -2621,7 +2622,7 @@
             <a:fld id="{1D8BD707-D9CF-40AE-B4C6-C98DA3205C09}" type="datetimeFigureOut">
               <a:rPr lang="en-US" smtClean="0"/>
               <a:pPr/>
-              <a:t>10/14/2011</a:t>
+              <a:t>3/3/2012</a:t>
             </a:fld>
             <a:endParaRPr lang="en-US"/>
           </a:p>
@@ -3053,7 +3054,7 @@
             <a:fld id="{1D8BD707-D9CF-40AE-B4C6-C98DA3205C09}" type="datetimeFigureOut">
               <a:rPr lang="en-US" smtClean="0"/>
               <a:pPr/>
-              <a:t>10/14/2011</a:t>
+              <a:t>3/3/2012</a:t>
             </a:fld>
             <a:endParaRPr lang="en-US"/>
           </a:p>
@@ -3588,7 +3589,7 @@
             <a:fld id="{1D8BD707-D9CF-40AE-B4C6-C98DA3205C09}" type="datetimeFigureOut">
               <a:rPr lang="en-US" smtClean="0"/>
               <a:pPr/>
-              <a:t>10/14/2011</a:t>
+              <a:t>3/3/2012</a:t>
             </a:fld>
             <a:endParaRPr lang="en-US"/>
           </a:p>
@@ -4430,7 +4431,7 @@
             <a:fld id="{1D8BD707-D9CF-40AE-B4C6-C98DA3205C09}" type="datetimeFigureOut">
               <a:rPr lang="en-US" smtClean="0"/>
               <a:pPr/>
-              <a:t>10/14/2011</a:t>
+              <a:t>3/3/2012</a:t>
             </a:fld>
             <a:endParaRPr lang="en-US"/>
           </a:p>
@@ -4890,6 +4891,12 @@
               <a:rPr lang="de-CH" dirty="0" smtClean="0"/>
               <a:t>(contributor – Peter Fall)</a:t>
             </a:r>
+          </a:p>
+          <a:p>
+            <a:r>
+              <a:rPr lang="de-CH" dirty="0" smtClean="0"/>
+              <a:t>V1.1</a:t>
+            </a:r>
             <a:endParaRPr lang="de-CH" dirty="0"/>
           </a:p>
         </p:txBody>
@@ -4977,20 +4984,14 @@
         </p:nvSpPr>
         <p:spPr/>
         <p:txBody>
-          <a:bodyPr>
-            <a:normAutofit/>
-          </a:bodyPr>
-          <a:lstStyle/>
-          <a:p>
-            <a:r>
-              <a:rPr lang="de-CH" sz="2400" dirty="0" smtClean="0"/>
-              <a:t>Module Description:  </a:t>
-            </a:r>
-            <a:r>
-              <a:rPr lang="de-CH" sz="2400" b="1" dirty="0" smtClean="0"/>
-              <a:t>UDP_complete_nomac</a:t>
-            </a:r>
-            <a:endParaRPr lang="de-CH" sz="2400" b="1" dirty="0"/>
+          <a:bodyPr/>
+          <a:lstStyle/>
+          <a:p>
+            <a:r>
+              <a:rPr lang="de-CH" dirty="0" smtClean="0"/>
+              <a:t>Synthesis Stats</a:t>
+            </a:r>
+            <a:endParaRPr lang="de-CH" dirty="0"/>
           </a:p>
         </p:txBody>
       </p:sp>
@@ -5006,54 +5007,40 @@
         </p:nvSpPr>
         <p:spPr/>
         <p:txBody>
-          <a:bodyPr>
-            <a:normAutofit/>
-          </a:bodyPr>
-          <a:lstStyle/>
-          <a:p>
-            <a:r>
-              <a:rPr lang="de-CH" sz="2000" dirty="0" smtClean="0"/>
-              <a:t>Simply wires up the following blocks:</a:t>
+          <a:bodyPr/>
+          <a:lstStyle/>
+          <a:p>
+            <a:r>
+              <a:rPr lang="de-CH" dirty="0" smtClean="0"/>
+              <a:t>504 occupied slices on Xilinx xc6vlx240t  (1%)</a:t>
+            </a:r>
+          </a:p>
+          <a:p>
+            <a:r>
+              <a:rPr lang="de-CH" dirty="0" smtClean="0"/>
+              <a:t>(621 flipflops, 1243 LUTs)</a:t>
+            </a:r>
+          </a:p>
+          <a:p>
+            <a:r>
+              <a:rPr lang="de-CH" dirty="0" smtClean="0"/>
+              <a:t>Test synthesis using </a:t>
             </a:r>
           </a:p>
           <a:p>
             <a:pPr lvl="1"/>
             <a:r>
-              <a:rPr lang="de-CH" sz="2000" dirty="0" smtClean="0"/>
-              <a:t>UDP_TX</a:t>
-            </a:r>
-          </a:p>
-          <a:p>
-            <a:pPr lvl="1"/>
-            <a:r>
-              <a:rPr lang="de-CH" sz="2000" dirty="0" smtClean="0"/>
-              <a:t>UDP_RX</a:t>
-            </a:r>
-          </a:p>
-          <a:p>
-            <a:pPr lvl="1"/>
-            <a:r>
-              <a:rPr lang="de-CH" sz="2000" dirty="0" smtClean="0"/>
-              <a:t>IP_Complete_nomac</a:t>
-            </a:r>
-            <a:br>
-              <a:rPr lang="de-CH" sz="2000" dirty="0" smtClean="0"/>
-            </a:br>
-            <a:endParaRPr lang="de-CH" sz="2000" dirty="0" smtClean="0"/>
-          </a:p>
-          <a:p>
-            <a:r>
-              <a:rPr lang="de-CH" sz="2000" dirty="0" smtClean="0"/>
-              <a:t>Propagates the IP RX header info to the UDP_complete_nomac module interface.</a:t>
-            </a:r>
-            <a:endParaRPr lang="de-CH" sz="2000" dirty="0"/>
+              <a:rPr lang="de-CH" dirty="0" smtClean="0"/>
+              <a:t>Xilinx ISE 13.2</a:t>
+            </a:r>
+            <a:endParaRPr lang="de-CH" dirty="0"/>
           </a:p>
         </p:txBody>
       </p:sp>
     </p:spTree>
     <p:extLst>
       <p:ext uri="{BB962C8B-B14F-4D97-AF65-F5344CB8AC3E}">
-        <p14:creationId xmlns:p14="http://schemas.microsoft.com/office/powerpoint/2010/main" val="744300183"/>
+        <p14:creationId xmlns:p14="http://schemas.microsoft.com/office/powerpoint/2010/main" val="2687296803"/>
       </p:ext>
     </p:extLst>
   </p:cSld>
@@ -5098,22 +5085,14 @@
           <a:lstStyle/>
           <a:p>
             <a:r>
-              <a:rPr lang="de-CH" sz="2400" dirty="0"/>
-              <a:t>Module </a:t>
-            </a:r>
-            <a:r>
               <a:rPr lang="de-CH" sz="2400" dirty="0" smtClean="0"/>
-              <a:t>Description</a:t>
-            </a:r>
-            <a:r>
-              <a:rPr lang="de-CH" sz="2400" dirty="0"/>
-              <a:t>:  </a:t>
+              <a:t>Module Description:  </a:t>
             </a:r>
             <a:r>
               <a:rPr lang="de-CH" sz="2400" b="1" dirty="0" smtClean="0"/>
-              <a:t>UDP_TX and UDP_RX</a:t>
-            </a:r>
-            <a:endParaRPr lang="de-CH" sz="2400" dirty="0"/>
+              <a:t>UDP_complete_nomac</a:t>
+            </a:r>
+            <a:endParaRPr lang="de-CH" sz="2400" b="1" dirty="0"/>
           </a:p>
         </p:txBody>
       </p:sp>
@@ -5130,34 +5109,34 @@
         <p:spPr/>
         <p:txBody>
           <a:bodyPr>
-            <a:normAutofit fontScale="92500" lnSpcReduction="10000"/>
+            <a:normAutofit/>
           </a:bodyPr>
           <a:lstStyle/>
           <a:p>
             <a:r>
               <a:rPr lang="de-CH" sz="2000" dirty="0" smtClean="0"/>
-              <a:t>UDP_TX:</a:t>
+              <a:t>Simply wires up the following blocks:</a:t>
             </a:r>
           </a:p>
           <a:p>
             <a:pPr lvl="1"/>
             <a:r>
               <a:rPr lang="de-CH" sz="2000" dirty="0" smtClean="0"/>
-              <a:t>Very simple FSM to capture data from the supplied UDP TX header, and send out a UDP header.</a:t>
+              <a:t>UDP_TX</a:t>
             </a:r>
           </a:p>
           <a:p>
             <a:pPr lvl="1"/>
             <a:r>
               <a:rPr lang="de-CH" sz="2000" dirty="0" smtClean="0"/>
-              <a:t>Asserts data ready when in user data phase, and copies bytes from the user supplied data.</a:t>
+              <a:t>UDP_RX</a:t>
             </a:r>
           </a:p>
           <a:p>
             <a:pPr lvl="1"/>
             <a:r>
               <a:rPr lang="de-CH" sz="2000" dirty="0" smtClean="0"/>
-              <a:t>Assumes user will supply the CRC (specs allow CRC to be zero).</a:t>
+              <a:t>IP_Complete_nomac</a:t>
             </a:r>
             <a:br>
               <a:rPr lang="de-CH" sz="2000" dirty="0" smtClean="0"/>
@@ -5167,33 +5146,16 @@
           <a:p>
             <a:r>
               <a:rPr lang="de-CH" sz="2000" dirty="0" smtClean="0"/>
-              <a:t>UDP_RX</a:t>
-            </a:r>
-          </a:p>
-          <a:p>
-            <a:pPr lvl="1"/>
-            <a:r>
-              <a:rPr lang="de-CH" sz="2000" dirty="0" smtClean="0"/>
-              <a:t>Very simple FSM to parse the UDP header from data supplied from the IP layer, and then to send user data from the IP layer to the interface (asserts udp_rxo.data.data_in_valid).</a:t>
-            </a:r>
-          </a:p>
-          <a:p>
-            <a:pPr lvl="1"/>
-            <a:r>
-              <a:rPr lang="de-CH" sz="2000" dirty="0" smtClean="0"/>
-              <a:t>Discards IP pkts until it gets one with protocol=x11 (UDP pkt).</a:t>
-            </a:r>
-          </a:p>
-          <a:p>
-            <a:pPr lvl="1"/>
-            <a:endParaRPr lang="de-CH" dirty="0"/>
+              <a:t>Propagates the IP RX header info to the UDP_complete_nomac module interface.</a:t>
+            </a:r>
+            <a:endParaRPr lang="de-CH" sz="2000" dirty="0"/>
           </a:p>
         </p:txBody>
       </p:sp>
     </p:spTree>
     <p:extLst>
       <p:ext uri="{BB962C8B-B14F-4D97-AF65-F5344CB8AC3E}">
-        <p14:creationId xmlns:p14="http://schemas.microsoft.com/office/powerpoint/2010/main" val="1396106985"/>
+        <p14:creationId xmlns:p14="http://schemas.microsoft.com/office/powerpoint/2010/main" val="744300183"/>
       </p:ext>
     </p:extLst>
   </p:cSld>
@@ -5233,27 +5195,27 @@
         <p:spPr/>
         <p:txBody>
           <a:bodyPr>
-            <a:normAutofit fontScale="90000"/>
+            <a:normAutofit/>
           </a:bodyPr>
           <a:lstStyle/>
           <a:p>
             <a:r>
-              <a:rPr lang="de-CH" sz="3200" dirty="0"/>
+              <a:rPr lang="de-CH" sz="2400" dirty="0"/>
               <a:t>Module </a:t>
             </a:r>
             <a:r>
-              <a:rPr lang="de-CH" sz="3200" dirty="0" smtClean="0"/>
+              <a:rPr lang="de-CH" sz="2400" dirty="0" smtClean="0"/>
               <a:t>Description</a:t>
             </a:r>
             <a:r>
-              <a:rPr lang="de-CH" sz="3200" dirty="0"/>
+              <a:rPr lang="de-CH" sz="2400" dirty="0"/>
               <a:t>:  </a:t>
             </a:r>
             <a:r>
-              <a:rPr lang="de-CH" sz="3200" b="1" dirty="0" smtClean="0"/>
-              <a:t>IPv4</a:t>
-            </a:r>
-            <a:endParaRPr lang="de-CH" sz="3200" dirty="0"/>
+              <a:rPr lang="de-CH" sz="2400" b="1" dirty="0" smtClean="0"/>
+              <a:t>UDP_TX and UDP_RX</a:t>
+            </a:r>
+            <a:endParaRPr lang="de-CH" sz="2400" dirty="0"/>
           </a:p>
         </p:txBody>
       </p:sp>
@@ -5270,34 +5232,34 @@
         <p:spPr/>
         <p:txBody>
           <a:bodyPr>
-            <a:normAutofit fontScale="92500" lnSpcReduction="20000"/>
+            <a:normAutofit fontScale="92500" lnSpcReduction="10000"/>
           </a:bodyPr>
           <a:lstStyle/>
           <a:p>
             <a:r>
               <a:rPr lang="de-CH" sz="2000" dirty="0" smtClean="0"/>
-              <a:t>Simply wires up the following blocks:</a:t>
+              <a:t>UDP_TX:</a:t>
             </a:r>
           </a:p>
           <a:p>
             <a:pPr lvl="1"/>
             <a:r>
               <a:rPr lang="de-CH" sz="2000" dirty="0" smtClean="0"/>
-              <a:t>IPv4</a:t>
+              <a:t>Very simple FSM to capture data from the supplied UDP TX header, and send out a UDP header.</a:t>
             </a:r>
           </a:p>
           <a:p>
             <a:pPr lvl="1"/>
             <a:r>
               <a:rPr lang="de-CH" sz="2000" dirty="0" smtClean="0"/>
-              <a:t>ARP</a:t>
+              <a:t>Asserts data ready when in user data phase, and copies bytes from the user supplied data.</a:t>
             </a:r>
           </a:p>
           <a:p>
             <a:pPr lvl="1"/>
             <a:r>
               <a:rPr lang="de-CH" sz="2000" dirty="0" smtClean="0"/>
-              <a:t>Tx_arbitrator</a:t>
+              <a:t>Assumes user will supply the CRC (specs allow CRC to be zero).</a:t>
             </a:r>
             <a:br>
               <a:rPr lang="de-CH" sz="2000" dirty="0" smtClean="0"/>
@@ -5307,36 +5269,33 @@
           <a:p>
             <a:r>
               <a:rPr lang="de-CH" sz="2000" dirty="0" smtClean="0"/>
-              <a:t>Arp reads the MAX RX data in parallel with the IPv4 RX path. ARP is looking for ARP pkts, while IPv4 is looking for IP pkts.</a:t>
-            </a:r>
-            <a:br>
+              <a:t>UDP_RX</a:t>
+            </a:r>
+          </a:p>
+          <a:p>
+            <a:pPr lvl="1"/>
+            <a:r>
               <a:rPr lang="de-CH" sz="2000" dirty="0" smtClean="0"/>
-            </a:br>
-            <a:endParaRPr lang="de-CH" sz="2000" dirty="0" smtClean="0"/>
-          </a:p>
-          <a:p>
+              <a:t>Very simple FSM to parse the UDP header from data supplied from the IP layer, and then to send user data from the IP layer to the interface (asserts udp_rxo.data.data_in_valid).</a:t>
+            </a:r>
+          </a:p>
+          <a:p>
+            <a:pPr lvl="1"/>
             <a:r>
               <a:rPr lang="de-CH" sz="2000" dirty="0" smtClean="0"/>
-              <a:t>IPv4 interacts directly with ARP block during TX to ensure that the transmit destination MAC address is known.</a:t>
-            </a:r>
-            <a:br>
-              <a:rPr lang="de-CH" sz="2000" dirty="0" smtClean="0"/>
-            </a:br>
-            <a:endParaRPr lang="de-CH" sz="2000" dirty="0" smtClean="0"/>
-          </a:p>
-          <a:p>
-            <a:r>
-              <a:rPr lang="de-CH" sz="2000" dirty="0" smtClean="0"/>
-              <a:t>TX_arbitrator, controls access to the MAC TX layer, as both ARP and IPv4 may want to transmit at the same time.</a:t>
-            </a:r>
-            <a:endParaRPr lang="de-CH" sz="2000" dirty="0"/>
+              <a:t>Discards IP pkts until it gets one with protocol=x11 (UDP pkt).</a:t>
+            </a:r>
+          </a:p>
+          <a:p>
+            <a:pPr lvl="1"/>
+            <a:endParaRPr lang="de-CH" dirty="0"/>
           </a:p>
         </p:txBody>
       </p:sp>
     </p:spTree>
     <p:extLst>
       <p:ext uri="{BB962C8B-B14F-4D97-AF65-F5344CB8AC3E}">
-        <p14:creationId xmlns:p14="http://schemas.microsoft.com/office/powerpoint/2010/main" val="15725818"/>
+        <p14:creationId xmlns:p14="http://schemas.microsoft.com/office/powerpoint/2010/main" val="1396106985"/>
       </p:ext>
     </p:extLst>
   </p:cSld>
@@ -5394,7 +5353,7 @@
             </a:r>
             <a:r>
               <a:rPr lang="de-CH" sz="3200" b="1" dirty="0" smtClean="0"/>
-              <a:t>IPv4_TX</a:t>
+              <a:t>IPv4</a:t>
             </a:r>
             <a:endParaRPr lang="de-CH" sz="3200" dirty="0"/>
           </a:p>
@@ -5413,76 +5372,73 @@
         <p:spPr/>
         <p:txBody>
           <a:bodyPr>
-            <a:normAutofit/>
+            <a:normAutofit fontScale="92500" lnSpcReduction="20000"/>
           </a:bodyPr>
           <a:lstStyle/>
           <a:p>
             <a:r>
-              <a:rPr lang="de-CH" dirty="0" smtClean="0"/>
-              <a:t>IPv4_TX comprises two simple FSMs:</a:t>
+              <a:rPr lang="de-CH" sz="2000" dirty="0" smtClean="0"/>
+              <a:t>Simply wires up the following blocks:</a:t>
             </a:r>
           </a:p>
           <a:p>
             <a:pPr lvl="1"/>
             <a:r>
-              <a:rPr lang="de-CH" dirty="0" smtClean="0"/>
-              <a:t>to control transmission of the header and user data</a:t>
+              <a:rPr lang="de-CH" sz="2000" dirty="0" smtClean="0"/>
+              <a:t>IPv4</a:t>
             </a:r>
           </a:p>
           <a:p>
             <a:pPr lvl="1"/>
             <a:r>
-              <a:rPr lang="de-CH" dirty="0" smtClean="0"/>
-              <a:t>to calculate the header checksum</a:t>
+              <a:rPr lang="de-CH" sz="2000" dirty="0" smtClean="0"/>
+              <a:t>ARP</a:t>
+            </a:r>
+          </a:p>
+          <a:p>
+            <a:pPr lvl="1"/>
+            <a:r>
+              <a:rPr lang="de-CH" sz="2000" dirty="0" smtClean="0"/>
+              <a:t>Tx_arbitrator</a:t>
             </a:r>
             <a:br>
-              <a:rPr lang="de-CH" dirty="0" smtClean="0"/>
+              <a:rPr lang="de-CH" sz="2000" dirty="0" smtClean="0"/>
             </a:br>
-            <a:endParaRPr lang="de-CH" dirty="0" smtClean="0"/>
-          </a:p>
-          <a:p>
-            <a:r>
-              <a:rPr lang="de-CH" dirty="0" smtClean="0"/>
-              <a:t>To use,  </a:t>
-            </a:r>
-          </a:p>
-          <a:p>
-            <a:pPr lvl="1"/>
-            <a:r>
-              <a:rPr lang="de-CH" dirty="0" smtClean="0"/>
-              <a:t>set the TX header, and </a:t>
-            </a:r>
-            <a:r>
-              <a:rPr lang="de-CH" dirty="0"/>
-              <a:t>assert ip_tx_start. </a:t>
-            </a:r>
-            <a:endParaRPr lang="de-CH" dirty="0" smtClean="0"/>
-          </a:p>
-          <a:p>
-            <a:pPr lvl="1"/>
-            <a:r>
-              <a:rPr lang="de-CH" dirty="0" smtClean="0"/>
-              <a:t>The block begins to calculate the header CRC and transmit the header</a:t>
-            </a:r>
-          </a:p>
-          <a:p>
-            <a:pPr lvl="1"/>
-            <a:r>
-              <a:rPr lang="de-CH" dirty="0"/>
-              <a:t>Once in the user data stage, the block asserts </a:t>
-            </a:r>
-            <a:r>
-              <a:rPr lang="de-CH" dirty="0" smtClean="0"/>
-              <a:t>ip_tx_data_out_ready and copies user data over to the MAC TX output</a:t>
-            </a:r>
-            <a:endParaRPr lang="de-CH" dirty="0"/>
+            <a:endParaRPr lang="de-CH" sz="2000" dirty="0" smtClean="0"/>
+          </a:p>
+          <a:p>
+            <a:r>
+              <a:rPr lang="de-CH" sz="2000" dirty="0" smtClean="0"/>
+              <a:t>Arp reads the MAX RX data in parallel with the IPv4 RX path. ARP is looking for ARP pkts, while IPv4 is looking for IP pkts.</a:t>
+            </a:r>
+            <a:br>
+              <a:rPr lang="de-CH" sz="2000" dirty="0" smtClean="0"/>
+            </a:br>
+            <a:endParaRPr lang="de-CH" sz="2000" dirty="0" smtClean="0"/>
+          </a:p>
+          <a:p>
+            <a:r>
+              <a:rPr lang="de-CH" sz="2000" dirty="0" smtClean="0"/>
+              <a:t>IPv4 interacts directly with ARP block during TX to ensure that the transmit destination MAC address is known.</a:t>
+            </a:r>
+            <a:br>
+              <a:rPr lang="de-CH" sz="2000" dirty="0" smtClean="0"/>
+            </a:br>
+            <a:endParaRPr lang="de-CH" sz="2000" dirty="0" smtClean="0"/>
+          </a:p>
+          <a:p>
+            <a:r>
+              <a:rPr lang="de-CH" sz="2000" dirty="0" smtClean="0"/>
+              <a:t>TX_arbitrator, controls access to the MAC TX layer, as both ARP and IPv4 may want to transmit at the same time.</a:t>
+            </a:r>
+            <a:endParaRPr lang="de-CH" sz="2000" dirty="0"/>
           </a:p>
         </p:txBody>
       </p:sp>
     </p:spTree>
     <p:extLst>
       <p:ext uri="{BB962C8B-B14F-4D97-AF65-F5344CB8AC3E}">
-        <p14:creationId xmlns:p14="http://schemas.microsoft.com/office/powerpoint/2010/main" val="3173601397"/>
+        <p14:creationId xmlns:p14="http://schemas.microsoft.com/office/powerpoint/2010/main" val="15725818"/>
       </p:ext>
     </p:extLst>
   </p:cSld>
@@ -5540,7 +5496,7 @@
             </a:r>
             <a:r>
               <a:rPr lang="de-CH" sz="3200" b="1" dirty="0" smtClean="0"/>
-              <a:t>IPv4_RX</a:t>
+              <a:t>IPv4_TX</a:t>
             </a:r>
             <a:endParaRPr lang="de-CH" sz="3200" dirty="0"/>
           </a:p>
@@ -5564,56 +5520,71 @@
           <a:lstStyle/>
           <a:p>
             <a:r>
-              <a:rPr lang="de-CH" sz="2000" dirty="0" smtClean="0"/>
-              <a:t>Simple FSM to parse both the ethernet frame header and the IP v4 header.</a:t>
-            </a:r>
-          </a:p>
-          <a:p>
-            <a:r>
-              <a:rPr lang="de-CH" sz="2000" dirty="0" smtClean="0"/>
-              <a:t>Ignores packets that</a:t>
+              <a:rPr lang="de-CH" dirty="0" smtClean="0"/>
+              <a:t>IPv4_TX comprises two simple FSMs:</a:t>
             </a:r>
           </a:p>
           <a:p>
             <a:pPr lvl="1"/>
             <a:r>
-              <a:rPr lang="de-CH" sz="2000" dirty="0" smtClean="0"/>
-              <a:t>Are not v4 IP packets</a:t>
+              <a:rPr lang="de-CH" dirty="0" smtClean="0"/>
+              <a:t>to control transmission of the header and user data</a:t>
             </a:r>
           </a:p>
           <a:p>
             <a:pPr lvl="1"/>
             <a:r>
-              <a:rPr lang="de-CH" sz="2000" dirty="0" smtClean="0"/>
-              <a:t>Require reassembly</a:t>
+              <a:rPr lang="de-CH" dirty="0" smtClean="0"/>
+              <a:t>to calculate the header checksum</a:t>
+            </a:r>
+            <a:br>
+              <a:rPr lang="de-CH" dirty="0" smtClean="0"/>
+            </a:br>
+            <a:endParaRPr lang="de-CH" dirty="0" smtClean="0"/>
+          </a:p>
+          <a:p>
+            <a:r>
+              <a:rPr lang="de-CH" dirty="0" smtClean="0"/>
+              <a:t>To use,  </a:t>
             </a:r>
           </a:p>
           <a:p>
             <a:pPr lvl="1"/>
             <a:r>
-              <a:rPr lang="de-CH" sz="2000" dirty="0" smtClean="0"/>
-              <a:t>Are not for our ip address</a:t>
-            </a:r>
-          </a:p>
-          <a:p>
-            <a:r>
-              <a:rPr lang="de-CH" sz="2000" dirty="0" smtClean="0"/>
-              <a:t>Once all these checks are satisfied, the rx header data: ip_rx.hdr is valid and the module asserts ip_rx_start.</a:t>
-            </a:r>
-          </a:p>
-          <a:p>
-            <a:r>
-              <a:rPr lang="de-CH" sz="2000" dirty="0" smtClean="0"/>
-              <a:t>Received user data is available through the ip_rx.data record.</a:t>
-            </a:r>
-            <a:endParaRPr lang="de-CH" sz="2000" dirty="0"/>
+              <a:rPr lang="de-CH" dirty="0" smtClean="0"/>
+              <a:t>set the TX header, and </a:t>
+            </a:r>
+            <a:r>
+              <a:rPr lang="de-CH" dirty="0"/>
+              <a:t>assert ip_tx_start. </a:t>
+            </a:r>
+            <a:endParaRPr lang="de-CH" dirty="0" smtClean="0"/>
+          </a:p>
+          <a:p>
+            <a:pPr lvl="1"/>
+            <a:r>
+              <a:rPr lang="de-CH" dirty="0" smtClean="0"/>
+              <a:t>The block begins to calculate the header CRC and transmit the header</a:t>
+            </a:r>
+          </a:p>
+          <a:p>
+            <a:pPr lvl="1"/>
+            <a:r>
+              <a:rPr lang="de-CH" dirty="0"/>
+              <a:t>Once in the user data stage, the block asserts </a:t>
+            </a:r>
+            <a:r>
+              <a:rPr lang="de-CH" dirty="0" smtClean="0"/>
+              <a:t>ip_tx_data_out_ready and copies user data over to the MAC TX output</a:t>
+            </a:r>
+            <a:endParaRPr lang="de-CH" dirty="0"/>
           </a:p>
         </p:txBody>
       </p:sp>
     </p:spTree>
     <p:extLst>
       <p:ext uri="{BB962C8B-B14F-4D97-AF65-F5344CB8AC3E}">
-        <p14:creationId xmlns:p14="http://schemas.microsoft.com/office/powerpoint/2010/main" val="3813657060"/>
+        <p14:creationId xmlns:p14="http://schemas.microsoft.com/office/powerpoint/2010/main" val="3173601397"/>
       </p:ext>
     </p:extLst>
   </p:cSld>
@@ -5671,7 +5642,7 @@
             </a:r>
             <a:r>
               <a:rPr lang="de-CH" sz="3200" b="1" dirty="0" smtClean="0"/>
-              <a:t>arp</a:t>
+              <a:t>IPv4_RX</a:t>
             </a:r>
             <a:endParaRPr lang="de-CH" sz="3200" dirty="0"/>
           </a:p>
@@ -5695,63 +5666,56 @@
           <a:lstStyle/>
           <a:p>
             <a:r>
-              <a:rPr lang="de-CH" dirty="0" smtClean="0"/>
-              <a:t>Handles receipt of ARP packets</a:t>
-            </a:r>
-          </a:p>
-          <a:p>
-            <a:r>
-              <a:rPr lang="de-CH" dirty="0" smtClean="0"/>
-              <a:t>Handles transmission of ARP requests</a:t>
-            </a:r>
-          </a:p>
-          <a:p>
-            <a:r>
-              <a:rPr lang="de-CH" dirty="0" smtClean="0"/>
-              <a:t>Handles request resolution (check ARP cache and request resolution if not found)</a:t>
-            </a:r>
-          </a:p>
-          <a:p>
-            <a:r>
-              <a:rPr lang="de-CH" dirty="0" smtClean="0"/>
-              <a:t>Three FSMs, one for each of the above functions</a:t>
-            </a:r>
-          </a:p>
-          <a:p>
-            <a:r>
-              <a:rPr lang="de-CH" dirty="0" smtClean="0"/>
-              <a:t>ARP mapper cache is only 1 deep in this implementation</a:t>
+              <a:rPr lang="de-CH" sz="2000" dirty="0" smtClean="0"/>
+              <a:t>Simple FSM to parse both the ethernet frame header and the IP v4 header.</a:t>
+            </a:r>
+          </a:p>
+          <a:p>
+            <a:r>
+              <a:rPr lang="de-CH" sz="2000" dirty="0" smtClean="0"/>
+              <a:t>Ignores packets that</a:t>
             </a:r>
           </a:p>
           <a:p>
             <a:pPr lvl="1"/>
             <a:r>
-              <a:rPr lang="de-CH" dirty="0" smtClean="0"/>
-              <a:t>which means that it is only really good for point-point comms. </a:t>
+              <a:rPr lang="de-CH" sz="2000" dirty="0" smtClean="0"/>
+              <a:t>Are not v4 IP packets</a:t>
             </a:r>
           </a:p>
           <a:p>
             <a:pPr lvl="1"/>
             <a:r>
-              <a:rPr lang="de-CH" dirty="0" smtClean="0"/>
-              <a:t>Can easily be extended though for greater depth.</a:t>
-            </a:r>
-          </a:p>
-          <a:p>
-            <a:r>
-              <a:rPr lang="de-CH" dirty="0" smtClean="0"/>
-              <a:t>Input signals to module indicate our IP and MAC addresses</a:t>
-            </a:r>
-          </a:p>
-          <a:p>
-            <a:endParaRPr lang="de-CH" dirty="0"/>
+              <a:rPr lang="de-CH" sz="2000" dirty="0" smtClean="0"/>
+              <a:t>Require reassembly</a:t>
+            </a:r>
+          </a:p>
+          <a:p>
+            <a:pPr lvl="1"/>
+            <a:r>
+              <a:rPr lang="de-CH" sz="2000" dirty="0" smtClean="0"/>
+              <a:t>Are not for our ip address</a:t>
+            </a:r>
+          </a:p>
+          <a:p>
+            <a:r>
+              <a:rPr lang="de-CH" sz="2000" dirty="0" smtClean="0"/>
+              <a:t>Once all these checks are satisfied, the rx header data: ip_rx.hdr is valid and the module asserts ip_rx_start.</a:t>
+            </a:r>
+          </a:p>
+          <a:p>
+            <a:r>
+              <a:rPr lang="de-CH" sz="2000" dirty="0" smtClean="0"/>
+              <a:t>Received user data is available through the ip_rx.data record.</a:t>
+            </a:r>
+            <a:endParaRPr lang="de-CH" sz="2000" dirty="0"/>
           </a:p>
         </p:txBody>
       </p:sp>
     </p:spTree>
     <p:extLst>
       <p:ext uri="{BB962C8B-B14F-4D97-AF65-F5344CB8AC3E}">
-        <p14:creationId xmlns:p14="http://schemas.microsoft.com/office/powerpoint/2010/main" val="2365233048"/>
+        <p14:creationId xmlns:p14="http://schemas.microsoft.com/office/powerpoint/2010/main" val="3813657060"/>
       </p:ext>
     </p:extLst>
   </p:cSld>
@@ -5809,7 +5773,7 @@
             </a:r>
             <a:r>
               <a:rPr lang="de-CH" sz="3200" b="1" dirty="0" smtClean="0"/>
-              <a:t>tx_arbitrator</a:t>
+              <a:t>arp</a:t>
             </a:r>
             <a:endParaRPr lang="de-CH" sz="3200" dirty="0"/>
           </a:p>
@@ -5827,39 +5791,61 @@
         </p:nvSpPr>
         <p:spPr/>
         <p:txBody>
-          <a:bodyPr/>
+          <a:bodyPr>
+            <a:normAutofit/>
+          </a:bodyPr>
           <a:lstStyle/>
           <a:p>
             <a:r>
               <a:rPr lang="de-CH" dirty="0" smtClean="0"/>
-              <a:t>FSM to arbitrate access to the MAC TX layer by</a:t>
+              <a:t>Handles receipt of ARP packets</a:t>
+            </a:r>
+          </a:p>
+          <a:p>
+            <a:r>
+              <a:rPr lang="de-CH" dirty="0" smtClean="0"/>
+              <a:t>Handles transmission of ARP requests</a:t>
+            </a:r>
+          </a:p>
+          <a:p>
+            <a:r>
+              <a:rPr lang="de-CH" dirty="0" smtClean="0"/>
+              <a:t>Handles request resolution (check ARP cache and request resolution if not found)</a:t>
+            </a:r>
+          </a:p>
+          <a:p>
+            <a:r>
+              <a:rPr lang="de-CH" dirty="0" smtClean="0"/>
+              <a:t>Three FSMs, one for each of the above functions</a:t>
+            </a:r>
+          </a:p>
+          <a:p>
+            <a:r>
+              <a:rPr lang="de-CH" dirty="0" smtClean="0"/>
+              <a:t>ARP mapper cache is only 1 deep in this implementation</a:t>
             </a:r>
           </a:p>
           <a:p>
             <a:pPr lvl="1"/>
             <a:r>
               <a:rPr lang="de-CH" dirty="0" smtClean="0"/>
-              <a:t>IP TX path</a:t>
+              <a:t>which means that it is only really good for point-point comms. </a:t>
             </a:r>
           </a:p>
           <a:p>
             <a:pPr lvl="1"/>
             <a:r>
               <a:rPr lang="de-CH" dirty="0" smtClean="0"/>
-              <a:t>ARP TX path</a:t>
+              <a:t>Can easily be extended though for greater depth.</a:t>
             </a:r>
           </a:p>
           <a:p>
             <a:r>
               <a:rPr lang="de-CH" dirty="0" smtClean="0"/>
-              <a:t>One of the sources requests access and must wait until it is granted.</a:t>
-            </a:r>
-          </a:p>
-          <a:p>
-            <a:r>
-              <a:rPr lang="de-CH" dirty="0" smtClean="0"/>
-              <a:t>Priority is given to the IP path as it is expected that that path has the highest request rate.</a:t>
-            </a:r>
+              <a:t>Input signals to module indicate our IP and MAC addresses</a:t>
+            </a:r>
+          </a:p>
+          <a:p>
             <a:endParaRPr lang="de-CH" dirty="0"/>
           </a:p>
         </p:txBody>
@@ -5867,7 +5853,7 @@
     </p:spTree>
     <p:extLst>
       <p:ext uri="{BB962C8B-B14F-4D97-AF65-F5344CB8AC3E}">
-        <p14:creationId xmlns:p14="http://schemas.microsoft.com/office/powerpoint/2010/main" val="1938167202"/>
+        <p14:creationId xmlns:p14="http://schemas.microsoft.com/office/powerpoint/2010/main" val="2365233048"/>
       </p:ext>
     </p:extLst>
   </p:cSld>
@@ -5912,10 +5898,22 @@
           <a:lstStyle/>
           <a:p>
             <a:r>
-              <a:rPr lang="de-CH" sz="4000" dirty="0" smtClean="0"/>
-              <a:t>Simulation</a:t>
-            </a:r>
-            <a:endParaRPr lang="de-CH" sz="4000" dirty="0"/>
+              <a:rPr lang="de-CH" sz="3200" dirty="0"/>
+              <a:t>Module </a:t>
+            </a:r>
+            <a:r>
+              <a:rPr lang="de-CH" sz="3200" dirty="0" smtClean="0"/>
+              <a:t>Description</a:t>
+            </a:r>
+            <a:r>
+              <a:rPr lang="de-CH" sz="3200" dirty="0"/>
+              <a:t>:  </a:t>
+            </a:r>
+            <a:r>
+              <a:rPr lang="de-CH" sz="3200" b="1" dirty="0" smtClean="0"/>
+              <a:t>tx_arbitrator</a:t>
+            </a:r>
+            <a:endParaRPr lang="de-CH" sz="3200" dirty="0"/>
           </a:p>
         </p:txBody>
       </p:sp>
@@ -5936,19 +5934,33 @@
           <a:p>
             <a:r>
               <a:rPr lang="de-CH" dirty="0" smtClean="0"/>
-              <a:t>Every vdhl module has a corresponding RTL simulation test bench.</a:t>
-            </a:r>
-          </a:p>
-          <a:p>
+              <a:t>FSM to arbitrate access to the MAC TX layer by</a:t>
+            </a:r>
+          </a:p>
+          <a:p>
+            <a:pPr lvl="1"/>
             <a:r>
               <a:rPr lang="de-CH" dirty="0" smtClean="0"/>
-              <a:t>Additionally, there are simulation test benches for various module integrations.</a:t>
-            </a:r>
-          </a:p>
-          <a:p>
+              <a:t>IP TX path</a:t>
+            </a:r>
+          </a:p>
+          <a:p>
+            <a:pPr lvl="1"/>
             <a:r>
               <a:rPr lang="de-CH" dirty="0" smtClean="0"/>
-              <a:t>In this version, verification is not completely automatic. The test benches test for some things, but much is left to manual inspection via the simulator waveforms.</a:t>
+              <a:t>ARP TX path</a:t>
+            </a:r>
+          </a:p>
+          <a:p>
+            <a:r>
+              <a:rPr lang="de-CH" dirty="0" smtClean="0"/>
+              <a:t>One of the sources requests access and must wait until it is granted.</a:t>
+            </a:r>
+          </a:p>
+          <a:p>
+            <a:r>
+              <a:rPr lang="de-CH" dirty="0" smtClean="0"/>
+              <a:t>Priority is given to the IP path as it is expected that that path has the highest request rate.</a:t>
             </a:r>
             <a:endParaRPr lang="de-CH" dirty="0"/>
           </a:p>
@@ -5957,7 +5969,7 @@
     </p:spTree>
     <p:extLst>
       <p:ext uri="{BB962C8B-B14F-4D97-AF65-F5344CB8AC3E}">
-        <p14:creationId xmlns:p14="http://schemas.microsoft.com/office/powerpoint/2010/main" val="2071527852"/>
+        <p14:creationId xmlns:p14="http://schemas.microsoft.com/office/powerpoint/2010/main" val="1938167202"/>
       </p:ext>
     </p:extLst>
   </p:cSld>
@@ -6003,7 +6015,7 @@
           <a:p>
             <a:r>
               <a:rPr lang="de-CH" sz="4000" dirty="0" smtClean="0"/>
-              <a:t>TestBench - HW</a:t>
+              <a:t>Simulation</a:t>
             </a:r>
             <a:endParaRPr lang="de-CH" sz="4000" dirty="0"/>
           </a:p>
@@ -6019,108 +6031,35 @@
             <p:ph idx="1"/>
           </p:nvPr>
         </p:nvSpPr>
-        <p:spPr>
-          <a:xfrm>
-            <a:off x="457200" y="1600200"/>
-            <a:ext cx="8229600" cy="4953000"/>
-          </a:xfrm>
-        </p:spPr>
-        <p:txBody>
-          <a:bodyPr>
-            <a:normAutofit fontScale="92500" lnSpcReduction="10000"/>
-          </a:bodyPr>
-          <a:lstStyle/>
-          <a:p>
-            <a:r>
-              <a:rPr lang="de-CH" sz="2000" dirty="0" smtClean="0"/>
-              <a:t>The HW testbench is built around the Xilinx ML-605 prototyping card.</a:t>
-            </a:r>
-          </a:p>
-          <a:p>
-            <a:r>
-              <a:rPr lang="de-CH" sz="2000" dirty="0" smtClean="0"/>
-              <a:t>It directly uses the card’s 200MHz clocks, Eth PHY (copper) and LEDs to indicate status.</a:t>
-            </a:r>
-          </a:p>
-          <a:p>
-            <a:r>
-              <a:rPr lang="de-CH" sz="2000" dirty="0" smtClean="0"/>
-              <a:t>A simple VHDL driver module for the stack replies with a canned response whenever it receives a UDP pkt on a particular IP addr and port number.</a:t>
-            </a:r>
-          </a:p>
-          <a:p>
-            <a:r>
-              <a:rPr lang="de-CH" sz="2000" dirty="0" smtClean="0"/>
-              <a:t>The Xilinx </a:t>
-            </a:r>
-            <a:r>
-              <a:rPr lang="de-CH" sz="2000" b="1" dirty="0"/>
-              <a:t>LogiCORE IP </a:t>
-            </a:r>
-            <a:r>
-              <a:rPr lang="de-CH" sz="2000" b="1" dirty="0" smtClean="0"/>
-              <a:t>Virtex-6 FPGA </a:t>
-            </a:r>
-            <a:r>
-              <a:rPr lang="de-CH" sz="2000" b="1" dirty="0"/>
-              <a:t>Embedded </a:t>
-            </a:r>
-            <a:r>
-              <a:rPr lang="de-CH" sz="2000" b="1" dirty="0" smtClean="0"/>
-              <a:t>Tri-Mode Ethernet </a:t>
-            </a:r>
-            <a:r>
-              <a:rPr lang="de-CH" sz="2000" b="1" dirty="0"/>
-              <a:t>MAC </a:t>
-            </a:r>
-            <a:r>
-              <a:rPr lang="de-CH" sz="2000" b="1" dirty="0" smtClean="0"/>
-              <a:t>v2.1 </a:t>
-            </a:r>
-            <a:r>
-              <a:rPr lang="de-CH" sz="2000" dirty="0" smtClean="0"/>
-              <a:t>is used to couple the UDP/IP stack to the board’s Ethernet PHY. This is used with the standard FIFO user buffering (which adds a one-frame delay). It should be possible also to remove this FIFO to reduce latency.</a:t>
-            </a:r>
-          </a:p>
-          <a:p>
-            <a:r>
-              <a:rPr lang="de-CH" sz="2000" dirty="0" smtClean="0"/>
-              <a:t>A laptop provides stimulus by way of one of two Java programs: </a:t>
-            </a:r>
-          </a:p>
-          <a:p>
-            <a:pPr lvl="1"/>
-            <a:r>
-              <a:rPr lang="de-CH" sz="1600" dirty="0" smtClean="0"/>
-              <a:t>UDPTest.java – writes one UDP pkt and waits for a response then prints it</a:t>
-            </a:r>
-          </a:p>
-          <a:p>
-            <a:pPr lvl="1"/>
-            <a:r>
-              <a:rPr lang="de-CH" sz="1600" dirty="0" smtClean="0"/>
-              <a:t>UDPTestStream.java – writes a number of UDP pkts and prints responses</a:t>
-            </a:r>
-          </a:p>
-          <a:p>
-            <a:r>
-              <a:rPr lang="de-CH" sz="2000" dirty="0" smtClean="0"/>
-              <a:t>The test network is a single twisted CAT-6 cable between the laptop and the ML-605 board.</a:t>
-            </a:r>
-          </a:p>
-          <a:p>
-            <a:r>
-              <a:rPr lang="de-CH" sz="2000" dirty="0" smtClean="0"/>
-              <a:t>Wireshark (on the laptop) is used to capture the traffic on the wire (sample pcap files are included)</a:t>
-            </a:r>
-            <a:endParaRPr lang="de-CH" sz="2000" dirty="0"/>
+        <p:spPr/>
+        <p:txBody>
+          <a:bodyPr/>
+          <a:lstStyle/>
+          <a:p>
+            <a:r>
+              <a:rPr lang="de-CH" dirty="0" smtClean="0"/>
+              <a:t>Every vdhl module has a corresponding RTL simulation test bench.</a:t>
+            </a:r>
+          </a:p>
+          <a:p>
+            <a:r>
+              <a:rPr lang="de-CH" dirty="0" smtClean="0"/>
+              <a:t>Additionally, there are simulation test benches for various module integrations.</a:t>
+            </a:r>
+          </a:p>
+          <a:p>
+            <a:r>
+              <a:rPr lang="de-CH" dirty="0" smtClean="0"/>
+              <a:t>In this version, verification is not completely automatic. The test benches test for some things, but much is left to manual inspection via the simulator waveforms.</a:t>
+            </a:r>
+            <a:endParaRPr lang="de-CH" dirty="0"/>
           </a:p>
         </p:txBody>
       </p:sp>
     </p:spTree>
     <p:extLst>
       <p:ext uri="{BB962C8B-B14F-4D97-AF65-F5344CB8AC3E}">
-        <p14:creationId xmlns:p14="http://schemas.microsoft.com/office/powerpoint/2010/main" val="1368178966"/>
+        <p14:creationId xmlns:p14="http://schemas.microsoft.com/office/powerpoint/2010/main" val="2071527852"/>
       </p:ext>
     </p:extLst>
   </p:cSld>
@@ -6149,96 +6088,6 @@
       </p:grpSpPr>
       <p:sp>
         <p:nvSpPr>
-          <p:cNvPr id="24" name="Rectangle 23"/>
-          <p:cNvSpPr/>
-          <p:nvPr/>
-        </p:nvSpPr>
-        <p:spPr>
-          <a:xfrm>
-            <a:off x="228600" y="944562"/>
-            <a:ext cx="8686800" cy="4782475"/>
-          </a:xfrm>
-          <a:prstGeom prst="rect">
-            <a:avLst/>
-          </a:prstGeom>
-          <a:solidFill>
-            <a:schemeClr val="bg1">
-              <a:lumMod val="85000"/>
-            </a:schemeClr>
-          </a:solidFill>
-        </p:spPr>
-        <p:style>
-          <a:lnRef idx="2">
-            <a:schemeClr val="accent1">
-              <a:shade val="50000"/>
-            </a:schemeClr>
-          </a:lnRef>
-          <a:fillRef idx="1">
-            <a:schemeClr val="accent1"/>
-          </a:fillRef>
-          <a:effectRef idx="0">
-            <a:schemeClr val="accent1"/>
-          </a:effectRef>
-          <a:fontRef idx="minor">
-            <a:schemeClr val="lt1"/>
-          </a:fontRef>
-        </p:style>
-        <p:txBody>
-          <a:bodyPr rtlCol="0" anchor="ctr"/>
-          <a:lstStyle/>
-          <a:p>
-            <a:pPr algn="ctr"/>
-            <a:endParaRPr lang="de-CH" dirty="0"/>
-          </a:p>
-        </p:txBody>
-      </p:sp>
-      <p:sp>
-        <p:nvSpPr>
-          <p:cNvPr id="22" name="Rounded Rectangle 21"/>
-          <p:cNvSpPr/>
-          <p:nvPr/>
-        </p:nvSpPr>
-        <p:spPr>
-          <a:xfrm>
-            <a:off x="914400" y="1371600"/>
-            <a:ext cx="7010400" cy="3655496"/>
-          </a:xfrm>
-          <a:prstGeom prst="roundRect">
-            <a:avLst/>
-          </a:prstGeom>
-          <a:solidFill>
-            <a:schemeClr val="bg1">
-              <a:lumMod val="65000"/>
-            </a:schemeClr>
-          </a:solidFill>
-        </p:spPr>
-        <p:style>
-          <a:lnRef idx="2">
-            <a:schemeClr val="accent1">
-              <a:shade val="50000"/>
-            </a:schemeClr>
-          </a:lnRef>
-          <a:fillRef idx="1">
-            <a:schemeClr val="accent1"/>
-          </a:fillRef>
-          <a:effectRef idx="0">
-            <a:schemeClr val="accent1"/>
-          </a:effectRef>
-          <a:fontRef idx="minor">
-            <a:schemeClr val="lt1"/>
-          </a:fontRef>
-        </p:style>
-        <p:txBody>
-          <a:bodyPr rtlCol="0" anchor="ctr"/>
-          <a:lstStyle/>
-          <a:p>
-            <a:pPr algn="ctr"/>
-            <a:endParaRPr lang="de-CH"/>
-          </a:p>
-        </p:txBody>
-      </p:sp>
-      <p:sp>
-        <p:nvSpPr>
           <p:cNvPr id="2" name="Title 1"/>
           <p:cNvSpPr>
             <a:spLocks noGrp="1"/>
@@ -6247,950 +6096,133 @@
             <p:ph type="title"/>
           </p:nvPr>
         </p:nvSpPr>
+        <p:spPr/>
+        <p:txBody>
+          <a:bodyPr>
+            <a:normAutofit fontScale="90000"/>
+          </a:bodyPr>
+          <a:lstStyle/>
+          <a:p>
+            <a:r>
+              <a:rPr lang="de-CH" sz="4000" dirty="0" smtClean="0"/>
+              <a:t>TestBench - HW</a:t>
+            </a:r>
+            <a:endParaRPr lang="de-CH" sz="4000" dirty="0"/>
+          </a:p>
+        </p:txBody>
+      </p:sp>
+      <p:sp>
+        <p:nvSpPr>
+          <p:cNvPr id="3" name="Content Placeholder 2"/>
+          <p:cNvSpPr>
+            <a:spLocks noGrp="1"/>
+          </p:cNvSpPr>
+          <p:nvPr>
+            <p:ph idx="1"/>
+          </p:nvPr>
+        </p:nvSpPr>
         <p:spPr>
           <a:xfrm>
-            <a:off x="457200" y="122238"/>
-            <a:ext cx="8229600" cy="639762"/>
+            <a:off x="457200" y="1600200"/>
+            <a:ext cx="8229600" cy="4953000"/>
           </a:xfrm>
         </p:spPr>
         <p:txBody>
           <a:bodyPr>
-            <a:normAutofit/>
+            <a:normAutofit fontScale="92500" lnSpcReduction="10000"/>
           </a:bodyPr>
           <a:lstStyle/>
           <a:p>
             <a:r>
-              <a:rPr lang="de-CH" dirty="0" smtClean="0"/>
-              <a:t>Test Setup</a:t>
-            </a:r>
-            <a:endParaRPr lang="de-CH" dirty="0"/>
-          </a:p>
-        </p:txBody>
-      </p:sp>
-      <p:sp>
-        <p:nvSpPr>
-          <p:cNvPr id="4" name="Rounded Rectangle 3"/>
-          <p:cNvSpPr/>
-          <p:nvPr/>
-        </p:nvSpPr>
-        <p:spPr>
-          <a:xfrm>
-            <a:off x="3505200" y="1782762"/>
-            <a:ext cx="1981200" cy="2590800"/>
-          </a:xfrm>
-          <a:prstGeom prst="roundRect">
-            <a:avLst/>
-          </a:prstGeom>
-        </p:spPr>
-        <p:style>
-          <a:lnRef idx="2">
-            <a:schemeClr val="accent1">
-              <a:shade val="50000"/>
-            </a:schemeClr>
-          </a:lnRef>
-          <a:fillRef idx="1">
-            <a:schemeClr val="accent1"/>
-          </a:fillRef>
-          <a:effectRef idx="0">
-            <a:schemeClr val="accent1"/>
-          </a:effectRef>
-          <a:fontRef idx="minor">
-            <a:schemeClr val="lt1"/>
-          </a:fontRef>
-        </p:style>
-        <p:txBody>
-          <a:bodyPr rtlCol="0" anchor="ctr"/>
-          <a:lstStyle/>
-          <a:p>
-            <a:pPr algn="ctr"/>
-            <a:r>
-              <a:rPr lang="de-CH" dirty="0" smtClean="0"/>
-              <a:t>UDP_Complete_nomac</a:t>
-            </a:r>
-            <a:endParaRPr lang="de-CH" dirty="0"/>
-          </a:p>
-        </p:txBody>
-      </p:sp>
-      <p:cxnSp>
-        <p:nvCxnSpPr>
-          <p:cNvPr id="5" name="Straight Arrow Connector 4"/>
-          <p:cNvCxnSpPr/>
-          <p:nvPr/>
-        </p:nvCxnSpPr>
-        <p:spPr>
-          <a:xfrm>
-            <a:off x="2743200" y="2789390"/>
-            <a:ext cx="762000" cy="0"/>
-          </a:xfrm>
-          <a:prstGeom prst="straightConnector1">
-            <a:avLst/>
-          </a:prstGeom>
-          <a:ln w="28575">
-            <a:solidFill>
-              <a:schemeClr val="tx1"/>
-            </a:solidFill>
-            <a:headEnd type="triangle" w="lg" len="lg"/>
-            <a:tailEnd type="triangle" w="lg" len="lg"/>
-          </a:ln>
-        </p:spPr>
-        <p:style>
-          <a:lnRef idx="1">
-            <a:schemeClr val="accent1"/>
-          </a:lnRef>
-          <a:fillRef idx="0">
-            <a:schemeClr val="accent1"/>
-          </a:fillRef>
-          <a:effectRef idx="0">
-            <a:schemeClr val="accent1"/>
-          </a:effectRef>
-          <a:fontRef idx="minor">
-            <a:schemeClr val="tx1"/>
-          </a:fontRef>
-        </p:style>
-      </p:cxnSp>
-      <p:sp>
-        <p:nvSpPr>
-          <p:cNvPr id="6" name="TextBox 5"/>
-          <p:cNvSpPr txBox="1"/>
-          <p:nvPr/>
-        </p:nvSpPr>
-        <p:spPr>
-          <a:xfrm>
-            <a:off x="2667000" y="2373868"/>
-            <a:ext cx="1524000" cy="369332"/>
-          </a:xfrm>
-          <a:prstGeom prst="rect">
-            <a:avLst/>
-          </a:prstGeom>
-          <a:noFill/>
-        </p:spPr>
-        <p:txBody>
-          <a:bodyPr wrap="square" rtlCol="0">
-            <a:spAutoFit/>
-          </a:bodyPr>
-          <a:lstStyle/>
-          <a:p>
-            <a:r>
-              <a:rPr lang="de-CH" dirty="0" smtClean="0"/>
-              <a:t>UDP TX</a:t>
-            </a:r>
-            <a:endParaRPr lang="de-CH" dirty="0"/>
-          </a:p>
-        </p:txBody>
-      </p:sp>
-      <p:cxnSp>
-        <p:nvCxnSpPr>
-          <p:cNvPr id="7" name="Straight Arrow Connector 6"/>
-          <p:cNvCxnSpPr/>
-          <p:nvPr/>
-        </p:nvCxnSpPr>
-        <p:spPr>
-          <a:xfrm>
-            <a:off x="2743200" y="3304091"/>
-            <a:ext cx="762000" cy="0"/>
-          </a:xfrm>
-          <a:prstGeom prst="straightConnector1">
-            <a:avLst/>
-          </a:prstGeom>
-          <a:ln w="28575">
-            <a:solidFill>
-              <a:schemeClr val="tx1"/>
-            </a:solidFill>
-            <a:headEnd type="triangle" w="lg" len="lg"/>
-            <a:tailEnd type="triangle" w="lg" len="lg"/>
-          </a:ln>
-        </p:spPr>
-        <p:style>
-          <a:lnRef idx="1">
-            <a:schemeClr val="accent1"/>
-          </a:lnRef>
-          <a:fillRef idx="0">
-            <a:schemeClr val="accent1"/>
-          </a:fillRef>
-          <a:effectRef idx="0">
-            <a:schemeClr val="accent1"/>
-          </a:effectRef>
-          <a:fontRef idx="minor">
-            <a:schemeClr val="tx1"/>
-          </a:fontRef>
-        </p:style>
-      </p:cxnSp>
-      <p:sp>
-        <p:nvSpPr>
-          <p:cNvPr id="8" name="TextBox 7"/>
-          <p:cNvSpPr txBox="1"/>
-          <p:nvPr/>
-        </p:nvSpPr>
-        <p:spPr>
-          <a:xfrm>
-            <a:off x="2667000" y="3386558"/>
-            <a:ext cx="1524000" cy="369332"/>
-          </a:xfrm>
-          <a:prstGeom prst="rect">
-            <a:avLst/>
-          </a:prstGeom>
-          <a:noFill/>
-        </p:spPr>
-        <p:txBody>
-          <a:bodyPr wrap="square" rtlCol="0">
-            <a:spAutoFit/>
-          </a:bodyPr>
-          <a:lstStyle/>
-          <a:p>
-            <a:r>
-              <a:rPr lang="de-CH" dirty="0" smtClean="0"/>
-              <a:t>UDP RX</a:t>
-            </a:r>
-            <a:endParaRPr lang="de-CH" dirty="0"/>
-          </a:p>
-        </p:txBody>
-      </p:sp>
-      <p:sp>
-        <p:nvSpPr>
-          <p:cNvPr id="11" name="TextBox 10"/>
-          <p:cNvSpPr txBox="1"/>
-          <p:nvPr/>
-        </p:nvSpPr>
-        <p:spPr>
-          <a:xfrm>
-            <a:off x="2624070" y="5034540"/>
-            <a:ext cx="1033530" cy="646331"/>
-          </a:xfrm>
-          <a:prstGeom prst="rect">
-            <a:avLst/>
-          </a:prstGeom>
-          <a:noFill/>
-        </p:spPr>
-        <p:txBody>
-          <a:bodyPr wrap="square" rtlCol="0">
-            <a:spAutoFit/>
-          </a:bodyPr>
-          <a:lstStyle/>
-          <a:p>
-            <a:pPr algn="ctr"/>
-            <a:r>
-              <a:rPr lang="de-CH" dirty="0" smtClean="0"/>
-              <a:t>Clocks &amp; reset</a:t>
-            </a:r>
-            <a:endParaRPr lang="de-CH" dirty="0"/>
-          </a:p>
-        </p:txBody>
-      </p:sp>
-      <p:cxnSp>
-        <p:nvCxnSpPr>
-          <p:cNvPr id="12" name="Straight Arrow Connector 11"/>
-          <p:cNvCxnSpPr/>
-          <p:nvPr/>
-        </p:nvCxnSpPr>
-        <p:spPr>
-          <a:xfrm>
-            <a:off x="5482108" y="2625915"/>
-            <a:ext cx="762000" cy="0"/>
-          </a:xfrm>
-          <a:prstGeom prst="straightConnector1">
-            <a:avLst/>
-          </a:prstGeom>
-          <a:ln w="28575">
-            <a:solidFill>
-              <a:schemeClr val="tx1"/>
-            </a:solidFill>
-            <a:headEnd type="triangle" w="lg" len="lg"/>
-            <a:tailEnd type="triangle" w="lg" len="lg"/>
-          </a:ln>
-        </p:spPr>
-        <p:style>
-          <a:lnRef idx="1">
-            <a:schemeClr val="accent1"/>
-          </a:lnRef>
-          <a:fillRef idx="0">
-            <a:schemeClr val="accent1"/>
-          </a:fillRef>
-          <a:effectRef idx="0">
-            <a:schemeClr val="accent1"/>
-          </a:effectRef>
-          <a:fontRef idx="minor">
-            <a:schemeClr val="tx1"/>
-          </a:fontRef>
-        </p:style>
-      </p:cxnSp>
-      <p:cxnSp>
-        <p:nvCxnSpPr>
-          <p:cNvPr id="14" name="Straight Arrow Connector 13"/>
-          <p:cNvCxnSpPr/>
-          <p:nvPr/>
-        </p:nvCxnSpPr>
-        <p:spPr>
-          <a:xfrm>
-            <a:off x="5487474" y="3147647"/>
-            <a:ext cx="762000" cy="0"/>
-          </a:xfrm>
-          <a:prstGeom prst="straightConnector1">
-            <a:avLst/>
-          </a:prstGeom>
-          <a:ln w="28575">
-            <a:solidFill>
-              <a:schemeClr val="tx1"/>
-            </a:solidFill>
-            <a:headEnd type="triangle" w="lg" len="lg"/>
-            <a:tailEnd type="triangle" w="lg" len="lg"/>
-          </a:ln>
-        </p:spPr>
-        <p:style>
-          <a:lnRef idx="1">
-            <a:schemeClr val="accent1"/>
-          </a:lnRef>
-          <a:fillRef idx="0">
-            <a:schemeClr val="accent1"/>
-          </a:fillRef>
-          <a:effectRef idx="0">
-            <a:schemeClr val="accent1"/>
-          </a:effectRef>
-          <a:fontRef idx="minor">
-            <a:schemeClr val="tx1"/>
-          </a:fontRef>
-        </p:style>
-      </p:cxnSp>
-      <p:cxnSp>
-        <p:nvCxnSpPr>
-          <p:cNvPr id="16" name="Straight Arrow Connector 15"/>
-          <p:cNvCxnSpPr/>
-          <p:nvPr/>
-        </p:nvCxnSpPr>
-        <p:spPr>
-          <a:xfrm flipH="1">
-            <a:off x="3140835" y="4370334"/>
-            <a:ext cx="516765" cy="887466"/>
-          </a:xfrm>
-          <a:prstGeom prst="straightConnector1">
-            <a:avLst/>
-          </a:prstGeom>
-          <a:ln w="28575">
-            <a:solidFill>
-              <a:schemeClr val="tx1"/>
-            </a:solidFill>
-            <a:headEnd type="triangle" w="lg" len="lg"/>
-            <a:tailEnd type="none" w="lg" len="lg"/>
-          </a:ln>
-        </p:spPr>
-        <p:style>
-          <a:lnRef idx="1">
-            <a:schemeClr val="accent1"/>
-          </a:lnRef>
-          <a:fillRef idx="0">
-            <a:schemeClr val="accent1"/>
-          </a:fillRef>
-          <a:effectRef idx="0">
-            <a:schemeClr val="accent1"/>
-          </a:effectRef>
-          <a:fontRef idx="minor">
-            <a:schemeClr val="tx1"/>
-          </a:fontRef>
-        </p:style>
-      </p:cxnSp>
-      <p:sp>
-        <p:nvSpPr>
-          <p:cNvPr id="17" name="TextBox 16"/>
-          <p:cNvSpPr txBox="1"/>
-          <p:nvPr/>
-        </p:nvSpPr>
-        <p:spPr>
-          <a:xfrm>
-            <a:off x="3963474" y="4678362"/>
-            <a:ext cx="1524000" cy="369332"/>
-          </a:xfrm>
-          <a:prstGeom prst="rect">
-            <a:avLst/>
-          </a:prstGeom>
-          <a:noFill/>
-        </p:spPr>
-        <p:txBody>
-          <a:bodyPr wrap="square" rtlCol="0">
-            <a:spAutoFit/>
-          </a:bodyPr>
-          <a:lstStyle/>
-          <a:p>
-            <a:pPr algn="ctr"/>
-            <a:r>
-              <a:rPr lang="de-CH" dirty="0" smtClean="0"/>
-              <a:t>IP &amp; MAC set </a:t>
-            </a:r>
-            <a:endParaRPr lang="de-CH" dirty="0"/>
-          </a:p>
-        </p:txBody>
-      </p:sp>
-      <p:cxnSp>
-        <p:nvCxnSpPr>
-          <p:cNvPr id="18" name="Straight Arrow Connector 17"/>
-          <p:cNvCxnSpPr/>
-          <p:nvPr/>
-        </p:nvCxnSpPr>
-        <p:spPr>
-          <a:xfrm>
-            <a:off x="4691130" y="4373562"/>
-            <a:ext cx="0" cy="326767"/>
-          </a:xfrm>
-          <a:prstGeom prst="straightConnector1">
-            <a:avLst/>
-          </a:prstGeom>
-          <a:ln w="28575">
-            <a:solidFill>
-              <a:schemeClr val="tx1"/>
-            </a:solidFill>
-            <a:headEnd type="triangle" w="lg" len="lg"/>
-            <a:tailEnd type="none" w="lg" len="lg"/>
-          </a:ln>
-        </p:spPr>
-        <p:style>
-          <a:lnRef idx="1">
-            <a:schemeClr val="accent1"/>
-          </a:lnRef>
-          <a:fillRef idx="0">
-            <a:schemeClr val="accent1"/>
-          </a:fillRef>
-          <a:effectRef idx="0">
-            <a:schemeClr val="accent1"/>
-          </a:effectRef>
-          <a:fontRef idx="minor">
-            <a:schemeClr val="tx1"/>
-          </a:fontRef>
-        </p:style>
-      </p:cxnSp>
-      <p:sp>
-        <p:nvSpPr>
-          <p:cNvPr id="19" name="TextBox 18"/>
-          <p:cNvSpPr txBox="1"/>
-          <p:nvPr/>
-        </p:nvSpPr>
-        <p:spPr>
-          <a:xfrm>
-            <a:off x="6215130" y="5080706"/>
-            <a:ext cx="1895879" cy="646331"/>
-          </a:xfrm>
-          <a:prstGeom prst="rect">
-            <a:avLst/>
-          </a:prstGeom>
-          <a:noFill/>
-        </p:spPr>
-        <p:txBody>
-          <a:bodyPr wrap="square" rtlCol="0">
-            <a:spAutoFit/>
-          </a:bodyPr>
-          <a:lstStyle/>
-          <a:p>
-            <a:pPr algn="ctr"/>
-            <a:r>
-              <a:rPr lang="de-CH" dirty="0" smtClean="0"/>
-              <a:t>Arp &amp; IP pkt count: 4 leds each</a:t>
-            </a:r>
-            <a:endParaRPr lang="de-CH" dirty="0"/>
-          </a:p>
-        </p:txBody>
-      </p:sp>
-      <p:cxnSp>
-        <p:nvCxnSpPr>
-          <p:cNvPr id="20" name="Straight Arrow Connector 19"/>
-          <p:cNvCxnSpPr/>
-          <p:nvPr/>
-        </p:nvCxnSpPr>
-        <p:spPr>
-          <a:xfrm>
-            <a:off x="5482108" y="4370334"/>
-            <a:ext cx="647431" cy="987371"/>
-          </a:xfrm>
-          <a:prstGeom prst="straightConnector1">
-            <a:avLst/>
-          </a:prstGeom>
-          <a:ln w="28575">
-            <a:solidFill>
-              <a:schemeClr val="tx1"/>
-            </a:solidFill>
-            <a:headEnd type="none" w="lg" len="lg"/>
-            <a:tailEnd type="triangle" w="lg" len="lg"/>
-          </a:ln>
-        </p:spPr>
-        <p:style>
-          <a:lnRef idx="1">
-            <a:schemeClr val="accent1"/>
-          </a:lnRef>
-          <a:fillRef idx="0">
-            <a:schemeClr val="accent1"/>
-          </a:fillRef>
-          <a:effectRef idx="0">
-            <a:schemeClr val="accent1"/>
-          </a:effectRef>
-          <a:fontRef idx="minor">
-            <a:schemeClr val="tx1"/>
-          </a:fontRef>
-        </p:style>
-      </p:cxnSp>
-      <p:sp>
-        <p:nvSpPr>
-          <p:cNvPr id="21" name="Rounded Rectangle 20"/>
-          <p:cNvSpPr/>
-          <p:nvPr/>
-        </p:nvSpPr>
-        <p:spPr>
-          <a:xfrm>
-            <a:off x="6215130" y="2279121"/>
-            <a:ext cx="1328670" cy="1223975"/>
-          </a:xfrm>
-          <a:prstGeom prst="roundRect">
-            <a:avLst/>
-          </a:prstGeom>
-          <a:solidFill>
-            <a:schemeClr val="accent2">
-              <a:lumMod val="60000"/>
-              <a:lumOff val="40000"/>
-            </a:schemeClr>
-          </a:solidFill>
-        </p:spPr>
-        <p:style>
-          <a:lnRef idx="2">
-            <a:schemeClr val="accent1">
-              <a:shade val="50000"/>
-            </a:schemeClr>
-          </a:lnRef>
-          <a:fillRef idx="1">
-            <a:schemeClr val="accent1"/>
-          </a:fillRef>
-          <a:effectRef idx="0">
-            <a:schemeClr val="accent1"/>
-          </a:effectRef>
-          <a:fontRef idx="minor">
-            <a:schemeClr val="lt1"/>
-          </a:fontRef>
-        </p:style>
-        <p:txBody>
-          <a:bodyPr rtlCol="0" anchor="ctr"/>
-          <a:lstStyle/>
-          <a:p>
-            <a:pPr algn="ctr"/>
-            <a:r>
-              <a:rPr lang="de-CH" dirty="0" smtClean="0"/>
-              <a:t>Xilinx mac_block</a:t>
-            </a:r>
-            <a:endParaRPr lang="de-CH" dirty="0"/>
-          </a:p>
-        </p:txBody>
-      </p:sp>
-      <p:sp>
-        <p:nvSpPr>
-          <p:cNvPr id="23" name="Oval 22"/>
-          <p:cNvSpPr/>
-          <p:nvPr/>
-        </p:nvSpPr>
-        <p:spPr>
-          <a:xfrm>
-            <a:off x="1143000" y="2177534"/>
-            <a:ext cx="1600200" cy="1708666"/>
-          </a:xfrm>
-          <a:prstGeom prst="ellipse">
-            <a:avLst/>
-          </a:prstGeom>
-          <a:solidFill>
-            <a:schemeClr val="bg2">
-              <a:lumMod val="75000"/>
-            </a:schemeClr>
-          </a:solidFill>
-        </p:spPr>
-        <p:style>
-          <a:lnRef idx="2">
-            <a:schemeClr val="accent1">
-              <a:shade val="50000"/>
-            </a:schemeClr>
-          </a:lnRef>
-          <a:fillRef idx="1">
-            <a:schemeClr val="accent1"/>
-          </a:fillRef>
-          <a:effectRef idx="0">
-            <a:schemeClr val="accent1"/>
-          </a:effectRef>
-          <a:fontRef idx="minor">
-            <a:schemeClr val="lt1"/>
-          </a:fontRef>
-        </p:style>
-        <p:txBody>
-          <a:bodyPr rtlCol="0" anchor="ctr"/>
-          <a:lstStyle/>
-          <a:p>
-            <a:pPr algn="ctr"/>
-            <a:r>
-              <a:rPr lang="de-CH" dirty="0" smtClean="0"/>
-              <a:t>TX response process</a:t>
-            </a:r>
-            <a:endParaRPr lang="de-CH" dirty="0"/>
-          </a:p>
-        </p:txBody>
-      </p:sp>
-      <p:sp>
-        <p:nvSpPr>
-          <p:cNvPr id="25" name="TextBox 24"/>
-          <p:cNvSpPr txBox="1"/>
-          <p:nvPr/>
-        </p:nvSpPr>
-        <p:spPr>
-          <a:xfrm>
-            <a:off x="228600" y="926068"/>
-            <a:ext cx="2133600" cy="369332"/>
-          </a:xfrm>
-          <a:prstGeom prst="rect">
-            <a:avLst/>
-          </a:prstGeom>
-          <a:noFill/>
-        </p:spPr>
-        <p:txBody>
-          <a:bodyPr wrap="square" rtlCol="0">
-            <a:spAutoFit/>
-          </a:bodyPr>
-          <a:lstStyle/>
-          <a:p>
-            <a:r>
-              <a:rPr lang="de-CH" dirty="0" smtClean="0"/>
-              <a:t>Xilinx ML605 board</a:t>
-            </a:r>
-            <a:endParaRPr lang="de-CH" dirty="0"/>
-          </a:p>
-        </p:txBody>
-      </p:sp>
-      <p:sp>
-        <p:nvSpPr>
-          <p:cNvPr id="26" name="TextBox 25"/>
-          <p:cNvSpPr txBox="1"/>
-          <p:nvPr/>
-        </p:nvSpPr>
-        <p:spPr>
-          <a:xfrm>
-            <a:off x="1143000" y="5029200"/>
-            <a:ext cx="1294326" cy="646331"/>
-          </a:xfrm>
-          <a:prstGeom prst="rect">
-            <a:avLst/>
-          </a:prstGeom>
-          <a:noFill/>
-        </p:spPr>
-        <p:txBody>
-          <a:bodyPr wrap="square" rtlCol="0">
-            <a:spAutoFit/>
-          </a:bodyPr>
-          <a:lstStyle/>
-          <a:p>
-            <a:r>
-              <a:rPr lang="de-CH" dirty="0" smtClean="0"/>
-              <a:t>Async TX Pushbutton </a:t>
-            </a:r>
-            <a:endParaRPr lang="de-CH" dirty="0"/>
-          </a:p>
-        </p:txBody>
-      </p:sp>
-      <p:cxnSp>
-        <p:nvCxnSpPr>
-          <p:cNvPr id="28" name="Straight Arrow Connector 27"/>
-          <p:cNvCxnSpPr>
-            <a:endCxn id="23" idx="4"/>
-          </p:cNvCxnSpPr>
-          <p:nvPr/>
-        </p:nvCxnSpPr>
-        <p:spPr>
-          <a:xfrm flipV="1">
-            <a:off x="1790163" y="3886200"/>
-            <a:ext cx="152937" cy="1371600"/>
-          </a:xfrm>
-          <a:prstGeom prst="straightConnector1">
-            <a:avLst/>
-          </a:prstGeom>
-          <a:ln>
-            <a:solidFill>
-              <a:schemeClr val="tx1"/>
-            </a:solidFill>
-            <a:tailEnd type="arrow"/>
-          </a:ln>
-        </p:spPr>
-        <p:style>
-          <a:lnRef idx="1">
-            <a:schemeClr val="accent1"/>
-          </a:lnRef>
-          <a:fillRef idx="0">
-            <a:schemeClr val="accent1"/>
-          </a:fillRef>
-          <a:effectRef idx="0">
-            <a:schemeClr val="accent1"/>
-          </a:effectRef>
-          <a:fontRef idx="minor">
-            <a:schemeClr val="tx1"/>
-          </a:fontRef>
-        </p:style>
-      </p:cxnSp>
-      <p:sp>
-        <p:nvSpPr>
-          <p:cNvPr id="52" name="Rounded Rectangle 51"/>
-          <p:cNvSpPr/>
-          <p:nvPr/>
-        </p:nvSpPr>
-        <p:spPr>
-          <a:xfrm>
-            <a:off x="8111009" y="2296445"/>
-            <a:ext cx="664335" cy="1223975"/>
-          </a:xfrm>
-          <a:prstGeom prst="roundRect">
-            <a:avLst/>
-          </a:prstGeom>
-          <a:solidFill>
-            <a:schemeClr val="accent2">
-              <a:lumMod val="60000"/>
-              <a:lumOff val="40000"/>
-            </a:schemeClr>
-          </a:solidFill>
-        </p:spPr>
-        <p:style>
-          <a:lnRef idx="2">
-            <a:schemeClr val="accent1">
-              <a:shade val="50000"/>
-            </a:schemeClr>
-          </a:lnRef>
-          <a:fillRef idx="1">
-            <a:schemeClr val="accent1"/>
-          </a:fillRef>
-          <a:effectRef idx="0">
-            <a:schemeClr val="accent1"/>
-          </a:effectRef>
-          <a:fontRef idx="minor">
-            <a:schemeClr val="lt1"/>
-          </a:fontRef>
-        </p:style>
-        <p:txBody>
-          <a:bodyPr rtlCol="0" anchor="ctr"/>
-          <a:lstStyle/>
-          <a:p>
-            <a:pPr algn="ctr"/>
-            <a:r>
-              <a:rPr lang="de-CH" dirty="0" smtClean="0"/>
-              <a:t>Eth PHY</a:t>
-            </a:r>
-            <a:endParaRPr lang="de-CH" dirty="0"/>
-          </a:p>
-        </p:txBody>
-      </p:sp>
-      <p:cxnSp>
-        <p:nvCxnSpPr>
-          <p:cNvPr id="53" name="Straight Arrow Connector 52"/>
-          <p:cNvCxnSpPr/>
-          <p:nvPr/>
-        </p:nvCxnSpPr>
-        <p:spPr>
-          <a:xfrm>
-            <a:off x="7538434" y="2628970"/>
-            <a:ext cx="572575" cy="0"/>
-          </a:xfrm>
-          <a:prstGeom prst="straightConnector1">
-            <a:avLst/>
-          </a:prstGeom>
-          <a:ln w="28575">
-            <a:solidFill>
-              <a:schemeClr val="tx1"/>
-            </a:solidFill>
-            <a:headEnd type="triangle" w="lg" len="lg"/>
-            <a:tailEnd type="triangle" w="lg" len="lg"/>
-          </a:ln>
-        </p:spPr>
-        <p:style>
-          <a:lnRef idx="1">
-            <a:schemeClr val="accent1"/>
-          </a:lnRef>
-          <a:fillRef idx="0">
-            <a:schemeClr val="accent1"/>
-          </a:fillRef>
-          <a:effectRef idx="0">
-            <a:schemeClr val="accent1"/>
-          </a:effectRef>
-          <a:fontRef idx="minor">
-            <a:schemeClr val="tx1"/>
-          </a:fontRef>
-        </p:style>
-      </p:cxnSp>
-      <p:cxnSp>
-        <p:nvCxnSpPr>
-          <p:cNvPr id="54" name="Straight Arrow Connector 53"/>
-          <p:cNvCxnSpPr/>
-          <p:nvPr/>
-        </p:nvCxnSpPr>
-        <p:spPr>
-          <a:xfrm flipV="1">
-            <a:off x="7543800" y="3147647"/>
-            <a:ext cx="567209" cy="3055"/>
-          </a:xfrm>
-          <a:prstGeom prst="straightConnector1">
-            <a:avLst/>
-          </a:prstGeom>
-          <a:ln w="28575">
-            <a:solidFill>
-              <a:schemeClr val="tx1"/>
-            </a:solidFill>
-            <a:headEnd type="triangle" w="lg" len="lg"/>
-            <a:tailEnd type="triangle" w="lg" len="lg"/>
-          </a:ln>
-        </p:spPr>
-        <p:style>
-          <a:lnRef idx="1">
-            <a:schemeClr val="accent1"/>
-          </a:lnRef>
-          <a:fillRef idx="0">
-            <a:schemeClr val="accent1"/>
-          </a:fillRef>
-          <a:effectRef idx="0">
-            <a:schemeClr val="accent1"/>
-          </a:effectRef>
-          <a:fontRef idx="minor">
-            <a:schemeClr val="tx1"/>
-          </a:fontRef>
-        </p:style>
-      </p:cxnSp>
-      <p:sp>
-        <p:nvSpPr>
-          <p:cNvPr id="59" name="Rounded Rectangle 58"/>
-          <p:cNvSpPr/>
-          <p:nvPr/>
-        </p:nvSpPr>
-        <p:spPr>
-          <a:xfrm>
-            <a:off x="685800" y="5943600"/>
-            <a:ext cx="5563674" cy="685800"/>
-          </a:xfrm>
-          <a:prstGeom prst="roundRect">
-            <a:avLst/>
-          </a:prstGeom>
-        </p:spPr>
-        <p:style>
-          <a:lnRef idx="2">
-            <a:schemeClr val="accent1">
-              <a:shade val="50000"/>
-            </a:schemeClr>
-          </a:lnRef>
-          <a:fillRef idx="1">
-            <a:schemeClr val="accent1"/>
-          </a:fillRef>
-          <a:effectRef idx="0">
-            <a:schemeClr val="accent1"/>
-          </a:effectRef>
-          <a:fontRef idx="minor">
-            <a:schemeClr val="lt1"/>
-          </a:fontRef>
-        </p:style>
-        <p:txBody>
-          <a:bodyPr rtlCol="0" anchor="ctr"/>
-          <a:lstStyle/>
-          <a:p>
-            <a:pPr algn="ctr"/>
-            <a:r>
-              <a:rPr lang="de-CH" dirty="0" smtClean="0"/>
-              <a:t>Java Test Code running on Laptop</a:t>
-            </a:r>
-            <a:endParaRPr lang="de-CH" dirty="0"/>
-          </a:p>
-        </p:txBody>
-      </p:sp>
-      <p:cxnSp>
-        <p:nvCxnSpPr>
-          <p:cNvPr id="61" name="Elbow Connector 60"/>
-          <p:cNvCxnSpPr>
-            <a:endCxn id="59" idx="3"/>
-          </p:cNvCxnSpPr>
-          <p:nvPr/>
-        </p:nvCxnSpPr>
-        <p:spPr>
-          <a:xfrm rot="5400000">
-            <a:off x="5963285" y="3806609"/>
-            <a:ext cx="2766080" cy="2193702"/>
-          </a:xfrm>
-          <a:prstGeom prst="bentConnector2">
-            <a:avLst/>
-          </a:prstGeom>
-          <a:ln w="76200">
-            <a:solidFill>
-              <a:srgbClr val="00B050"/>
-            </a:solidFill>
-            <a:headEnd type="triangle" w="med" len="lg"/>
-            <a:tailEnd type="triangle" w="med" len="lg"/>
-          </a:ln>
-        </p:spPr>
-        <p:style>
-          <a:lnRef idx="1">
-            <a:schemeClr val="accent1"/>
-          </a:lnRef>
-          <a:fillRef idx="0">
-            <a:schemeClr val="accent1"/>
-          </a:fillRef>
-          <a:effectRef idx="0">
-            <a:schemeClr val="accent1"/>
-          </a:effectRef>
-          <a:fontRef idx="minor">
-            <a:schemeClr val="tx1"/>
-          </a:fontRef>
-        </p:style>
-      </p:cxnSp>
-      <p:sp>
-        <p:nvSpPr>
-          <p:cNvPr id="62" name="TextBox 61"/>
-          <p:cNvSpPr txBox="1"/>
-          <p:nvPr/>
-        </p:nvSpPr>
-        <p:spPr>
-          <a:xfrm>
-            <a:off x="4876800" y="1295400"/>
-            <a:ext cx="2777009" cy="369332"/>
-          </a:xfrm>
-          <a:prstGeom prst="rect">
-            <a:avLst/>
-          </a:prstGeom>
-          <a:noFill/>
-        </p:spPr>
-        <p:txBody>
-          <a:bodyPr wrap="square" rtlCol="0">
-            <a:spAutoFit/>
-          </a:bodyPr>
-          <a:lstStyle/>
-          <a:p>
-            <a:r>
-              <a:rPr lang="de-CH" dirty="0" smtClean="0"/>
-              <a:t>UDP_integration_example</a:t>
-            </a:r>
-            <a:endParaRPr lang="de-CH" dirty="0"/>
-          </a:p>
-        </p:txBody>
-      </p:sp>
-      <p:sp>
-        <p:nvSpPr>
-          <p:cNvPr id="63" name="TextBox 62"/>
-          <p:cNvSpPr txBox="1"/>
-          <p:nvPr/>
-        </p:nvSpPr>
-        <p:spPr>
-          <a:xfrm>
-            <a:off x="6879465" y="5943600"/>
-            <a:ext cx="1231544" cy="369332"/>
-          </a:xfrm>
-          <a:prstGeom prst="rect">
-            <a:avLst/>
-          </a:prstGeom>
-          <a:noFill/>
-        </p:spPr>
-        <p:txBody>
-          <a:bodyPr wrap="square" rtlCol="0">
-            <a:spAutoFit/>
-          </a:bodyPr>
-          <a:lstStyle/>
-          <a:p>
-            <a:r>
-              <a:rPr lang="de-CH" dirty="0" smtClean="0"/>
-              <a:t>network</a:t>
-            </a:r>
-            <a:endParaRPr lang="de-CH" dirty="0"/>
+              <a:rPr lang="de-CH" sz="2000" dirty="0" smtClean="0"/>
+              <a:t>The HW testbench is built around the Xilinx ML-605 prototyping card.</a:t>
+            </a:r>
+          </a:p>
+          <a:p>
+            <a:r>
+              <a:rPr lang="de-CH" sz="2000" dirty="0" smtClean="0"/>
+              <a:t>It directly uses the card’s 200MHz clocks, Eth PHY (copper) and LEDs to indicate status.</a:t>
+            </a:r>
+          </a:p>
+          <a:p>
+            <a:r>
+              <a:rPr lang="de-CH" sz="2000" dirty="0" smtClean="0"/>
+              <a:t>A simple VHDL driver module for the stack replies with a canned response whenever it receives a UDP pkt on a particular IP addr and port number.</a:t>
+            </a:r>
+          </a:p>
+          <a:p>
+            <a:r>
+              <a:rPr lang="de-CH" sz="2000" dirty="0" smtClean="0"/>
+              <a:t>The Xilinx </a:t>
+            </a:r>
+            <a:r>
+              <a:rPr lang="de-CH" sz="2000" b="1" dirty="0"/>
+              <a:t>LogiCORE IP </a:t>
+            </a:r>
+            <a:r>
+              <a:rPr lang="de-CH" sz="2000" b="1" dirty="0" smtClean="0"/>
+              <a:t>Virtex-6 FPGA </a:t>
+            </a:r>
+            <a:r>
+              <a:rPr lang="de-CH" sz="2000" b="1" dirty="0"/>
+              <a:t>Embedded </a:t>
+            </a:r>
+            <a:r>
+              <a:rPr lang="de-CH" sz="2000" b="1" dirty="0" smtClean="0"/>
+              <a:t>Tri-Mode Ethernet </a:t>
+            </a:r>
+            <a:r>
+              <a:rPr lang="de-CH" sz="2000" b="1" dirty="0"/>
+              <a:t>MAC </a:t>
+            </a:r>
+            <a:r>
+              <a:rPr lang="de-CH" sz="2000" b="1" dirty="0" smtClean="0"/>
+              <a:t>v2.1 </a:t>
+            </a:r>
+            <a:r>
+              <a:rPr lang="de-CH" sz="2000" dirty="0" smtClean="0"/>
+              <a:t>is used to couple the UDP/IP stack to the board’s Ethernet PHY. This is used with the standard FIFO user buffering (which adds a one-frame delay). It should be possible also to remove this FIFO to reduce latency.</a:t>
+            </a:r>
+          </a:p>
+          <a:p>
+            <a:r>
+              <a:rPr lang="de-CH" sz="2000" dirty="0" smtClean="0"/>
+              <a:t>A laptop provides stimulus by way of one of two Java programs: </a:t>
+            </a:r>
+          </a:p>
+          <a:p>
+            <a:pPr lvl="1"/>
+            <a:r>
+              <a:rPr lang="de-CH" sz="1600" dirty="0" smtClean="0"/>
+              <a:t>UDPTest.java – writes one UDP pkt and waits for a response then prints it</a:t>
+            </a:r>
+          </a:p>
+          <a:p>
+            <a:pPr lvl="1"/>
+            <a:r>
+              <a:rPr lang="de-CH" sz="1600" dirty="0" smtClean="0"/>
+              <a:t>UDPTestStream.java – writes a number of UDP pkts and prints responses</a:t>
+            </a:r>
+          </a:p>
+          <a:p>
+            <a:r>
+              <a:rPr lang="de-CH" sz="2000" dirty="0" smtClean="0"/>
+              <a:t>The test network is a single twisted CAT-6 cable between the laptop and the ML-605 board.</a:t>
+            </a:r>
+          </a:p>
+          <a:p>
+            <a:r>
+              <a:rPr lang="de-CH" sz="2000" dirty="0" smtClean="0"/>
+              <a:t>Wireshark (on the laptop) is used to capture the traffic on the wire (sample pcap files are included)</a:t>
+            </a:r>
+            <a:endParaRPr lang="de-CH" sz="2000" dirty="0"/>
           </a:p>
         </p:txBody>
       </p:sp>
     </p:spTree>
     <p:extLst>
       <p:ext uri="{BB962C8B-B14F-4D97-AF65-F5344CB8AC3E}">
-        <p14:creationId xmlns:p14="http://schemas.microsoft.com/office/powerpoint/2010/main" val="706190098"/>
+        <p14:creationId xmlns:p14="http://schemas.microsoft.com/office/powerpoint/2010/main" val="1368178966"/>
       </p:ext>
     </p:extLst>
   </p:cSld>
@@ -7359,6 +6391,1076 @@
       </p:grpSpPr>
       <p:sp>
         <p:nvSpPr>
+          <p:cNvPr id="24" name="Rectangle 23"/>
+          <p:cNvSpPr/>
+          <p:nvPr/>
+        </p:nvSpPr>
+        <p:spPr>
+          <a:xfrm>
+            <a:off x="228600" y="944562"/>
+            <a:ext cx="8686800" cy="4782475"/>
+          </a:xfrm>
+          <a:prstGeom prst="rect">
+            <a:avLst/>
+          </a:prstGeom>
+          <a:solidFill>
+            <a:schemeClr val="bg1">
+              <a:lumMod val="85000"/>
+            </a:schemeClr>
+          </a:solidFill>
+        </p:spPr>
+        <p:style>
+          <a:lnRef idx="2">
+            <a:schemeClr val="accent1">
+              <a:shade val="50000"/>
+            </a:schemeClr>
+          </a:lnRef>
+          <a:fillRef idx="1">
+            <a:schemeClr val="accent1"/>
+          </a:fillRef>
+          <a:effectRef idx="0">
+            <a:schemeClr val="accent1"/>
+          </a:effectRef>
+          <a:fontRef idx="minor">
+            <a:schemeClr val="lt1"/>
+          </a:fontRef>
+        </p:style>
+        <p:txBody>
+          <a:bodyPr rtlCol="0" anchor="ctr"/>
+          <a:lstStyle/>
+          <a:p>
+            <a:pPr algn="ctr"/>
+            <a:endParaRPr lang="de-CH" dirty="0"/>
+          </a:p>
+        </p:txBody>
+      </p:sp>
+      <p:sp>
+        <p:nvSpPr>
+          <p:cNvPr id="22" name="Rounded Rectangle 21"/>
+          <p:cNvSpPr/>
+          <p:nvPr/>
+        </p:nvSpPr>
+        <p:spPr>
+          <a:xfrm>
+            <a:off x="914400" y="1371600"/>
+            <a:ext cx="7010400" cy="3655496"/>
+          </a:xfrm>
+          <a:prstGeom prst="roundRect">
+            <a:avLst/>
+          </a:prstGeom>
+          <a:solidFill>
+            <a:schemeClr val="bg1">
+              <a:lumMod val="65000"/>
+            </a:schemeClr>
+          </a:solidFill>
+        </p:spPr>
+        <p:style>
+          <a:lnRef idx="2">
+            <a:schemeClr val="accent1">
+              <a:shade val="50000"/>
+            </a:schemeClr>
+          </a:lnRef>
+          <a:fillRef idx="1">
+            <a:schemeClr val="accent1"/>
+          </a:fillRef>
+          <a:effectRef idx="0">
+            <a:schemeClr val="accent1"/>
+          </a:effectRef>
+          <a:fontRef idx="minor">
+            <a:schemeClr val="lt1"/>
+          </a:fontRef>
+        </p:style>
+        <p:txBody>
+          <a:bodyPr rtlCol="0" anchor="ctr"/>
+          <a:lstStyle/>
+          <a:p>
+            <a:pPr algn="ctr"/>
+            <a:endParaRPr lang="de-CH"/>
+          </a:p>
+        </p:txBody>
+      </p:sp>
+      <p:sp>
+        <p:nvSpPr>
+          <p:cNvPr id="2" name="Title 1"/>
+          <p:cNvSpPr>
+            <a:spLocks noGrp="1"/>
+          </p:cNvSpPr>
+          <p:nvPr>
+            <p:ph type="title"/>
+          </p:nvPr>
+        </p:nvSpPr>
+        <p:spPr>
+          <a:xfrm>
+            <a:off x="457200" y="122238"/>
+            <a:ext cx="8229600" cy="639762"/>
+          </a:xfrm>
+        </p:spPr>
+        <p:txBody>
+          <a:bodyPr>
+            <a:normAutofit/>
+          </a:bodyPr>
+          <a:lstStyle/>
+          <a:p>
+            <a:r>
+              <a:rPr lang="de-CH" dirty="0" smtClean="0"/>
+              <a:t>Test Setup</a:t>
+            </a:r>
+            <a:endParaRPr lang="de-CH" dirty="0"/>
+          </a:p>
+        </p:txBody>
+      </p:sp>
+      <p:sp>
+        <p:nvSpPr>
+          <p:cNvPr id="4" name="Rounded Rectangle 3"/>
+          <p:cNvSpPr/>
+          <p:nvPr/>
+        </p:nvSpPr>
+        <p:spPr>
+          <a:xfrm>
+            <a:off x="3505200" y="1782762"/>
+            <a:ext cx="1981200" cy="2590800"/>
+          </a:xfrm>
+          <a:prstGeom prst="roundRect">
+            <a:avLst/>
+          </a:prstGeom>
+        </p:spPr>
+        <p:style>
+          <a:lnRef idx="2">
+            <a:schemeClr val="accent1">
+              <a:shade val="50000"/>
+            </a:schemeClr>
+          </a:lnRef>
+          <a:fillRef idx="1">
+            <a:schemeClr val="accent1"/>
+          </a:fillRef>
+          <a:effectRef idx="0">
+            <a:schemeClr val="accent1"/>
+          </a:effectRef>
+          <a:fontRef idx="minor">
+            <a:schemeClr val="lt1"/>
+          </a:fontRef>
+        </p:style>
+        <p:txBody>
+          <a:bodyPr rtlCol="0" anchor="ctr"/>
+          <a:lstStyle/>
+          <a:p>
+            <a:pPr algn="ctr"/>
+            <a:r>
+              <a:rPr lang="de-CH" dirty="0" smtClean="0"/>
+              <a:t>UDP_Complete_nomac</a:t>
+            </a:r>
+            <a:endParaRPr lang="de-CH" dirty="0"/>
+          </a:p>
+        </p:txBody>
+      </p:sp>
+      <p:cxnSp>
+        <p:nvCxnSpPr>
+          <p:cNvPr id="5" name="Straight Arrow Connector 4"/>
+          <p:cNvCxnSpPr/>
+          <p:nvPr/>
+        </p:nvCxnSpPr>
+        <p:spPr>
+          <a:xfrm>
+            <a:off x="2743200" y="2789390"/>
+            <a:ext cx="762000" cy="0"/>
+          </a:xfrm>
+          <a:prstGeom prst="straightConnector1">
+            <a:avLst/>
+          </a:prstGeom>
+          <a:ln w="28575">
+            <a:solidFill>
+              <a:schemeClr val="tx1"/>
+            </a:solidFill>
+            <a:headEnd type="triangle" w="lg" len="lg"/>
+            <a:tailEnd type="triangle" w="lg" len="lg"/>
+          </a:ln>
+        </p:spPr>
+        <p:style>
+          <a:lnRef idx="1">
+            <a:schemeClr val="accent1"/>
+          </a:lnRef>
+          <a:fillRef idx="0">
+            <a:schemeClr val="accent1"/>
+          </a:fillRef>
+          <a:effectRef idx="0">
+            <a:schemeClr val="accent1"/>
+          </a:effectRef>
+          <a:fontRef idx="minor">
+            <a:schemeClr val="tx1"/>
+          </a:fontRef>
+        </p:style>
+      </p:cxnSp>
+      <p:sp>
+        <p:nvSpPr>
+          <p:cNvPr id="6" name="TextBox 5"/>
+          <p:cNvSpPr txBox="1"/>
+          <p:nvPr/>
+        </p:nvSpPr>
+        <p:spPr>
+          <a:xfrm>
+            <a:off x="2667000" y="2373868"/>
+            <a:ext cx="1524000" cy="369332"/>
+          </a:xfrm>
+          <a:prstGeom prst="rect">
+            <a:avLst/>
+          </a:prstGeom>
+          <a:noFill/>
+        </p:spPr>
+        <p:txBody>
+          <a:bodyPr wrap="square" rtlCol="0">
+            <a:spAutoFit/>
+          </a:bodyPr>
+          <a:lstStyle/>
+          <a:p>
+            <a:r>
+              <a:rPr lang="de-CH" dirty="0" smtClean="0"/>
+              <a:t>UDP TX</a:t>
+            </a:r>
+            <a:endParaRPr lang="de-CH" dirty="0"/>
+          </a:p>
+        </p:txBody>
+      </p:sp>
+      <p:cxnSp>
+        <p:nvCxnSpPr>
+          <p:cNvPr id="7" name="Straight Arrow Connector 6"/>
+          <p:cNvCxnSpPr/>
+          <p:nvPr/>
+        </p:nvCxnSpPr>
+        <p:spPr>
+          <a:xfrm>
+            <a:off x="2743200" y="3304091"/>
+            <a:ext cx="762000" cy="0"/>
+          </a:xfrm>
+          <a:prstGeom prst="straightConnector1">
+            <a:avLst/>
+          </a:prstGeom>
+          <a:ln w="28575">
+            <a:solidFill>
+              <a:schemeClr val="tx1"/>
+            </a:solidFill>
+            <a:headEnd type="triangle" w="lg" len="lg"/>
+            <a:tailEnd type="triangle" w="lg" len="lg"/>
+          </a:ln>
+        </p:spPr>
+        <p:style>
+          <a:lnRef idx="1">
+            <a:schemeClr val="accent1"/>
+          </a:lnRef>
+          <a:fillRef idx="0">
+            <a:schemeClr val="accent1"/>
+          </a:fillRef>
+          <a:effectRef idx="0">
+            <a:schemeClr val="accent1"/>
+          </a:effectRef>
+          <a:fontRef idx="minor">
+            <a:schemeClr val="tx1"/>
+          </a:fontRef>
+        </p:style>
+      </p:cxnSp>
+      <p:sp>
+        <p:nvSpPr>
+          <p:cNvPr id="8" name="TextBox 7"/>
+          <p:cNvSpPr txBox="1"/>
+          <p:nvPr/>
+        </p:nvSpPr>
+        <p:spPr>
+          <a:xfrm>
+            <a:off x="2667000" y="3386558"/>
+            <a:ext cx="1524000" cy="369332"/>
+          </a:xfrm>
+          <a:prstGeom prst="rect">
+            <a:avLst/>
+          </a:prstGeom>
+          <a:noFill/>
+        </p:spPr>
+        <p:txBody>
+          <a:bodyPr wrap="square" rtlCol="0">
+            <a:spAutoFit/>
+          </a:bodyPr>
+          <a:lstStyle/>
+          <a:p>
+            <a:r>
+              <a:rPr lang="de-CH" dirty="0" smtClean="0"/>
+              <a:t>UDP RX</a:t>
+            </a:r>
+            <a:endParaRPr lang="de-CH" dirty="0"/>
+          </a:p>
+        </p:txBody>
+      </p:sp>
+      <p:sp>
+        <p:nvSpPr>
+          <p:cNvPr id="11" name="TextBox 10"/>
+          <p:cNvSpPr txBox="1"/>
+          <p:nvPr/>
+        </p:nvSpPr>
+        <p:spPr>
+          <a:xfrm>
+            <a:off x="2624070" y="5034540"/>
+            <a:ext cx="1033530" cy="646331"/>
+          </a:xfrm>
+          <a:prstGeom prst="rect">
+            <a:avLst/>
+          </a:prstGeom>
+          <a:noFill/>
+        </p:spPr>
+        <p:txBody>
+          <a:bodyPr wrap="square" rtlCol="0">
+            <a:spAutoFit/>
+          </a:bodyPr>
+          <a:lstStyle/>
+          <a:p>
+            <a:pPr algn="ctr"/>
+            <a:r>
+              <a:rPr lang="de-CH" dirty="0" smtClean="0"/>
+              <a:t>Clocks &amp; reset</a:t>
+            </a:r>
+            <a:endParaRPr lang="de-CH" dirty="0"/>
+          </a:p>
+        </p:txBody>
+      </p:sp>
+      <p:cxnSp>
+        <p:nvCxnSpPr>
+          <p:cNvPr id="12" name="Straight Arrow Connector 11"/>
+          <p:cNvCxnSpPr/>
+          <p:nvPr/>
+        </p:nvCxnSpPr>
+        <p:spPr>
+          <a:xfrm>
+            <a:off x="5482108" y="2625915"/>
+            <a:ext cx="762000" cy="0"/>
+          </a:xfrm>
+          <a:prstGeom prst="straightConnector1">
+            <a:avLst/>
+          </a:prstGeom>
+          <a:ln w="28575">
+            <a:solidFill>
+              <a:schemeClr val="tx1"/>
+            </a:solidFill>
+            <a:headEnd type="triangle" w="lg" len="lg"/>
+            <a:tailEnd type="triangle" w="lg" len="lg"/>
+          </a:ln>
+        </p:spPr>
+        <p:style>
+          <a:lnRef idx="1">
+            <a:schemeClr val="accent1"/>
+          </a:lnRef>
+          <a:fillRef idx="0">
+            <a:schemeClr val="accent1"/>
+          </a:fillRef>
+          <a:effectRef idx="0">
+            <a:schemeClr val="accent1"/>
+          </a:effectRef>
+          <a:fontRef idx="minor">
+            <a:schemeClr val="tx1"/>
+          </a:fontRef>
+        </p:style>
+      </p:cxnSp>
+      <p:cxnSp>
+        <p:nvCxnSpPr>
+          <p:cNvPr id="14" name="Straight Arrow Connector 13"/>
+          <p:cNvCxnSpPr/>
+          <p:nvPr/>
+        </p:nvCxnSpPr>
+        <p:spPr>
+          <a:xfrm>
+            <a:off x="5487474" y="3147647"/>
+            <a:ext cx="762000" cy="0"/>
+          </a:xfrm>
+          <a:prstGeom prst="straightConnector1">
+            <a:avLst/>
+          </a:prstGeom>
+          <a:ln w="28575">
+            <a:solidFill>
+              <a:schemeClr val="tx1"/>
+            </a:solidFill>
+            <a:headEnd type="triangle" w="lg" len="lg"/>
+            <a:tailEnd type="triangle" w="lg" len="lg"/>
+          </a:ln>
+        </p:spPr>
+        <p:style>
+          <a:lnRef idx="1">
+            <a:schemeClr val="accent1"/>
+          </a:lnRef>
+          <a:fillRef idx="0">
+            <a:schemeClr val="accent1"/>
+          </a:fillRef>
+          <a:effectRef idx="0">
+            <a:schemeClr val="accent1"/>
+          </a:effectRef>
+          <a:fontRef idx="minor">
+            <a:schemeClr val="tx1"/>
+          </a:fontRef>
+        </p:style>
+      </p:cxnSp>
+      <p:cxnSp>
+        <p:nvCxnSpPr>
+          <p:cNvPr id="16" name="Straight Arrow Connector 15"/>
+          <p:cNvCxnSpPr/>
+          <p:nvPr/>
+        </p:nvCxnSpPr>
+        <p:spPr>
+          <a:xfrm flipH="1">
+            <a:off x="3140835" y="4370334"/>
+            <a:ext cx="516765" cy="887466"/>
+          </a:xfrm>
+          <a:prstGeom prst="straightConnector1">
+            <a:avLst/>
+          </a:prstGeom>
+          <a:ln w="28575">
+            <a:solidFill>
+              <a:schemeClr val="tx1"/>
+            </a:solidFill>
+            <a:headEnd type="triangle" w="lg" len="lg"/>
+            <a:tailEnd type="none" w="lg" len="lg"/>
+          </a:ln>
+        </p:spPr>
+        <p:style>
+          <a:lnRef idx="1">
+            <a:schemeClr val="accent1"/>
+          </a:lnRef>
+          <a:fillRef idx="0">
+            <a:schemeClr val="accent1"/>
+          </a:fillRef>
+          <a:effectRef idx="0">
+            <a:schemeClr val="accent1"/>
+          </a:effectRef>
+          <a:fontRef idx="minor">
+            <a:schemeClr val="tx1"/>
+          </a:fontRef>
+        </p:style>
+      </p:cxnSp>
+      <p:sp>
+        <p:nvSpPr>
+          <p:cNvPr id="17" name="TextBox 16"/>
+          <p:cNvSpPr txBox="1"/>
+          <p:nvPr/>
+        </p:nvSpPr>
+        <p:spPr>
+          <a:xfrm>
+            <a:off x="3963474" y="4678362"/>
+            <a:ext cx="1524000" cy="369332"/>
+          </a:xfrm>
+          <a:prstGeom prst="rect">
+            <a:avLst/>
+          </a:prstGeom>
+          <a:noFill/>
+        </p:spPr>
+        <p:txBody>
+          <a:bodyPr wrap="square" rtlCol="0">
+            <a:spAutoFit/>
+          </a:bodyPr>
+          <a:lstStyle/>
+          <a:p>
+            <a:pPr algn="ctr"/>
+            <a:r>
+              <a:rPr lang="de-CH" dirty="0" smtClean="0"/>
+              <a:t>IP &amp; MAC set </a:t>
+            </a:r>
+            <a:endParaRPr lang="de-CH" dirty="0"/>
+          </a:p>
+        </p:txBody>
+      </p:sp>
+      <p:cxnSp>
+        <p:nvCxnSpPr>
+          <p:cNvPr id="18" name="Straight Arrow Connector 17"/>
+          <p:cNvCxnSpPr/>
+          <p:nvPr/>
+        </p:nvCxnSpPr>
+        <p:spPr>
+          <a:xfrm>
+            <a:off x="4691130" y="4373562"/>
+            <a:ext cx="0" cy="326767"/>
+          </a:xfrm>
+          <a:prstGeom prst="straightConnector1">
+            <a:avLst/>
+          </a:prstGeom>
+          <a:ln w="28575">
+            <a:solidFill>
+              <a:schemeClr val="tx1"/>
+            </a:solidFill>
+            <a:headEnd type="triangle" w="lg" len="lg"/>
+            <a:tailEnd type="none" w="lg" len="lg"/>
+          </a:ln>
+        </p:spPr>
+        <p:style>
+          <a:lnRef idx="1">
+            <a:schemeClr val="accent1"/>
+          </a:lnRef>
+          <a:fillRef idx="0">
+            <a:schemeClr val="accent1"/>
+          </a:fillRef>
+          <a:effectRef idx="0">
+            <a:schemeClr val="accent1"/>
+          </a:effectRef>
+          <a:fontRef idx="minor">
+            <a:schemeClr val="tx1"/>
+          </a:fontRef>
+        </p:style>
+      </p:cxnSp>
+      <p:sp>
+        <p:nvSpPr>
+          <p:cNvPr id="19" name="TextBox 18"/>
+          <p:cNvSpPr txBox="1"/>
+          <p:nvPr/>
+        </p:nvSpPr>
+        <p:spPr>
+          <a:xfrm>
+            <a:off x="6215130" y="5080706"/>
+            <a:ext cx="1895879" cy="646331"/>
+          </a:xfrm>
+          <a:prstGeom prst="rect">
+            <a:avLst/>
+          </a:prstGeom>
+          <a:noFill/>
+        </p:spPr>
+        <p:txBody>
+          <a:bodyPr wrap="square" rtlCol="0">
+            <a:spAutoFit/>
+          </a:bodyPr>
+          <a:lstStyle/>
+          <a:p>
+            <a:pPr algn="ctr"/>
+            <a:r>
+              <a:rPr lang="de-CH" dirty="0" smtClean="0"/>
+              <a:t>Arp &amp; IP pkt count: 4 leds each</a:t>
+            </a:r>
+            <a:endParaRPr lang="de-CH" dirty="0"/>
+          </a:p>
+        </p:txBody>
+      </p:sp>
+      <p:cxnSp>
+        <p:nvCxnSpPr>
+          <p:cNvPr id="20" name="Straight Arrow Connector 19"/>
+          <p:cNvCxnSpPr/>
+          <p:nvPr/>
+        </p:nvCxnSpPr>
+        <p:spPr>
+          <a:xfrm>
+            <a:off x="5482108" y="4370334"/>
+            <a:ext cx="647431" cy="987371"/>
+          </a:xfrm>
+          <a:prstGeom prst="straightConnector1">
+            <a:avLst/>
+          </a:prstGeom>
+          <a:ln w="28575">
+            <a:solidFill>
+              <a:schemeClr val="tx1"/>
+            </a:solidFill>
+            <a:headEnd type="none" w="lg" len="lg"/>
+            <a:tailEnd type="triangle" w="lg" len="lg"/>
+          </a:ln>
+        </p:spPr>
+        <p:style>
+          <a:lnRef idx="1">
+            <a:schemeClr val="accent1"/>
+          </a:lnRef>
+          <a:fillRef idx="0">
+            <a:schemeClr val="accent1"/>
+          </a:fillRef>
+          <a:effectRef idx="0">
+            <a:schemeClr val="accent1"/>
+          </a:effectRef>
+          <a:fontRef idx="minor">
+            <a:schemeClr val="tx1"/>
+          </a:fontRef>
+        </p:style>
+      </p:cxnSp>
+      <p:sp>
+        <p:nvSpPr>
+          <p:cNvPr id="21" name="Rounded Rectangle 20"/>
+          <p:cNvSpPr/>
+          <p:nvPr/>
+        </p:nvSpPr>
+        <p:spPr>
+          <a:xfrm>
+            <a:off x="6215129" y="2279121"/>
+            <a:ext cx="1438679" cy="1223975"/>
+          </a:xfrm>
+          <a:prstGeom prst="roundRect">
+            <a:avLst/>
+          </a:prstGeom>
+          <a:solidFill>
+            <a:schemeClr val="accent2">
+              <a:lumMod val="60000"/>
+              <a:lumOff val="40000"/>
+            </a:schemeClr>
+          </a:solidFill>
+        </p:spPr>
+        <p:style>
+          <a:lnRef idx="2">
+            <a:schemeClr val="accent1">
+              <a:shade val="50000"/>
+            </a:schemeClr>
+          </a:lnRef>
+          <a:fillRef idx="1">
+            <a:schemeClr val="accent1"/>
+          </a:fillRef>
+          <a:effectRef idx="0">
+            <a:schemeClr val="accent1"/>
+          </a:effectRef>
+          <a:fontRef idx="minor">
+            <a:schemeClr val="lt1"/>
+          </a:fontRef>
+        </p:style>
+        <p:txBody>
+          <a:bodyPr rtlCol="0" anchor="ctr"/>
+          <a:lstStyle/>
+          <a:p>
+            <a:pPr algn="ctr"/>
+            <a:r>
+              <a:rPr lang="de-CH" dirty="0" smtClean="0"/>
+              <a:t>Xilinx mac_block</a:t>
+            </a:r>
+            <a:endParaRPr lang="de-CH" dirty="0"/>
+          </a:p>
+        </p:txBody>
+      </p:sp>
+      <p:sp>
+        <p:nvSpPr>
+          <p:cNvPr id="23" name="Oval 22"/>
+          <p:cNvSpPr/>
+          <p:nvPr/>
+        </p:nvSpPr>
+        <p:spPr>
+          <a:xfrm>
+            <a:off x="1143000" y="2177534"/>
+            <a:ext cx="1600200" cy="1708666"/>
+          </a:xfrm>
+          <a:prstGeom prst="ellipse">
+            <a:avLst/>
+          </a:prstGeom>
+          <a:solidFill>
+            <a:schemeClr val="bg2">
+              <a:lumMod val="75000"/>
+            </a:schemeClr>
+          </a:solidFill>
+        </p:spPr>
+        <p:style>
+          <a:lnRef idx="2">
+            <a:schemeClr val="accent1">
+              <a:shade val="50000"/>
+            </a:schemeClr>
+          </a:lnRef>
+          <a:fillRef idx="1">
+            <a:schemeClr val="accent1"/>
+          </a:fillRef>
+          <a:effectRef idx="0">
+            <a:schemeClr val="accent1"/>
+          </a:effectRef>
+          <a:fontRef idx="minor">
+            <a:schemeClr val="lt1"/>
+          </a:fontRef>
+        </p:style>
+        <p:txBody>
+          <a:bodyPr rtlCol="0" anchor="ctr"/>
+          <a:lstStyle/>
+          <a:p>
+            <a:pPr algn="ctr"/>
+            <a:r>
+              <a:rPr lang="de-CH" dirty="0" smtClean="0"/>
+              <a:t>TX response process</a:t>
+            </a:r>
+            <a:endParaRPr lang="de-CH" dirty="0"/>
+          </a:p>
+        </p:txBody>
+      </p:sp>
+      <p:sp>
+        <p:nvSpPr>
+          <p:cNvPr id="25" name="TextBox 24"/>
+          <p:cNvSpPr txBox="1"/>
+          <p:nvPr/>
+        </p:nvSpPr>
+        <p:spPr>
+          <a:xfrm>
+            <a:off x="228600" y="926068"/>
+            <a:ext cx="2133600" cy="369332"/>
+          </a:xfrm>
+          <a:prstGeom prst="rect">
+            <a:avLst/>
+          </a:prstGeom>
+          <a:noFill/>
+        </p:spPr>
+        <p:txBody>
+          <a:bodyPr wrap="square" rtlCol="0">
+            <a:spAutoFit/>
+          </a:bodyPr>
+          <a:lstStyle/>
+          <a:p>
+            <a:r>
+              <a:rPr lang="de-CH" dirty="0" smtClean="0"/>
+              <a:t>Xilinx ML605 board</a:t>
+            </a:r>
+            <a:endParaRPr lang="de-CH" dirty="0"/>
+          </a:p>
+        </p:txBody>
+      </p:sp>
+      <p:sp>
+        <p:nvSpPr>
+          <p:cNvPr id="26" name="TextBox 25"/>
+          <p:cNvSpPr txBox="1"/>
+          <p:nvPr/>
+        </p:nvSpPr>
+        <p:spPr>
+          <a:xfrm>
+            <a:off x="1143000" y="5029200"/>
+            <a:ext cx="1294326" cy="646331"/>
+          </a:xfrm>
+          <a:prstGeom prst="rect">
+            <a:avLst/>
+          </a:prstGeom>
+          <a:noFill/>
+        </p:spPr>
+        <p:txBody>
+          <a:bodyPr wrap="square" rtlCol="0">
+            <a:spAutoFit/>
+          </a:bodyPr>
+          <a:lstStyle/>
+          <a:p>
+            <a:r>
+              <a:rPr lang="de-CH" dirty="0" smtClean="0"/>
+              <a:t>Async TX Pushbutton </a:t>
+            </a:r>
+            <a:endParaRPr lang="de-CH" dirty="0"/>
+          </a:p>
+        </p:txBody>
+      </p:sp>
+      <p:cxnSp>
+        <p:nvCxnSpPr>
+          <p:cNvPr id="28" name="Straight Arrow Connector 27"/>
+          <p:cNvCxnSpPr>
+            <a:endCxn id="23" idx="4"/>
+          </p:cNvCxnSpPr>
+          <p:nvPr/>
+        </p:nvCxnSpPr>
+        <p:spPr>
+          <a:xfrm flipV="1">
+            <a:off x="1790163" y="3886200"/>
+            <a:ext cx="152937" cy="1371600"/>
+          </a:xfrm>
+          <a:prstGeom prst="straightConnector1">
+            <a:avLst/>
+          </a:prstGeom>
+          <a:ln>
+            <a:solidFill>
+              <a:schemeClr val="tx1"/>
+            </a:solidFill>
+            <a:tailEnd type="arrow"/>
+          </a:ln>
+        </p:spPr>
+        <p:style>
+          <a:lnRef idx="1">
+            <a:schemeClr val="accent1"/>
+          </a:lnRef>
+          <a:fillRef idx="0">
+            <a:schemeClr val="accent1"/>
+          </a:fillRef>
+          <a:effectRef idx="0">
+            <a:schemeClr val="accent1"/>
+          </a:effectRef>
+          <a:fontRef idx="minor">
+            <a:schemeClr val="tx1"/>
+          </a:fontRef>
+        </p:style>
+      </p:cxnSp>
+      <p:sp>
+        <p:nvSpPr>
+          <p:cNvPr id="52" name="Rounded Rectangle 51"/>
+          <p:cNvSpPr/>
+          <p:nvPr/>
+        </p:nvSpPr>
+        <p:spPr>
+          <a:xfrm>
+            <a:off x="8111009" y="2296445"/>
+            <a:ext cx="664335" cy="1223975"/>
+          </a:xfrm>
+          <a:prstGeom prst="roundRect">
+            <a:avLst/>
+          </a:prstGeom>
+          <a:solidFill>
+            <a:schemeClr val="accent2">
+              <a:lumMod val="60000"/>
+              <a:lumOff val="40000"/>
+            </a:schemeClr>
+          </a:solidFill>
+        </p:spPr>
+        <p:style>
+          <a:lnRef idx="2">
+            <a:schemeClr val="accent1">
+              <a:shade val="50000"/>
+            </a:schemeClr>
+          </a:lnRef>
+          <a:fillRef idx="1">
+            <a:schemeClr val="accent1"/>
+          </a:fillRef>
+          <a:effectRef idx="0">
+            <a:schemeClr val="accent1"/>
+          </a:effectRef>
+          <a:fontRef idx="minor">
+            <a:schemeClr val="lt1"/>
+          </a:fontRef>
+        </p:style>
+        <p:txBody>
+          <a:bodyPr rtlCol="0" anchor="ctr"/>
+          <a:lstStyle/>
+          <a:p>
+            <a:pPr algn="ctr"/>
+            <a:r>
+              <a:rPr lang="de-CH" dirty="0" smtClean="0"/>
+              <a:t>Eth PHY</a:t>
+            </a:r>
+            <a:endParaRPr lang="de-CH" dirty="0"/>
+          </a:p>
+        </p:txBody>
+      </p:sp>
+      <p:cxnSp>
+        <p:nvCxnSpPr>
+          <p:cNvPr id="53" name="Straight Arrow Connector 52"/>
+          <p:cNvCxnSpPr/>
+          <p:nvPr/>
+        </p:nvCxnSpPr>
+        <p:spPr>
+          <a:xfrm>
+            <a:off x="7538434" y="2628970"/>
+            <a:ext cx="572575" cy="0"/>
+          </a:xfrm>
+          <a:prstGeom prst="straightConnector1">
+            <a:avLst/>
+          </a:prstGeom>
+          <a:ln w="28575">
+            <a:solidFill>
+              <a:schemeClr val="tx1"/>
+            </a:solidFill>
+            <a:headEnd type="triangle" w="lg" len="lg"/>
+            <a:tailEnd type="triangle" w="lg" len="lg"/>
+          </a:ln>
+        </p:spPr>
+        <p:style>
+          <a:lnRef idx="1">
+            <a:schemeClr val="accent1"/>
+          </a:lnRef>
+          <a:fillRef idx="0">
+            <a:schemeClr val="accent1"/>
+          </a:fillRef>
+          <a:effectRef idx="0">
+            <a:schemeClr val="accent1"/>
+          </a:effectRef>
+          <a:fontRef idx="minor">
+            <a:schemeClr val="tx1"/>
+          </a:fontRef>
+        </p:style>
+      </p:cxnSp>
+      <p:cxnSp>
+        <p:nvCxnSpPr>
+          <p:cNvPr id="54" name="Straight Arrow Connector 53"/>
+          <p:cNvCxnSpPr/>
+          <p:nvPr/>
+        </p:nvCxnSpPr>
+        <p:spPr>
+          <a:xfrm flipV="1">
+            <a:off x="7543800" y="3147647"/>
+            <a:ext cx="567209" cy="3055"/>
+          </a:xfrm>
+          <a:prstGeom prst="straightConnector1">
+            <a:avLst/>
+          </a:prstGeom>
+          <a:ln w="28575">
+            <a:solidFill>
+              <a:schemeClr val="tx1"/>
+            </a:solidFill>
+            <a:headEnd type="triangle" w="lg" len="lg"/>
+            <a:tailEnd type="triangle" w="lg" len="lg"/>
+          </a:ln>
+        </p:spPr>
+        <p:style>
+          <a:lnRef idx="1">
+            <a:schemeClr val="accent1"/>
+          </a:lnRef>
+          <a:fillRef idx="0">
+            <a:schemeClr val="accent1"/>
+          </a:fillRef>
+          <a:effectRef idx="0">
+            <a:schemeClr val="accent1"/>
+          </a:effectRef>
+          <a:fontRef idx="minor">
+            <a:schemeClr val="tx1"/>
+          </a:fontRef>
+        </p:style>
+      </p:cxnSp>
+      <p:sp>
+        <p:nvSpPr>
+          <p:cNvPr id="59" name="Rounded Rectangle 58"/>
+          <p:cNvSpPr/>
+          <p:nvPr/>
+        </p:nvSpPr>
+        <p:spPr>
+          <a:xfrm>
+            <a:off x="685800" y="5943600"/>
+            <a:ext cx="5563674" cy="685800"/>
+          </a:xfrm>
+          <a:prstGeom prst="roundRect">
+            <a:avLst/>
+          </a:prstGeom>
+        </p:spPr>
+        <p:style>
+          <a:lnRef idx="2">
+            <a:schemeClr val="accent1">
+              <a:shade val="50000"/>
+            </a:schemeClr>
+          </a:lnRef>
+          <a:fillRef idx="1">
+            <a:schemeClr val="accent1"/>
+          </a:fillRef>
+          <a:effectRef idx="0">
+            <a:schemeClr val="accent1"/>
+          </a:effectRef>
+          <a:fontRef idx="minor">
+            <a:schemeClr val="lt1"/>
+          </a:fontRef>
+        </p:style>
+        <p:txBody>
+          <a:bodyPr rtlCol="0" anchor="ctr"/>
+          <a:lstStyle/>
+          <a:p>
+            <a:pPr algn="ctr"/>
+            <a:r>
+              <a:rPr lang="de-CH" dirty="0" smtClean="0"/>
+              <a:t>Java Test Code running on Laptop</a:t>
+            </a:r>
+            <a:endParaRPr lang="de-CH" dirty="0"/>
+          </a:p>
+        </p:txBody>
+      </p:sp>
+      <p:cxnSp>
+        <p:nvCxnSpPr>
+          <p:cNvPr id="61" name="Elbow Connector 60"/>
+          <p:cNvCxnSpPr>
+            <a:endCxn id="59" idx="3"/>
+          </p:cNvCxnSpPr>
+          <p:nvPr/>
+        </p:nvCxnSpPr>
+        <p:spPr>
+          <a:xfrm rot="5400000">
+            <a:off x="5963285" y="3806609"/>
+            <a:ext cx="2766080" cy="2193702"/>
+          </a:xfrm>
+          <a:prstGeom prst="bentConnector2">
+            <a:avLst/>
+          </a:prstGeom>
+          <a:ln w="76200">
+            <a:solidFill>
+              <a:srgbClr val="00B050"/>
+            </a:solidFill>
+            <a:headEnd type="triangle" w="med" len="lg"/>
+            <a:tailEnd type="triangle" w="med" len="lg"/>
+          </a:ln>
+        </p:spPr>
+        <p:style>
+          <a:lnRef idx="1">
+            <a:schemeClr val="accent1"/>
+          </a:lnRef>
+          <a:fillRef idx="0">
+            <a:schemeClr val="accent1"/>
+          </a:fillRef>
+          <a:effectRef idx="0">
+            <a:schemeClr val="accent1"/>
+          </a:effectRef>
+          <a:fontRef idx="minor">
+            <a:schemeClr val="tx1"/>
+          </a:fontRef>
+        </p:style>
+      </p:cxnSp>
+      <p:sp>
+        <p:nvSpPr>
+          <p:cNvPr id="62" name="TextBox 61"/>
+          <p:cNvSpPr txBox="1"/>
+          <p:nvPr/>
+        </p:nvSpPr>
+        <p:spPr>
+          <a:xfrm>
+            <a:off x="4876800" y="1295400"/>
+            <a:ext cx="2777009" cy="369332"/>
+          </a:xfrm>
+          <a:prstGeom prst="rect">
+            <a:avLst/>
+          </a:prstGeom>
+          <a:noFill/>
+        </p:spPr>
+        <p:txBody>
+          <a:bodyPr wrap="square" rtlCol="0">
+            <a:spAutoFit/>
+          </a:bodyPr>
+          <a:lstStyle/>
+          <a:p>
+            <a:r>
+              <a:rPr lang="de-CH" dirty="0" smtClean="0"/>
+              <a:t>UDP_integration_example</a:t>
+            </a:r>
+            <a:endParaRPr lang="de-CH" dirty="0"/>
+          </a:p>
+        </p:txBody>
+      </p:sp>
+      <p:sp>
+        <p:nvSpPr>
+          <p:cNvPr id="63" name="TextBox 62"/>
+          <p:cNvSpPr txBox="1"/>
+          <p:nvPr/>
+        </p:nvSpPr>
+        <p:spPr>
+          <a:xfrm>
+            <a:off x="6879465" y="5943600"/>
+            <a:ext cx="1231544" cy="369332"/>
+          </a:xfrm>
+          <a:prstGeom prst="rect">
+            <a:avLst/>
+          </a:prstGeom>
+          <a:noFill/>
+        </p:spPr>
+        <p:txBody>
+          <a:bodyPr wrap="square" rtlCol="0">
+            <a:spAutoFit/>
+          </a:bodyPr>
+          <a:lstStyle/>
+          <a:p>
+            <a:r>
+              <a:rPr lang="de-CH" dirty="0" smtClean="0"/>
+              <a:t>network</a:t>
+            </a:r>
+            <a:endParaRPr lang="de-CH" dirty="0"/>
+          </a:p>
+        </p:txBody>
+      </p:sp>
+    </p:spTree>
+    <p:extLst>
+      <p:ext uri="{BB962C8B-B14F-4D97-AF65-F5344CB8AC3E}">
+        <p14:creationId xmlns:p14="http://schemas.microsoft.com/office/powerpoint/2010/main" val="706190098"/>
+      </p:ext>
+    </p:extLst>
+  </p:cSld>
+  <p:clrMapOvr>
+    <a:masterClrMapping/>
+  </p:clrMapOvr>
+</p:sld>
+</file>
+
+<file path=ppt/slides/slide21.xml><?xml version="1.0" encoding="utf-8"?>
+<p:sld xmlns:a="http://schemas.openxmlformats.org/drawingml/2006/main" xmlns:r="http://schemas.openxmlformats.org/officeDocument/2006/relationships" xmlns:p="http://schemas.openxmlformats.org/presentationml/2006/main">
+  <p:cSld>
+    <p:spTree>
+      <p:nvGrpSpPr>
+        <p:cNvPr id="1" name=""/>
+        <p:cNvGrpSpPr/>
+        <p:nvPr/>
+      </p:nvGrpSpPr>
+      <p:grpSpPr>
+        <a:xfrm>
+          <a:off x="0" y="0"/>
+          <a:ext cx="0" cy="0"/>
+          <a:chOff x="0" y="0"/>
+          <a:chExt cx="0" cy="0"/>
+        </a:xfrm>
+      </p:grpSpPr>
+      <p:sp>
+        <p:nvSpPr>
           <p:cNvPr id="2" name="Title 1"/>
           <p:cNvSpPr>
             <a:spLocks noGrp="1"/>
@@ -7440,7 +7542,7 @@
 </p:sld>
 </file>
 
-<file path=ppt/slides/slide21.xml><?xml version="1.0" encoding="utf-8"?>
+<file path=ppt/slides/slide22.xml><?xml version="1.0" encoding="utf-8"?>
 <p:sld xmlns:a="http://schemas.openxmlformats.org/drawingml/2006/main" xmlns:r="http://schemas.openxmlformats.org/officeDocument/2006/relationships" xmlns:p="http://schemas.openxmlformats.org/presentationml/2006/main">
   <p:cSld>
     <p:spTree>
@@ -11081,42 +11183,34 @@
               <a:spcBef>
                 <a:spcPts val="0"/>
               </a:spcBef>
-              <a:buNone/>
             </a:pPr>
             <a:r>
+              <a:rPr lang="de-CH" sz="1000" dirty="0" smtClean="0">
+                <a:latin typeface="Courier New" pitchFamily="49" charset="0"/>
+                <a:cs typeface="Courier New" pitchFamily="49" charset="0"/>
+              </a:rPr>
+              <a:t>	mac_tx_tfirst  : </a:t>
+            </a:r>
+            <a:r>
               <a:rPr lang="de-CH" sz="1000" dirty="0">
                 <a:latin typeface="Courier New" pitchFamily="49" charset="0"/>
                 <a:cs typeface="Courier New" pitchFamily="49" charset="0"/>
               </a:rPr>
-              <a:t>	</a:t>
+              <a:t>out  std_logic;			-- indicates </a:t>
             </a:r>
             <a:r>
               <a:rPr lang="de-CH" sz="1000" dirty="0" smtClean="0">
                 <a:latin typeface="Courier New" pitchFamily="49" charset="0"/>
                 <a:cs typeface="Courier New" pitchFamily="49" charset="0"/>
               </a:rPr>
-              <a:t>mac_tx_tlast   : </a:t>
+              <a:t>firstbyte </a:t>
             </a:r>
             <a:r>
               <a:rPr lang="de-CH" sz="1000" dirty="0">
                 <a:latin typeface="Courier New" pitchFamily="49" charset="0"/>
                 <a:cs typeface="Courier New" pitchFamily="49" charset="0"/>
               </a:rPr>
-              <a:t>out  std_logic;		</a:t>
-            </a:r>
-            <a:r>
-              <a:rPr lang="de-CH" sz="1000" dirty="0" smtClean="0">
-                <a:latin typeface="Courier New" pitchFamily="49" charset="0"/>
-                <a:cs typeface="Courier New" pitchFamily="49" charset="0"/>
-              </a:rPr>
-              <a:t>	-- </a:t>
-            </a:r>
-            <a:r>
-              <a:rPr lang="de-CH" sz="1000" dirty="0">
-                <a:latin typeface="Courier New" pitchFamily="49" charset="0"/>
-                <a:cs typeface="Courier New" pitchFamily="49" charset="0"/>
-              </a:rPr>
-              <a:t>indicates last byte of frame</a:t>
+              <a:t>of frame</a:t>
             </a:r>
           </a:p>
           <a:p>
@@ -11138,23 +11232,31 @@
             </a:r>
             <a:r>
               <a:rPr lang="de-CH" sz="1000" dirty="0" smtClean="0">
-                <a:solidFill>
-                  <a:srgbClr val="00B050"/>
-                </a:solidFill>
-                <a:latin typeface="Courier New" pitchFamily="49" charset="0"/>
-                <a:cs typeface="Courier New" pitchFamily="49" charset="0"/>
-              </a:rPr>
-              <a:t>-- </a:t>
+                <a:latin typeface="Courier New" pitchFamily="49" charset="0"/>
+                <a:cs typeface="Courier New" pitchFamily="49" charset="0"/>
+              </a:rPr>
+              <a:t>mac_tx_tlast   : </a:t>
             </a:r>
             <a:r>
               <a:rPr lang="de-CH" sz="1000" dirty="0">
-                <a:solidFill>
-                  <a:srgbClr val="00B050"/>
-                </a:solidFill>
-                <a:latin typeface="Courier New" pitchFamily="49" charset="0"/>
-                <a:cs typeface="Courier New" pitchFamily="49" charset="0"/>
-              </a:rPr>
-              <a:t>MAC Receiver</a:t>
+                <a:latin typeface="Courier New" pitchFamily="49" charset="0"/>
+                <a:cs typeface="Courier New" pitchFamily="49" charset="0"/>
+              </a:rPr>
+              <a:t>out  std_logic;		</a:t>
+            </a:r>
+            <a:r>
+              <a:rPr lang="de-CH" sz="1000" dirty="0" smtClean="0">
+                <a:latin typeface="Courier New" pitchFamily="49" charset="0"/>
+                <a:cs typeface="Courier New" pitchFamily="49" charset="0"/>
+              </a:rPr>
+              <a:t>	-- </a:t>
+            </a:r>
+            <a:r>
+              <a:rPr lang="de-CH" sz="1000" dirty="0">
+                <a:latin typeface="Courier New" pitchFamily="49" charset="0"/>
+                <a:cs typeface="Courier New" pitchFamily="49" charset="0"/>
+              </a:rPr>
+              <a:t>indicates last byte of frame</a:t>
             </a:r>
           </a:p>
           <a:p>
@@ -11176,17 +11278,23 @@
             </a:r>
             <a:r>
               <a:rPr lang="de-CH" sz="1000" dirty="0" smtClean="0">
-                <a:latin typeface="Courier New" pitchFamily="49" charset="0"/>
-                <a:cs typeface="Courier New" pitchFamily="49" charset="0"/>
-              </a:rPr>
-              <a:t>mac_rx_tdata   : </a:t>
+                <a:solidFill>
+                  <a:srgbClr val="00B050"/>
+                </a:solidFill>
+                <a:latin typeface="Courier New" pitchFamily="49" charset="0"/>
+                <a:cs typeface="Courier New" pitchFamily="49" charset="0"/>
+              </a:rPr>
+              <a:t>-- </a:t>
             </a:r>
             <a:r>
               <a:rPr lang="de-CH" sz="1000" dirty="0">
-                <a:latin typeface="Courier New" pitchFamily="49" charset="0"/>
-                <a:cs typeface="Courier New" pitchFamily="49" charset="0"/>
-              </a:rPr>
-              <a:t>in std_logic_vector(7 downto 0);	-- data byte received</a:t>
+                <a:solidFill>
+                  <a:srgbClr val="00B050"/>
+                </a:solidFill>
+                <a:latin typeface="Courier New" pitchFamily="49" charset="0"/>
+                <a:cs typeface="Courier New" pitchFamily="49" charset="0"/>
+              </a:rPr>
+              <a:t>MAC Receiver</a:t>
             </a:r>
           </a:p>
           <a:p>
@@ -11211,28 +11319,14 @@
                 <a:latin typeface="Courier New" pitchFamily="49" charset="0"/>
                 <a:cs typeface="Courier New" pitchFamily="49" charset="0"/>
               </a:rPr>
-              <a:t>mac_rx_tvalid  : </a:t>
+              <a:t>mac_rx_tdata   : </a:t>
             </a:r>
             <a:r>
               <a:rPr lang="de-CH" sz="1000" dirty="0">
                 <a:latin typeface="Courier New" pitchFamily="49" charset="0"/>
                 <a:cs typeface="Courier New" pitchFamily="49" charset="0"/>
               </a:rPr>
-              <a:t>in std_logic;		</a:t>
-            </a:r>
-            <a:r>
-              <a:rPr lang="de-CH" sz="1000" dirty="0" smtClean="0">
-                <a:latin typeface="Courier New" pitchFamily="49" charset="0"/>
-                <a:cs typeface="Courier New" pitchFamily="49" charset="0"/>
-              </a:rPr>
-              <a:t>	-- </a:t>
-            </a:r>
-            <a:r>
-              <a:rPr lang="de-CH" sz="1000" dirty="0">
-                <a:latin typeface="Courier New" pitchFamily="49" charset="0"/>
-                <a:cs typeface="Courier New" pitchFamily="49" charset="0"/>
-              </a:rPr>
-              <a:t>indicates tdata is valid</a:t>
+              <a:t>in std_logic_vector(7 downto 0);	-- data byte received</a:t>
             </a:r>
           </a:p>
           <a:p>
@@ -11257,6 +11351,52 @@
                 <a:latin typeface="Courier New" pitchFamily="49" charset="0"/>
                 <a:cs typeface="Courier New" pitchFamily="49" charset="0"/>
               </a:rPr>
+              <a:t>mac_rx_tvalid  : </a:t>
+            </a:r>
+            <a:r>
+              <a:rPr lang="de-CH" sz="1000" dirty="0">
+                <a:latin typeface="Courier New" pitchFamily="49" charset="0"/>
+                <a:cs typeface="Courier New" pitchFamily="49" charset="0"/>
+              </a:rPr>
+              <a:t>in std_logic;		</a:t>
+            </a:r>
+            <a:r>
+              <a:rPr lang="de-CH" sz="1000" dirty="0" smtClean="0">
+                <a:latin typeface="Courier New" pitchFamily="49" charset="0"/>
+                <a:cs typeface="Courier New" pitchFamily="49" charset="0"/>
+              </a:rPr>
+              <a:t>	-- </a:t>
+            </a:r>
+            <a:r>
+              <a:rPr lang="de-CH" sz="1000" dirty="0">
+                <a:latin typeface="Courier New" pitchFamily="49" charset="0"/>
+                <a:cs typeface="Courier New" pitchFamily="49" charset="0"/>
+              </a:rPr>
+              <a:t>indicates tdata is valid</a:t>
+            </a:r>
+          </a:p>
+          <a:p>
+            <a:pPr marL="0" indent="0">
+              <a:lnSpc>
+                <a:spcPct val="120000"/>
+              </a:lnSpc>
+              <a:spcBef>
+                <a:spcPts val="0"/>
+              </a:spcBef>
+              <a:buNone/>
+            </a:pPr>
+            <a:r>
+              <a:rPr lang="de-CH" sz="1000" dirty="0">
+                <a:latin typeface="Courier New" pitchFamily="49" charset="0"/>
+                <a:cs typeface="Courier New" pitchFamily="49" charset="0"/>
+              </a:rPr>
+              <a:t>	</a:t>
+            </a:r>
+            <a:r>
+              <a:rPr lang="de-CH" sz="1000" dirty="0" smtClean="0">
+                <a:latin typeface="Courier New" pitchFamily="49" charset="0"/>
+                <a:cs typeface="Courier New" pitchFamily="49" charset="0"/>
+              </a:rPr>
               <a:t>mac_rx_tready  : </a:t>
             </a:r>
             <a:r>
@@ -11271,7 +11411,7 @@
                 <a:latin typeface="Courier New" pitchFamily="49" charset="0"/>
                 <a:cs typeface="Courier New" pitchFamily="49" charset="0"/>
               </a:rPr>
-              <a:t>-- </a:t>
+              <a:t>	-- </a:t>
             </a:r>
             <a:r>
               <a:rPr lang="de-CH" sz="1000" dirty="0">
@@ -11895,7 +12035,7 @@
           <a:p>
             <a:r>
               <a:rPr lang="de-CH" dirty="0" smtClean="0"/>
-              <a:t>Synthesis Stats</a:t>
+              <a:t>MAC Interface</a:t>
             </a:r>
             <a:endParaRPr lang="de-CH" dirty="0"/>
           </a:p>
@@ -11903,66 +12043,1091 @@
       </p:sp>
       <p:sp>
         <p:nvSpPr>
-          <p:cNvPr id="3" name="Content Placeholder 2"/>
-          <p:cNvSpPr>
-            <a:spLocks noGrp="1"/>
-          </p:cNvSpPr>
-          <p:nvPr>
-            <p:ph idx="1"/>
-          </p:nvPr>
-        </p:nvSpPr>
-        <p:spPr/>
-        <p:txBody>
-          <a:bodyPr/>
-          <a:lstStyle/>
-          <a:p>
-            <a:r>
-              <a:rPr lang="de-CH" dirty="0" smtClean="0"/>
-              <a:t>504 occupied </a:t>
-            </a:r>
-            <a:r>
-              <a:rPr lang="de-CH" dirty="0" smtClean="0"/>
-              <a:t>slices on Xilinx xc6vlx240t  (1%)</a:t>
-            </a:r>
-          </a:p>
-          <a:p>
-            <a:r>
-              <a:rPr lang="de-CH" dirty="0" smtClean="0"/>
-              <a:t>(621 flipflops</a:t>
-            </a:r>
-            <a:r>
-              <a:rPr lang="de-CH" dirty="0" smtClean="0"/>
-              <a:t>, </a:t>
-            </a:r>
-            <a:r>
-              <a:rPr lang="de-CH" dirty="0" smtClean="0"/>
-              <a:t>1243 LUTs</a:t>
-            </a:r>
-            <a:r>
-              <a:rPr lang="de-CH" dirty="0" smtClean="0"/>
-              <a:t>)</a:t>
-            </a:r>
-          </a:p>
-          <a:p>
-            <a:r>
-              <a:rPr lang="de-CH" dirty="0" smtClean="0"/>
-              <a:t>Test synthesis using </a:t>
-            </a:r>
-          </a:p>
-          <a:p>
-            <a:pPr lvl="1"/>
-            <a:r>
-              <a:rPr lang="de-CH" dirty="0" smtClean="0"/>
-              <a:t>Xilinx ISE 13.2</a:t>
-            </a:r>
-            <a:endParaRPr lang="de-CH" dirty="0"/>
+          <p:cNvPr id="4" name="TextBox 3"/>
+          <p:cNvSpPr txBox="1"/>
+          <p:nvPr/>
+        </p:nvSpPr>
+        <p:spPr>
+          <a:xfrm>
+            <a:off x="381000" y="914400"/>
+            <a:ext cx="8077200" cy="2123658"/>
+          </a:xfrm>
+          <a:prstGeom prst="rect">
+            <a:avLst/>
+          </a:prstGeom>
+          <a:noFill/>
+        </p:spPr>
+        <p:txBody>
+          <a:bodyPr wrap="square" rtlCol="0">
+            <a:spAutoFit/>
+          </a:bodyPr>
+          <a:lstStyle/>
+          <a:p>
+            <a:r>
+              <a:rPr lang="de-CH" sz="1200" dirty="0" smtClean="0"/>
+              <a:t>The MAC interface is fairly simple with separate clocks for receiver and transmitter. Each interface (RX and TX) is based on the AXI interface and has an 8-bit data bus, a valid signal, a last byte signal, and a backchannel signal to indicate that the other end is ready to accept data. </a:t>
+            </a:r>
+          </a:p>
+          <a:p>
+            <a:endParaRPr lang="de-CH" sz="1200" dirty="0"/>
+          </a:p>
+          <a:p>
+            <a:r>
+              <a:rPr lang="de-CH" sz="1200" dirty="0" smtClean="0"/>
+              <a:t>The Transmit interface has an additional signal (</a:t>
+            </a:r>
+            <a:r>
+              <a:rPr lang="de-CH" sz="1200" dirty="0" smtClean="0">
+                <a:latin typeface="Courier New" pitchFamily="49" charset="0"/>
+                <a:cs typeface="Courier New" pitchFamily="49" charset="0"/>
+              </a:rPr>
+              <a:t>mac_tx_tfirst) </a:t>
+            </a:r>
+            <a:r>
+              <a:rPr lang="de-CH" sz="1200" dirty="0" smtClean="0"/>
+              <a:t>which can be used by MAC blocks that need something to indicate the start of frame. This signal is asserted simulaneous with the first byte to be transmitted (providing that tready is high).</a:t>
+            </a:r>
+          </a:p>
+          <a:p>
+            <a:endParaRPr lang="de-CH" sz="1200" dirty="0"/>
+          </a:p>
+          <a:p>
+            <a:r>
+              <a:rPr lang="de-CH" sz="1200" dirty="0" smtClean="0"/>
+              <a:t>On the following diagram, tx_clk and rx_clk are shown sourced from the MAC transmit and receive blocks, but can come from an independent clock generator that feeds clocks to both the MAC blocks and the UDP_IP_stack. Data is clocked on the rising edge.</a:t>
+            </a:r>
+            <a:endParaRPr lang="de-CH" sz="1200" dirty="0"/>
+          </a:p>
+        </p:txBody>
+      </p:sp>
+      <p:sp>
+        <p:nvSpPr>
+          <p:cNvPr id="5" name="Rounded Rectangle 4"/>
+          <p:cNvSpPr/>
+          <p:nvPr/>
+        </p:nvSpPr>
+        <p:spPr>
+          <a:xfrm>
+            <a:off x="990600" y="3276600"/>
+            <a:ext cx="6858000" cy="3276600"/>
+          </a:xfrm>
+          <a:prstGeom prst="roundRect">
+            <a:avLst>
+              <a:gd name="adj" fmla="val 4000"/>
+            </a:avLst>
+          </a:prstGeom>
+          <a:solidFill>
+            <a:schemeClr val="accent1">
+              <a:lumMod val="40000"/>
+              <a:lumOff val="60000"/>
+            </a:schemeClr>
+          </a:solidFill>
+        </p:spPr>
+        <p:style>
+          <a:lnRef idx="2">
+            <a:schemeClr val="accent1">
+              <a:shade val="50000"/>
+            </a:schemeClr>
+          </a:lnRef>
+          <a:fillRef idx="1">
+            <a:schemeClr val="accent1"/>
+          </a:fillRef>
+          <a:effectRef idx="0">
+            <a:schemeClr val="accent1"/>
+          </a:effectRef>
+          <a:fontRef idx="minor">
+            <a:schemeClr val="lt1"/>
+          </a:fontRef>
+        </p:style>
+        <p:txBody>
+          <a:bodyPr rtlCol="0" anchor="ctr"/>
+          <a:lstStyle/>
+          <a:p>
+            <a:pPr algn="ctr"/>
+            <a:endParaRPr lang="de-CH"/>
+          </a:p>
+        </p:txBody>
+      </p:sp>
+      <p:sp>
+        <p:nvSpPr>
+          <p:cNvPr id="6" name="Rectangle 5"/>
+          <p:cNvSpPr/>
+          <p:nvPr/>
+        </p:nvSpPr>
+        <p:spPr>
+          <a:xfrm>
+            <a:off x="1600200" y="3581400"/>
+            <a:ext cx="2057400" cy="2667000"/>
+          </a:xfrm>
+          <a:prstGeom prst="rect">
+            <a:avLst/>
+          </a:prstGeom>
+          <a:solidFill>
+            <a:schemeClr val="accent4">
+              <a:lumMod val="40000"/>
+              <a:lumOff val="60000"/>
+            </a:schemeClr>
+          </a:solidFill>
+        </p:spPr>
+        <p:style>
+          <a:lnRef idx="2">
+            <a:schemeClr val="accent1">
+              <a:shade val="50000"/>
+            </a:schemeClr>
+          </a:lnRef>
+          <a:fillRef idx="1">
+            <a:schemeClr val="accent1"/>
+          </a:fillRef>
+          <a:effectRef idx="0">
+            <a:schemeClr val="accent1"/>
+          </a:effectRef>
+          <a:fontRef idx="minor">
+            <a:schemeClr val="lt1"/>
+          </a:fontRef>
+        </p:style>
+        <p:txBody>
+          <a:bodyPr rtlCol="0" anchor="ctr"/>
+          <a:lstStyle/>
+          <a:p>
+            <a:pPr algn="ctr"/>
+            <a:endParaRPr lang="de-CH"/>
+          </a:p>
+        </p:txBody>
+      </p:sp>
+      <p:sp>
+        <p:nvSpPr>
+          <p:cNvPr id="7" name="TextBox 6"/>
+          <p:cNvSpPr txBox="1"/>
+          <p:nvPr/>
+        </p:nvSpPr>
+        <p:spPr>
+          <a:xfrm>
+            <a:off x="1714500" y="3677368"/>
+            <a:ext cx="1828800" cy="246221"/>
+          </a:xfrm>
+          <a:prstGeom prst="rect">
+            <a:avLst/>
+          </a:prstGeom>
+          <a:noFill/>
+        </p:spPr>
+        <p:txBody>
+          <a:bodyPr wrap="square" rtlCol="0">
+            <a:spAutoFit/>
+          </a:bodyPr>
+          <a:lstStyle/>
+          <a:p>
+            <a:r>
+              <a:rPr lang="de-CH" sz="1000" dirty="0" smtClean="0"/>
+              <a:t>UDP_IP_Stack</a:t>
+            </a:r>
+            <a:endParaRPr lang="de-CH" sz="1000" dirty="0"/>
+          </a:p>
+        </p:txBody>
+      </p:sp>
+      <p:sp>
+        <p:nvSpPr>
+          <p:cNvPr id="8" name="Rounded Rectangle 7"/>
+          <p:cNvSpPr/>
+          <p:nvPr/>
+        </p:nvSpPr>
+        <p:spPr>
+          <a:xfrm>
+            <a:off x="5791200" y="3581400"/>
+            <a:ext cx="1219200" cy="1143000"/>
+          </a:xfrm>
+          <a:prstGeom prst="roundRect">
+            <a:avLst/>
+          </a:prstGeom>
+          <a:solidFill>
+            <a:schemeClr val="accent3">
+              <a:lumMod val="40000"/>
+              <a:lumOff val="60000"/>
+            </a:schemeClr>
+          </a:solidFill>
+        </p:spPr>
+        <p:style>
+          <a:lnRef idx="2">
+            <a:schemeClr val="accent1">
+              <a:shade val="50000"/>
+            </a:schemeClr>
+          </a:lnRef>
+          <a:fillRef idx="1">
+            <a:schemeClr val="accent1"/>
+          </a:fillRef>
+          <a:effectRef idx="0">
+            <a:schemeClr val="accent1"/>
+          </a:effectRef>
+          <a:fontRef idx="minor">
+            <a:schemeClr val="lt1"/>
+          </a:fontRef>
+        </p:style>
+        <p:txBody>
+          <a:bodyPr rtlCol="0" anchor="ctr"/>
+          <a:lstStyle/>
+          <a:p>
+            <a:pPr algn="ctr"/>
+            <a:endParaRPr lang="de-CH"/>
+          </a:p>
+        </p:txBody>
+      </p:sp>
+      <p:cxnSp>
+        <p:nvCxnSpPr>
+          <p:cNvPr id="10" name="Straight Arrow Connector 9"/>
+          <p:cNvCxnSpPr/>
+          <p:nvPr/>
+        </p:nvCxnSpPr>
+        <p:spPr>
+          <a:xfrm>
+            <a:off x="3657600" y="3733800"/>
+            <a:ext cx="2133600" cy="0"/>
+          </a:xfrm>
+          <a:prstGeom prst="straightConnector1">
+            <a:avLst/>
+          </a:prstGeom>
+          <a:ln>
+            <a:solidFill>
+              <a:schemeClr val="accent3">
+                <a:lumMod val="75000"/>
+              </a:schemeClr>
+            </a:solidFill>
+            <a:tailEnd type="arrow"/>
+          </a:ln>
+        </p:spPr>
+        <p:style>
+          <a:lnRef idx="1">
+            <a:schemeClr val="accent1"/>
+          </a:lnRef>
+          <a:fillRef idx="0">
+            <a:schemeClr val="accent1"/>
+          </a:fillRef>
+          <a:effectRef idx="0">
+            <a:schemeClr val="accent1"/>
+          </a:effectRef>
+          <a:fontRef idx="minor">
+            <a:schemeClr val="tx1"/>
+          </a:fontRef>
+        </p:style>
+      </p:cxnSp>
+      <p:sp>
+        <p:nvSpPr>
+          <p:cNvPr id="11" name="TextBox 10"/>
+          <p:cNvSpPr txBox="1"/>
+          <p:nvPr/>
+        </p:nvSpPr>
+        <p:spPr>
+          <a:xfrm>
+            <a:off x="4191000" y="3561952"/>
+            <a:ext cx="838200" cy="230832"/>
+          </a:xfrm>
+          <a:prstGeom prst="rect">
+            <a:avLst/>
+          </a:prstGeom>
+          <a:noFill/>
+        </p:spPr>
+        <p:txBody>
+          <a:bodyPr wrap="square" rtlCol="0">
+            <a:spAutoFit/>
+          </a:bodyPr>
+          <a:lstStyle/>
+          <a:p>
+            <a:r>
+              <a:rPr lang="de-CH" sz="900" dirty="0" smtClean="0"/>
+              <a:t>Data (7..0)</a:t>
+            </a:r>
+            <a:endParaRPr lang="de-CH" sz="900" dirty="0"/>
+          </a:p>
+        </p:txBody>
+      </p:sp>
+      <p:cxnSp>
+        <p:nvCxnSpPr>
+          <p:cNvPr id="12" name="Straight Arrow Connector 11"/>
+          <p:cNvCxnSpPr/>
+          <p:nvPr/>
+        </p:nvCxnSpPr>
+        <p:spPr>
+          <a:xfrm>
+            <a:off x="3657600" y="3886200"/>
+            <a:ext cx="2133600" cy="0"/>
+          </a:xfrm>
+          <a:prstGeom prst="straightConnector1">
+            <a:avLst/>
+          </a:prstGeom>
+          <a:ln>
+            <a:solidFill>
+              <a:schemeClr val="accent3">
+                <a:lumMod val="75000"/>
+              </a:schemeClr>
+            </a:solidFill>
+            <a:tailEnd type="arrow"/>
+          </a:ln>
+        </p:spPr>
+        <p:style>
+          <a:lnRef idx="1">
+            <a:schemeClr val="accent1"/>
+          </a:lnRef>
+          <a:fillRef idx="0">
+            <a:schemeClr val="accent1"/>
+          </a:fillRef>
+          <a:effectRef idx="0">
+            <a:schemeClr val="accent1"/>
+          </a:effectRef>
+          <a:fontRef idx="minor">
+            <a:schemeClr val="tx1"/>
+          </a:fontRef>
+        </p:style>
+      </p:cxnSp>
+      <p:sp>
+        <p:nvSpPr>
+          <p:cNvPr id="13" name="TextBox 12"/>
+          <p:cNvSpPr txBox="1"/>
+          <p:nvPr/>
+        </p:nvSpPr>
+        <p:spPr>
+          <a:xfrm>
+            <a:off x="4191000" y="3714352"/>
+            <a:ext cx="838200" cy="230832"/>
+          </a:xfrm>
+          <a:prstGeom prst="rect">
+            <a:avLst/>
+          </a:prstGeom>
+          <a:noFill/>
+        </p:spPr>
+        <p:txBody>
+          <a:bodyPr wrap="square" rtlCol="0">
+            <a:spAutoFit/>
+          </a:bodyPr>
+          <a:lstStyle/>
+          <a:p>
+            <a:r>
+              <a:rPr lang="de-CH" sz="900" dirty="0" smtClean="0"/>
+              <a:t>valid</a:t>
+            </a:r>
+            <a:endParaRPr lang="de-CH" sz="900" dirty="0"/>
+          </a:p>
+        </p:txBody>
+      </p:sp>
+      <p:cxnSp>
+        <p:nvCxnSpPr>
+          <p:cNvPr id="14" name="Straight Arrow Connector 13"/>
+          <p:cNvCxnSpPr/>
+          <p:nvPr/>
+        </p:nvCxnSpPr>
+        <p:spPr>
+          <a:xfrm>
+            <a:off x="3657600" y="4038600"/>
+            <a:ext cx="2133600" cy="0"/>
+          </a:xfrm>
+          <a:prstGeom prst="straightConnector1">
+            <a:avLst/>
+          </a:prstGeom>
+          <a:ln>
+            <a:solidFill>
+              <a:schemeClr val="accent3">
+                <a:lumMod val="75000"/>
+              </a:schemeClr>
+            </a:solidFill>
+            <a:tailEnd type="arrow"/>
+          </a:ln>
+        </p:spPr>
+        <p:style>
+          <a:lnRef idx="1">
+            <a:schemeClr val="accent1"/>
+          </a:lnRef>
+          <a:fillRef idx="0">
+            <a:schemeClr val="accent1"/>
+          </a:fillRef>
+          <a:effectRef idx="0">
+            <a:schemeClr val="accent1"/>
+          </a:effectRef>
+          <a:fontRef idx="minor">
+            <a:schemeClr val="tx1"/>
+          </a:fontRef>
+        </p:style>
+      </p:cxnSp>
+      <p:sp>
+        <p:nvSpPr>
+          <p:cNvPr id="15" name="TextBox 14"/>
+          <p:cNvSpPr txBox="1"/>
+          <p:nvPr/>
+        </p:nvSpPr>
+        <p:spPr>
+          <a:xfrm>
+            <a:off x="4191000" y="3866752"/>
+            <a:ext cx="838200" cy="230832"/>
+          </a:xfrm>
+          <a:prstGeom prst="rect">
+            <a:avLst/>
+          </a:prstGeom>
+          <a:noFill/>
+        </p:spPr>
+        <p:txBody>
+          <a:bodyPr wrap="square" rtlCol="0">
+            <a:spAutoFit/>
+          </a:bodyPr>
+          <a:lstStyle/>
+          <a:p>
+            <a:r>
+              <a:rPr lang="de-CH" sz="900" dirty="0" smtClean="0"/>
+              <a:t>first</a:t>
+            </a:r>
+            <a:endParaRPr lang="de-CH" sz="900" dirty="0"/>
+          </a:p>
+        </p:txBody>
+      </p:sp>
+      <p:cxnSp>
+        <p:nvCxnSpPr>
+          <p:cNvPr id="16" name="Straight Arrow Connector 15"/>
+          <p:cNvCxnSpPr/>
+          <p:nvPr/>
+        </p:nvCxnSpPr>
+        <p:spPr>
+          <a:xfrm>
+            <a:off x="3657600" y="4208216"/>
+            <a:ext cx="2133600" cy="0"/>
+          </a:xfrm>
+          <a:prstGeom prst="straightConnector1">
+            <a:avLst/>
+          </a:prstGeom>
+          <a:ln>
+            <a:solidFill>
+              <a:schemeClr val="accent3">
+                <a:lumMod val="75000"/>
+              </a:schemeClr>
+            </a:solidFill>
+            <a:tailEnd type="arrow"/>
+          </a:ln>
+        </p:spPr>
+        <p:style>
+          <a:lnRef idx="1">
+            <a:schemeClr val="accent1"/>
+          </a:lnRef>
+          <a:fillRef idx="0">
+            <a:schemeClr val="accent1"/>
+          </a:fillRef>
+          <a:effectRef idx="0">
+            <a:schemeClr val="accent1"/>
+          </a:effectRef>
+          <a:fontRef idx="minor">
+            <a:schemeClr val="tx1"/>
+          </a:fontRef>
+        </p:style>
+      </p:cxnSp>
+      <p:sp>
+        <p:nvSpPr>
+          <p:cNvPr id="17" name="TextBox 16"/>
+          <p:cNvSpPr txBox="1"/>
+          <p:nvPr/>
+        </p:nvSpPr>
+        <p:spPr>
+          <a:xfrm>
+            <a:off x="4191000" y="4036368"/>
+            <a:ext cx="838200" cy="230832"/>
+          </a:xfrm>
+          <a:prstGeom prst="rect">
+            <a:avLst/>
+          </a:prstGeom>
+          <a:noFill/>
+        </p:spPr>
+        <p:txBody>
+          <a:bodyPr wrap="square" rtlCol="0">
+            <a:spAutoFit/>
+          </a:bodyPr>
+          <a:lstStyle/>
+          <a:p>
+            <a:r>
+              <a:rPr lang="de-CH" sz="900" dirty="0" smtClean="0"/>
+              <a:t>last</a:t>
+            </a:r>
+            <a:endParaRPr lang="de-CH" sz="900" dirty="0"/>
+          </a:p>
+        </p:txBody>
+      </p:sp>
+      <p:cxnSp>
+        <p:nvCxnSpPr>
+          <p:cNvPr id="18" name="Straight Arrow Connector 17"/>
+          <p:cNvCxnSpPr/>
+          <p:nvPr/>
+        </p:nvCxnSpPr>
+        <p:spPr>
+          <a:xfrm flipH="1">
+            <a:off x="3657600" y="4360616"/>
+            <a:ext cx="2133600" cy="0"/>
+          </a:xfrm>
+          <a:prstGeom prst="straightConnector1">
+            <a:avLst/>
+          </a:prstGeom>
+          <a:ln>
+            <a:solidFill>
+              <a:schemeClr val="accent2">
+                <a:lumMod val="75000"/>
+              </a:schemeClr>
+            </a:solidFill>
+            <a:tailEnd type="arrow"/>
+          </a:ln>
+        </p:spPr>
+        <p:style>
+          <a:lnRef idx="1">
+            <a:schemeClr val="accent1"/>
+          </a:lnRef>
+          <a:fillRef idx="0">
+            <a:schemeClr val="accent1"/>
+          </a:fillRef>
+          <a:effectRef idx="0">
+            <a:schemeClr val="accent1"/>
+          </a:effectRef>
+          <a:fontRef idx="minor">
+            <a:schemeClr val="tx1"/>
+          </a:fontRef>
+        </p:style>
+      </p:cxnSp>
+      <p:sp>
+        <p:nvSpPr>
+          <p:cNvPr id="19" name="TextBox 18"/>
+          <p:cNvSpPr txBox="1"/>
+          <p:nvPr/>
+        </p:nvSpPr>
+        <p:spPr>
+          <a:xfrm>
+            <a:off x="4191000" y="4188768"/>
+            <a:ext cx="838200" cy="230832"/>
+          </a:xfrm>
+          <a:prstGeom prst="rect">
+            <a:avLst/>
+          </a:prstGeom>
+          <a:noFill/>
+        </p:spPr>
+        <p:txBody>
+          <a:bodyPr wrap="square" rtlCol="0">
+            <a:spAutoFit/>
+          </a:bodyPr>
+          <a:lstStyle/>
+          <a:p>
+            <a:r>
+              <a:rPr lang="de-CH" sz="900" dirty="0" smtClean="0"/>
+              <a:t>ready</a:t>
+            </a:r>
+            <a:endParaRPr lang="de-CH" sz="900" dirty="0"/>
+          </a:p>
+        </p:txBody>
+      </p:sp>
+      <p:sp>
+        <p:nvSpPr>
+          <p:cNvPr id="24" name="TextBox 23"/>
+          <p:cNvSpPr txBox="1"/>
+          <p:nvPr/>
+        </p:nvSpPr>
+        <p:spPr>
+          <a:xfrm>
+            <a:off x="5867400" y="3905563"/>
+            <a:ext cx="1066800" cy="246221"/>
+          </a:xfrm>
+          <a:prstGeom prst="rect">
+            <a:avLst/>
+          </a:prstGeom>
+          <a:noFill/>
+        </p:spPr>
+        <p:txBody>
+          <a:bodyPr wrap="square" rtlCol="0">
+            <a:spAutoFit/>
+          </a:bodyPr>
+          <a:lstStyle/>
+          <a:p>
+            <a:r>
+              <a:rPr lang="de-CH" sz="1000" dirty="0" smtClean="0"/>
+              <a:t>MAC Transmit</a:t>
+            </a:r>
+            <a:endParaRPr lang="de-CH" sz="1000" dirty="0"/>
+          </a:p>
+        </p:txBody>
+      </p:sp>
+      <p:sp>
+        <p:nvSpPr>
+          <p:cNvPr id="25" name="Rounded Rectangle 24"/>
+          <p:cNvSpPr/>
+          <p:nvPr/>
+        </p:nvSpPr>
+        <p:spPr>
+          <a:xfrm>
+            <a:off x="5791200" y="5029200"/>
+            <a:ext cx="1219200" cy="1143000"/>
+          </a:xfrm>
+          <a:prstGeom prst="roundRect">
+            <a:avLst/>
+          </a:prstGeom>
+          <a:solidFill>
+            <a:schemeClr val="accent3">
+              <a:lumMod val="40000"/>
+              <a:lumOff val="60000"/>
+            </a:schemeClr>
+          </a:solidFill>
+        </p:spPr>
+        <p:style>
+          <a:lnRef idx="2">
+            <a:schemeClr val="accent1">
+              <a:shade val="50000"/>
+            </a:schemeClr>
+          </a:lnRef>
+          <a:fillRef idx="1">
+            <a:schemeClr val="accent1"/>
+          </a:fillRef>
+          <a:effectRef idx="0">
+            <a:schemeClr val="accent1"/>
+          </a:effectRef>
+          <a:fontRef idx="minor">
+            <a:schemeClr val="lt1"/>
+          </a:fontRef>
+        </p:style>
+        <p:txBody>
+          <a:bodyPr rtlCol="0" anchor="ctr"/>
+          <a:lstStyle/>
+          <a:p>
+            <a:pPr algn="ctr"/>
+            <a:endParaRPr lang="de-CH"/>
+          </a:p>
+        </p:txBody>
+      </p:sp>
+      <p:sp>
+        <p:nvSpPr>
+          <p:cNvPr id="26" name="TextBox 25"/>
+          <p:cNvSpPr txBox="1"/>
+          <p:nvPr/>
+        </p:nvSpPr>
+        <p:spPr>
+          <a:xfrm>
+            <a:off x="5867400" y="5353363"/>
+            <a:ext cx="1066800" cy="246221"/>
+          </a:xfrm>
+          <a:prstGeom prst="rect">
+            <a:avLst/>
+          </a:prstGeom>
+          <a:noFill/>
+        </p:spPr>
+        <p:txBody>
+          <a:bodyPr wrap="square" rtlCol="0">
+            <a:spAutoFit/>
+          </a:bodyPr>
+          <a:lstStyle/>
+          <a:p>
+            <a:r>
+              <a:rPr lang="de-CH" sz="1000" dirty="0" smtClean="0"/>
+              <a:t>MAC Receive</a:t>
+            </a:r>
+            <a:endParaRPr lang="de-CH" sz="1000" dirty="0"/>
+          </a:p>
+        </p:txBody>
+      </p:sp>
+      <p:cxnSp>
+        <p:nvCxnSpPr>
+          <p:cNvPr id="27" name="Straight Arrow Connector 26"/>
+          <p:cNvCxnSpPr/>
+          <p:nvPr/>
+        </p:nvCxnSpPr>
+        <p:spPr>
+          <a:xfrm flipH="1">
+            <a:off x="3657600" y="5277248"/>
+            <a:ext cx="2133600" cy="0"/>
+          </a:xfrm>
+          <a:prstGeom prst="straightConnector1">
+            <a:avLst/>
+          </a:prstGeom>
+          <a:ln>
+            <a:solidFill>
+              <a:schemeClr val="accent2">
+                <a:lumMod val="75000"/>
+              </a:schemeClr>
+            </a:solidFill>
+            <a:tailEnd type="arrow"/>
+          </a:ln>
+        </p:spPr>
+        <p:style>
+          <a:lnRef idx="1">
+            <a:schemeClr val="accent1"/>
+          </a:lnRef>
+          <a:fillRef idx="0">
+            <a:schemeClr val="accent1"/>
+          </a:fillRef>
+          <a:effectRef idx="0">
+            <a:schemeClr val="accent1"/>
+          </a:effectRef>
+          <a:fontRef idx="minor">
+            <a:schemeClr val="tx1"/>
+          </a:fontRef>
+        </p:style>
+      </p:cxnSp>
+      <p:sp>
+        <p:nvSpPr>
+          <p:cNvPr id="28" name="TextBox 27"/>
+          <p:cNvSpPr txBox="1"/>
+          <p:nvPr/>
+        </p:nvSpPr>
+        <p:spPr>
+          <a:xfrm>
+            <a:off x="4191000" y="5105400"/>
+            <a:ext cx="838200" cy="230832"/>
+          </a:xfrm>
+          <a:prstGeom prst="rect">
+            <a:avLst/>
+          </a:prstGeom>
+          <a:noFill/>
+        </p:spPr>
+        <p:txBody>
+          <a:bodyPr wrap="square" rtlCol="0">
+            <a:spAutoFit/>
+          </a:bodyPr>
+          <a:lstStyle/>
+          <a:p>
+            <a:r>
+              <a:rPr lang="de-CH" sz="900" dirty="0" smtClean="0"/>
+              <a:t>Data(7..0)</a:t>
+            </a:r>
+            <a:endParaRPr lang="de-CH" sz="900" dirty="0"/>
+          </a:p>
+        </p:txBody>
+      </p:sp>
+      <p:cxnSp>
+        <p:nvCxnSpPr>
+          <p:cNvPr id="29" name="Straight Arrow Connector 28"/>
+          <p:cNvCxnSpPr/>
+          <p:nvPr/>
+        </p:nvCxnSpPr>
+        <p:spPr>
+          <a:xfrm flipH="1">
+            <a:off x="3657600" y="5429648"/>
+            <a:ext cx="2133600" cy="0"/>
+          </a:xfrm>
+          <a:prstGeom prst="straightConnector1">
+            <a:avLst/>
+          </a:prstGeom>
+          <a:ln>
+            <a:solidFill>
+              <a:schemeClr val="accent2">
+                <a:lumMod val="75000"/>
+              </a:schemeClr>
+            </a:solidFill>
+            <a:tailEnd type="arrow"/>
+          </a:ln>
+        </p:spPr>
+        <p:style>
+          <a:lnRef idx="1">
+            <a:schemeClr val="accent1"/>
+          </a:lnRef>
+          <a:fillRef idx="0">
+            <a:schemeClr val="accent1"/>
+          </a:fillRef>
+          <a:effectRef idx="0">
+            <a:schemeClr val="accent1"/>
+          </a:effectRef>
+          <a:fontRef idx="minor">
+            <a:schemeClr val="tx1"/>
+          </a:fontRef>
+        </p:style>
+      </p:cxnSp>
+      <p:sp>
+        <p:nvSpPr>
+          <p:cNvPr id="30" name="TextBox 29"/>
+          <p:cNvSpPr txBox="1"/>
+          <p:nvPr/>
+        </p:nvSpPr>
+        <p:spPr>
+          <a:xfrm>
+            <a:off x="4191000" y="5257800"/>
+            <a:ext cx="838200" cy="230832"/>
+          </a:xfrm>
+          <a:prstGeom prst="rect">
+            <a:avLst/>
+          </a:prstGeom>
+          <a:noFill/>
+        </p:spPr>
+        <p:txBody>
+          <a:bodyPr wrap="square" rtlCol="0">
+            <a:spAutoFit/>
+          </a:bodyPr>
+          <a:lstStyle/>
+          <a:p>
+            <a:r>
+              <a:rPr lang="de-CH" sz="900" dirty="0" smtClean="0"/>
+              <a:t>valid</a:t>
+            </a:r>
+            <a:endParaRPr lang="de-CH" sz="900" dirty="0"/>
+          </a:p>
+        </p:txBody>
+      </p:sp>
+      <p:cxnSp>
+        <p:nvCxnSpPr>
+          <p:cNvPr id="31" name="Straight Arrow Connector 30"/>
+          <p:cNvCxnSpPr/>
+          <p:nvPr/>
+        </p:nvCxnSpPr>
+        <p:spPr>
+          <a:xfrm flipH="1">
+            <a:off x="3657600" y="5579816"/>
+            <a:ext cx="2133600" cy="0"/>
+          </a:xfrm>
+          <a:prstGeom prst="straightConnector1">
+            <a:avLst/>
+          </a:prstGeom>
+          <a:ln>
+            <a:solidFill>
+              <a:schemeClr val="accent2">
+                <a:lumMod val="75000"/>
+              </a:schemeClr>
+            </a:solidFill>
+            <a:tailEnd type="arrow"/>
+          </a:ln>
+        </p:spPr>
+        <p:style>
+          <a:lnRef idx="1">
+            <a:schemeClr val="accent1"/>
+          </a:lnRef>
+          <a:fillRef idx="0">
+            <a:schemeClr val="accent1"/>
+          </a:fillRef>
+          <a:effectRef idx="0">
+            <a:schemeClr val="accent1"/>
+          </a:effectRef>
+          <a:fontRef idx="minor">
+            <a:schemeClr val="tx1"/>
+          </a:fontRef>
+        </p:style>
+      </p:cxnSp>
+      <p:sp>
+        <p:nvSpPr>
+          <p:cNvPr id="32" name="TextBox 31"/>
+          <p:cNvSpPr txBox="1"/>
+          <p:nvPr/>
+        </p:nvSpPr>
+        <p:spPr>
+          <a:xfrm>
+            <a:off x="4191000" y="5407968"/>
+            <a:ext cx="838200" cy="230832"/>
+          </a:xfrm>
+          <a:prstGeom prst="rect">
+            <a:avLst/>
+          </a:prstGeom>
+          <a:noFill/>
+        </p:spPr>
+        <p:txBody>
+          <a:bodyPr wrap="square" rtlCol="0">
+            <a:spAutoFit/>
+          </a:bodyPr>
+          <a:lstStyle/>
+          <a:p>
+            <a:r>
+              <a:rPr lang="de-CH" sz="900" dirty="0" smtClean="0"/>
+              <a:t>last</a:t>
+            </a:r>
+            <a:endParaRPr lang="de-CH" sz="900" dirty="0"/>
+          </a:p>
+        </p:txBody>
+      </p:sp>
+      <p:cxnSp>
+        <p:nvCxnSpPr>
+          <p:cNvPr id="35" name="Straight Arrow Connector 34"/>
+          <p:cNvCxnSpPr/>
+          <p:nvPr/>
+        </p:nvCxnSpPr>
+        <p:spPr>
+          <a:xfrm>
+            <a:off x="3657600" y="5734448"/>
+            <a:ext cx="2133600" cy="0"/>
+          </a:xfrm>
+          <a:prstGeom prst="straightConnector1">
+            <a:avLst/>
+          </a:prstGeom>
+          <a:ln>
+            <a:solidFill>
+              <a:schemeClr val="accent3">
+                <a:lumMod val="75000"/>
+              </a:schemeClr>
+            </a:solidFill>
+            <a:tailEnd type="arrow"/>
+          </a:ln>
+        </p:spPr>
+        <p:style>
+          <a:lnRef idx="1">
+            <a:schemeClr val="accent1"/>
+          </a:lnRef>
+          <a:fillRef idx="0">
+            <a:schemeClr val="accent1"/>
+          </a:fillRef>
+          <a:effectRef idx="0">
+            <a:schemeClr val="accent1"/>
+          </a:effectRef>
+          <a:fontRef idx="minor">
+            <a:schemeClr val="tx1"/>
+          </a:fontRef>
+        </p:style>
+      </p:cxnSp>
+      <p:sp>
+        <p:nvSpPr>
+          <p:cNvPr id="36" name="TextBox 35"/>
+          <p:cNvSpPr txBox="1"/>
+          <p:nvPr/>
+        </p:nvSpPr>
+        <p:spPr>
+          <a:xfrm>
+            <a:off x="4191000" y="5562600"/>
+            <a:ext cx="838200" cy="230832"/>
+          </a:xfrm>
+          <a:prstGeom prst="rect">
+            <a:avLst/>
+          </a:prstGeom>
+          <a:noFill/>
+        </p:spPr>
+        <p:txBody>
+          <a:bodyPr wrap="square" rtlCol="0">
+            <a:spAutoFit/>
+          </a:bodyPr>
+          <a:lstStyle/>
+          <a:p>
+            <a:r>
+              <a:rPr lang="de-CH" sz="900" dirty="0" smtClean="0"/>
+              <a:t>ready</a:t>
+            </a:r>
+            <a:endParaRPr lang="de-CH" sz="900" dirty="0"/>
+          </a:p>
+        </p:txBody>
+      </p:sp>
+      <p:cxnSp>
+        <p:nvCxnSpPr>
+          <p:cNvPr id="38" name="Straight Arrow Connector 37"/>
+          <p:cNvCxnSpPr/>
+          <p:nvPr/>
+        </p:nvCxnSpPr>
+        <p:spPr>
+          <a:xfrm flipH="1">
+            <a:off x="3657600" y="4515248"/>
+            <a:ext cx="2133600" cy="0"/>
+          </a:xfrm>
+          <a:prstGeom prst="straightConnector1">
+            <a:avLst/>
+          </a:prstGeom>
+          <a:ln>
+            <a:solidFill>
+              <a:srgbClr val="7030A0"/>
+            </a:solidFill>
+            <a:tailEnd type="arrow"/>
+          </a:ln>
+        </p:spPr>
+        <p:style>
+          <a:lnRef idx="1">
+            <a:schemeClr val="accent1"/>
+          </a:lnRef>
+          <a:fillRef idx="0">
+            <a:schemeClr val="accent1"/>
+          </a:fillRef>
+          <a:effectRef idx="0">
+            <a:schemeClr val="accent1"/>
+          </a:effectRef>
+          <a:fontRef idx="minor">
+            <a:schemeClr val="tx1"/>
+          </a:fontRef>
+        </p:style>
+      </p:cxnSp>
+      <p:sp>
+        <p:nvSpPr>
+          <p:cNvPr id="39" name="TextBox 38"/>
+          <p:cNvSpPr txBox="1"/>
+          <p:nvPr/>
+        </p:nvSpPr>
+        <p:spPr>
+          <a:xfrm>
+            <a:off x="4191000" y="4343400"/>
+            <a:ext cx="838200" cy="230832"/>
+          </a:xfrm>
+          <a:prstGeom prst="rect">
+            <a:avLst/>
+          </a:prstGeom>
+          <a:noFill/>
+        </p:spPr>
+        <p:txBody>
+          <a:bodyPr wrap="square" rtlCol="0">
+            <a:spAutoFit/>
+          </a:bodyPr>
+          <a:lstStyle/>
+          <a:p>
+            <a:r>
+              <a:rPr lang="de-CH" sz="900" dirty="0" smtClean="0"/>
+              <a:t>tx_clk</a:t>
+            </a:r>
+            <a:endParaRPr lang="de-CH" sz="900" dirty="0"/>
+          </a:p>
+        </p:txBody>
+      </p:sp>
+      <p:cxnSp>
+        <p:nvCxnSpPr>
+          <p:cNvPr id="40" name="Straight Arrow Connector 39"/>
+          <p:cNvCxnSpPr/>
+          <p:nvPr/>
+        </p:nvCxnSpPr>
+        <p:spPr>
+          <a:xfrm flipH="1">
+            <a:off x="3657600" y="5886848"/>
+            <a:ext cx="2133600" cy="0"/>
+          </a:xfrm>
+          <a:prstGeom prst="straightConnector1">
+            <a:avLst/>
+          </a:prstGeom>
+          <a:ln>
+            <a:solidFill>
+              <a:srgbClr val="7030A0"/>
+            </a:solidFill>
+            <a:tailEnd type="arrow"/>
+          </a:ln>
+        </p:spPr>
+        <p:style>
+          <a:lnRef idx="1">
+            <a:schemeClr val="accent1"/>
+          </a:lnRef>
+          <a:fillRef idx="0">
+            <a:schemeClr val="accent1"/>
+          </a:fillRef>
+          <a:effectRef idx="0">
+            <a:schemeClr val="accent1"/>
+          </a:effectRef>
+          <a:fontRef idx="minor">
+            <a:schemeClr val="tx1"/>
+          </a:fontRef>
+        </p:style>
+      </p:cxnSp>
+      <p:sp>
+        <p:nvSpPr>
+          <p:cNvPr id="41" name="TextBox 40"/>
+          <p:cNvSpPr txBox="1"/>
+          <p:nvPr/>
+        </p:nvSpPr>
+        <p:spPr>
+          <a:xfrm>
+            <a:off x="4191000" y="5715000"/>
+            <a:ext cx="838200" cy="230832"/>
+          </a:xfrm>
+          <a:prstGeom prst="rect">
+            <a:avLst/>
+          </a:prstGeom>
+          <a:noFill/>
+        </p:spPr>
+        <p:txBody>
+          <a:bodyPr wrap="square" rtlCol="0">
+            <a:spAutoFit/>
+          </a:bodyPr>
+          <a:lstStyle/>
+          <a:p>
+            <a:r>
+              <a:rPr lang="de-CH" sz="900" dirty="0"/>
+              <a:t>r</a:t>
+            </a:r>
+            <a:r>
+              <a:rPr lang="de-CH" sz="900" dirty="0" smtClean="0"/>
+              <a:t>x_clk</a:t>
+            </a:r>
+            <a:endParaRPr lang="de-CH" sz="900" dirty="0"/>
           </a:p>
         </p:txBody>
       </p:sp>
     </p:spTree>
     <p:extLst>
       <p:ext uri="{BB962C8B-B14F-4D97-AF65-F5344CB8AC3E}">
-        <p14:creationId xmlns:p14="http://schemas.microsoft.com/office/powerpoint/2010/main" val="2687296803"/>
+        <p14:creationId xmlns:p14="http://schemas.microsoft.com/office/powerpoint/2010/main" val="1805349592"/>
       </p:ext>
     </p:extLst>
   </p:cSld>

</xml_diff>

<commit_message>
Changes to implement handling of IP broadcast address on TX and RX.
</commit_message>
<xml_diff>
--- a/doc/src/UDP_IP_Stack.pptx
+++ b/doc/src/UDP_IP_Stack.pptx
@@ -597,7 +597,7 @@
             <a:fld id="{1D8BD707-D9CF-40AE-B4C6-C98DA3205C09}" type="datetimeFigureOut">
               <a:rPr lang="en-US" smtClean="0"/>
               <a:pPr/>
-              <a:t>3/3/2012</a:t>
+              <a:t>3/17/2012</a:t>
             </a:fld>
             <a:endParaRPr lang="en-US"/>
           </a:p>
@@ -764,7 +764,7 @@
             <a:fld id="{1D8BD707-D9CF-40AE-B4C6-C98DA3205C09}" type="datetimeFigureOut">
               <a:rPr lang="en-US" smtClean="0"/>
               <a:pPr/>
-              <a:t>3/3/2012</a:t>
+              <a:t>3/17/2012</a:t>
             </a:fld>
             <a:endParaRPr lang="en-US"/>
           </a:p>
@@ -941,7 +941,7 @@
             <a:fld id="{1D8BD707-D9CF-40AE-B4C6-C98DA3205C09}" type="datetimeFigureOut">
               <a:rPr lang="en-US" smtClean="0"/>
               <a:pPr/>
-              <a:t>3/3/2012</a:t>
+              <a:t>3/17/2012</a:t>
             </a:fld>
             <a:endParaRPr lang="en-US"/>
           </a:p>
@@ -1108,7 +1108,7 @@
             <a:fld id="{1D8BD707-D9CF-40AE-B4C6-C98DA3205C09}" type="datetimeFigureOut">
               <a:rPr lang="en-US" smtClean="0"/>
               <a:pPr/>
-              <a:t>3/3/2012</a:t>
+              <a:t>3/17/2012</a:t>
             </a:fld>
             <a:endParaRPr lang="en-US"/>
           </a:p>
@@ -1663,7 +1663,7 @@
             <a:fld id="{1D8BD707-D9CF-40AE-B4C6-C98DA3205C09}" type="datetimeFigureOut">
               <a:rPr lang="en-US" smtClean="0"/>
               <a:pPr/>
-              <a:t>3/3/2012</a:t>
+              <a:t>3/17/2012</a:t>
             </a:fld>
             <a:endParaRPr lang="en-US"/>
           </a:p>
@@ -1925,7 +1925,7 @@
             <a:fld id="{1D8BD707-D9CF-40AE-B4C6-C98DA3205C09}" type="datetimeFigureOut">
               <a:rPr lang="en-US" smtClean="0"/>
               <a:pPr/>
-              <a:t>3/3/2012</a:t>
+              <a:t>3/17/2012</a:t>
             </a:fld>
             <a:endParaRPr lang="en-US"/>
           </a:p>
@@ -2415,7 +2415,7 @@
             <a:fld id="{1D8BD707-D9CF-40AE-B4C6-C98DA3205C09}" type="datetimeFigureOut">
               <a:rPr lang="en-US" smtClean="0"/>
               <a:pPr/>
-              <a:t>3/3/2012</a:t>
+              <a:t>3/17/2012</a:t>
             </a:fld>
             <a:endParaRPr lang="en-US"/>
           </a:p>
@@ -2530,7 +2530,7 @@
             <a:fld id="{1D8BD707-D9CF-40AE-B4C6-C98DA3205C09}" type="datetimeFigureOut">
               <a:rPr lang="en-US" smtClean="0"/>
               <a:pPr/>
-              <a:t>3/3/2012</a:t>
+              <a:t>3/17/2012</a:t>
             </a:fld>
             <a:endParaRPr lang="en-US"/>
           </a:p>
@@ -2622,7 +2622,7 @@
             <a:fld id="{1D8BD707-D9CF-40AE-B4C6-C98DA3205C09}" type="datetimeFigureOut">
               <a:rPr lang="en-US" smtClean="0"/>
               <a:pPr/>
-              <a:t>3/3/2012</a:t>
+              <a:t>3/17/2012</a:t>
             </a:fld>
             <a:endParaRPr lang="en-US"/>
           </a:p>
@@ -3054,7 +3054,7 @@
             <a:fld id="{1D8BD707-D9CF-40AE-B4C6-C98DA3205C09}" type="datetimeFigureOut">
               <a:rPr lang="en-US" smtClean="0"/>
               <a:pPr/>
-              <a:t>3/3/2012</a:t>
+              <a:t>3/17/2012</a:t>
             </a:fld>
             <a:endParaRPr lang="en-US"/>
           </a:p>
@@ -3589,7 +3589,7 @@
             <a:fld id="{1D8BD707-D9CF-40AE-B4C6-C98DA3205C09}" type="datetimeFigureOut">
               <a:rPr lang="en-US" smtClean="0"/>
               <a:pPr/>
-              <a:t>3/3/2012</a:t>
+              <a:t>3/17/2012</a:t>
             </a:fld>
             <a:endParaRPr lang="en-US"/>
           </a:p>
@@ -4431,7 +4431,7 @@
             <a:fld id="{1D8BD707-D9CF-40AE-B4C6-C98DA3205C09}" type="datetimeFigureOut">
               <a:rPr lang="en-US" smtClean="0"/>
               <a:pPr/>
-              <a:t>3/3/2012</a:t>
+              <a:t>3/17/2012</a:t>
             </a:fld>
             <a:endParaRPr lang="en-US"/>
           </a:p>
@@ -4895,7 +4895,7 @@
           <a:p>
             <a:r>
               <a:rPr lang="de-CH" dirty="0" smtClean="0"/>
-              <a:t>V1.1</a:t>
+              <a:t>V1.2</a:t>
             </a:r>
             <a:endParaRPr lang="de-CH" dirty="0"/>
           </a:p>
@@ -5694,8 +5694,13 @@
             <a:pPr lvl="1"/>
             <a:r>
               <a:rPr lang="de-CH" sz="2000" dirty="0" smtClean="0"/>
-              <a:t>Are not for our ip address</a:t>
-            </a:r>
+              <a:t>Are not for our ip </a:t>
+            </a:r>
+            <a:r>
+              <a:rPr lang="de-CH" sz="2000" dirty="0" smtClean="0"/>
+              <a:t>address and are not for the broadcast address</a:t>
+            </a:r>
+            <a:endParaRPr lang="de-CH" sz="2000" dirty="0" smtClean="0"/>
           </a:p>
           <a:p>
             <a:r>
@@ -6285,7 +6290,7 @@
         <p:spPr/>
         <p:txBody>
           <a:bodyPr>
-            <a:normAutofit lnSpcReduction="10000"/>
+            <a:normAutofit fontScale="92500" lnSpcReduction="10000"/>
           </a:bodyPr>
           <a:lstStyle/>
           <a:p>
@@ -6341,8 +6346,19 @@
           <a:p>
             <a:r>
               <a:rPr lang="de-CH" dirty="0"/>
-              <a:t>Easy to tap into the IP layer directly</a:t>
-            </a:r>
+              <a:t>Easy to tap into the IP layer </a:t>
+            </a:r>
+            <a:r>
+              <a:rPr lang="de-CH" dirty="0" smtClean="0"/>
+              <a:t>directly</a:t>
+            </a:r>
+          </a:p>
+          <a:p>
+            <a:r>
+              <a:rPr lang="de-CH" dirty="0" smtClean="0"/>
+              <a:t>Supports TX and RX with IP layer broadcast address</a:t>
+            </a:r>
+            <a:endParaRPr lang="de-CH" dirty="0"/>
           </a:p>
           <a:p>
             <a:r>
@@ -9381,7 +9397,7 @@
         <p:spPr>
           <a:xfrm>
             <a:off x="3810000" y="2667000"/>
-            <a:ext cx="1295400" cy="2667000"/>
+            <a:ext cx="1371600" cy="2667000"/>
           </a:xfrm>
           <a:prstGeom prst="rect">
             <a:avLst/>
@@ -9427,7 +9443,7 @@
         <p:spPr>
           <a:xfrm>
             <a:off x="3962400" y="2944309"/>
-            <a:ext cx="990600" cy="1214425"/>
+            <a:ext cx="1066800" cy="1214425"/>
           </a:xfrm>
           <a:prstGeom prst="rect">
             <a:avLst/>
@@ -9471,7 +9487,7 @@
         <p:spPr>
           <a:xfrm>
             <a:off x="3962400" y="4343400"/>
-            <a:ext cx="990600" cy="838200"/>
+            <a:ext cx="1066800" cy="838200"/>
           </a:xfrm>
           <a:prstGeom prst="rect">
             <a:avLst/>
@@ -9653,8 +9669,8 @@
         </p:nvCxnSpPr>
         <p:spPr>
           <a:xfrm>
-            <a:off x="4953000" y="4762500"/>
-            <a:ext cx="3137079" cy="0"/>
+            <a:off x="5029200" y="4762500"/>
+            <a:ext cx="3060879" cy="0"/>
           </a:xfrm>
           <a:prstGeom prst="straightConnector1">
             <a:avLst/>
@@ -9803,8 +9819,8 @@
         </p:nvCxnSpPr>
         <p:spPr>
           <a:xfrm>
-            <a:off x="4953000" y="3886200"/>
-            <a:ext cx="762000" cy="0"/>
+            <a:off x="5029200" y="3886200"/>
+            <a:ext cx="685800" cy="0"/>
           </a:xfrm>
           <a:prstGeom prst="straightConnector1">
             <a:avLst/>
@@ -9839,8 +9855,8 @@
         </p:nvCxnSpPr>
         <p:spPr>
           <a:xfrm flipH="1">
-            <a:off x="4953000" y="4070866"/>
-            <a:ext cx="762000" cy="0"/>
+            <a:off x="5029200" y="4070866"/>
+            <a:ext cx="685800" cy="0"/>
           </a:xfrm>
           <a:prstGeom prst="straightConnector1">
             <a:avLst/>
@@ -9875,8 +9891,8 @@
         </p:nvCxnSpPr>
         <p:spPr>
           <a:xfrm>
-            <a:off x="4953000" y="3124200"/>
-            <a:ext cx="762000" cy="0"/>
+            <a:off x="5029200" y="3124200"/>
+            <a:ext cx="685800" cy="0"/>
           </a:xfrm>
           <a:prstGeom prst="straightConnector1">
             <a:avLst/>

</xml_diff>

<commit_message>
V1.3 - ARP timeout and ARP cache reset control
</commit_message>
<xml_diff>
--- a/doc/src/UDP_IP_Stack.pptx
+++ b/doc/src/UDP_IP_Stack.pptx
@@ -597,7 +597,7 @@
             <a:fld id="{1D8BD707-D9CF-40AE-B4C6-C98DA3205C09}" type="datetimeFigureOut">
               <a:rPr lang="en-US" smtClean="0"/>
               <a:pPr/>
-              <a:t>3/17/2012</a:t>
+              <a:t>3/25/2012</a:t>
             </a:fld>
             <a:endParaRPr lang="en-US"/>
           </a:p>
@@ -764,7 +764,7 @@
             <a:fld id="{1D8BD707-D9CF-40AE-B4C6-C98DA3205C09}" type="datetimeFigureOut">
               <a:rPr lang="en-US" smtClean="0"/>
               <a:pPr/>
-              <a:t>3/17/2012</a:t>
+              <a:t>3/25/2012</a:t>
             </a:fld>
             <a:endParaRPr lang="en-US"/>
           </a:p>
@@ -941,7 +941,7 @@
             <a:fld id="{1D8BD707-D9CF-40AE-B4C6-C98DA3205C09}" type="datetimeFigureOut">
               <a:rPr lang="en-US" smtClean="0"/>
               <a:pPr/>
-              <a:t>3/17/2012</a:t>
+              <a:t>3/25/2012</a:t>
             </a:fld>
             <a:endParaRPr lang="en-US"/>
           </a:p>
@@ -1108,7 +1108,7 @@
             <a:fld id="{1D8BD707-D9CF-40AE-B4C6-C98DA3205C09}" type="datetimeFigureOut">
               <a:rPr lang="en-US" smtClean="0"/>
               <a:pPr/>
-              <a:t>3/17/2012</a:t>
+              <a:t>3/25/2012</a:t>
             </a:fld>
             <a:endParaRPr lang="en-US"/>
           </a:p>
@@ -1663,7 +1663,7 @@
             <a:fld id="{1D8BD707-D9CF-40AE-B4C6-C98DA3205C09}" type="datetimeFigureOut">
               <a:rPr lang="en-US" smtClean="0"/>
               <a:pPr/>
-              <a:t>3/17/2012</a:t>
+              <a:t>3/25/2012</a:t>
             </a:fld>
             <a:endParaRPr lang="en-US"/>
           </a:p>
@@ -1925,7 +1925,7 @@
             <a:fld id="{1D8BD707-D9CF-40AE-B4C6-C98DA3205C09}" type="datetimeFigureOut">
               <a:rPr lang="en-US" smtClean="0"/>
               <a:pPr/>
-              <a:t>3/17/2012</a:t>
+              <a:t>3/25/2012</a:t>
             </a:fld>
             <a:endParaRPr lang="en-US"/>
           </a:p>
@@ -2415,7 +2415,7 @@
             <a:fld id="{1D8BD707-D9CF-40AE-B4C6-C98DA3205C09}" type="datetimeFigureOut">
               <a:rPr lang="en-US" smtClean="0"/>
               <a:pPr/>
-              <a:t>3/17/2012</a:t>
+              <a:t>3/25/2012</a:t>
             </a:fld>
             <a:endParaRPr lang="en-US"/>
           </a:p>
@@ -2530,7 +2530,7 @@
             <a:fld id="{1D8BD707-D9CF-40AE-B4C6-C98DA3205C09}" type="datetimeFigureOut">
               <a:rPr lang="en-US" smtClean="0"/>
               <a:pPr/>
-              <a:t>3/17/2012</a:t>
+              <a:t>3/25/2012</a:t>
             </a:fld>
             <a:endParaRPr lang="en-US"/>
           </a:p>
@@ -2622,7 +2622,7 @@
             <a:fld id="{1D8BD707-D9CF-40AE-B4C6-C98DA3205C09}" type="datetimeFigureOut">
               <a:rPr lang="en-US" smtClean="0"/>
               <a:pPr/>
-              <a:t>3/17/2012</a:t>
+              <a:t>3/25/2012</a:t>
             </a:fld>
             <a:endParaRPr lang="en-US"/>
           </a:p>
@@ -3054,7 +3054,7 @@
             <a:fld id="{1D8BD707-D9CF-40AE-B4C6-C98DA3205C09}" type="datetimeFigureOut">
               <a:rPr lang="en-US" smtClean="0"/>
               <a:pPr/>
-              <a:t>3/17/2012</a:t>
+              <a:t>3/25/2012</a:t>
             </a:fld>
             <a:endParaRPr lang="en-US"/>
           </a:p>
@@ -3589,7 +3589,7 @@
             <a:fld id="{1D8BD707-D9CF-40AE-B4C6-C98DA3205C09}" type="datetimeFigureOut">
               <a:rPr lang="en-US" smtClean="0"/>
               <a:pPr/>
-              <a:t>3/17/2012</a:t>
+              <a:t>3/25/2012</a:t>
             </a:fld>
             <a:endParaRPr lang="en-US"/>
           </a:p>
@@ -4431,7 +4431,7 @@
             <a:fld id="{1D8BD707-D9CF-40AE-B4C6-C98DA3205C09}" type="datetimeFigureOut">
               <a:rPr lang="en-US" smtClean="0"/>
               <a:pPr/>
-              <a:t>3/17/2012</a:t>
+              <a:t>3/25/2012</a:t>
             </a:fld>
             <a:endParaRPr lang="en-US"/>
           </a:p>
@@ -4895,7 +4895,7 @@
           <a:p>
             <a:r>
               <a:rPr lang="de-CH" dirty="0" smtClean="0"/>
-              <a:t>V1.2</a:t>
+              <a:t>V1.3</a:t>
             </a:r>
             <a:endParaRPr lang="de-CH" dirty="0"/>
           </a:p>
@@ -5012,13 +5012,37 @@
           <a:p>
             <a:r>
               <a:rPr lang="de-CH" dirty="0" smtClean="0"/>
-              <a:t>504 occupied slices on Xilinx xc6vlx240t  (1%)</a:t>
-            </a:r>
-          </a:p>
-          <a:p>
+              <a:t>451</a:t>
+            </a:r>
             <a:r>
               <a:rPr lang="de-CH" dirty="0" smtClean="0"/>
-              <a:t>(621 flipflops, 1243 LUTs)</a:t>
+              <a:t> </a:t>
+            </a:r>
+            <a:r>
+              <a:rPr lang="de-CH" dirty="0" smtClean="0"/>
+              <a:t>occupied slices on Xilinx xc6vlx240t  (1%)</a:t>
+            </a:r>
+          </a:p>
+          <a:p>
+            <a:r>
+              <a:rPr lang="de-CH" dirty="0" smtClean="0"/>
+              <a:t>(</a:t>
+            </a:r>
+            <a:r>
+              <a:rPr lang="de-CH" dirty="0" smtClean="0"/>
+              <a:t>687 </a:t>
+            </a:r>
+            <a:r>
+              <a:rPr lang="de-CH" dirty="0" smtClean="0"/>
+              <a:t>flipflops, </a:t>
+            </a:r>
+            <a:r>
+              <a:rPr lang="de-CH" dirty="0" smtClean="0"/>
+              <a:t>1294 </a:t>
+            </a:r>
+            <a:r>
+              <a:rPr lang="de-CH" dirty="0" smtClean="0"/>
+              <a:t>LUTs)</a:t>
             </a:r>
           </a:p>
           <a:p>
@@ -5031,7 +5055,11 @@
             <a:pPr lvl="1"/>
             <a:r>
               <a:rPr lang="de-CH" dirty="0" smtClean="0"/>
-              <a:t>Xilinx ISE 13.2</a:t>
+              <a:t>Xilinx ISE </a:t>
+            </a:r>
+            <a:r>
+              <a:rPr lang="de-CH" dirty="0" smtClean="0"/>
+              <a:t>13.4</a:t>
             </a:r>
             <a:endParaRPr lang="de-CH" dirty="0"/>
           </a:p>
@@ -5694,13 +5722,8 @@
             <a:pPr lvl="1"/>
             <a:r>
               <a:rPr lang="de-CH" sz="2000" dirty="0" smtClean="0"/>
-              <a:t>Are not for our ip </a:t>
-            </a:r>
-            <a:r>
-              <a:rPr lang="de-CH" sz="2000" dirty="0" smtClean="0"/>
-              <a:t>address and are not for the broadcast address</a:t>
-            </a:r>
-            <a:endParaRPr lang="de-CH" sz="2000" dirty="0" smtClean="0"/>
+              <a:t>Are not for our ip address and are not for the broadcast address</a:t>
+            </a:r>
           </a:p>
           <a:p>
             <a:r>
@@ -5794,10 +5817,15 @@
             <p:ph idx="1"/>
           </p:nvPr>
         </p:nvSpPr>
-        <p:spPr/>
+        <p:spPr>
+          <a:xfrm>
+            <a:off x="762000" y="1143000"/>
+            <a:ext cx="7520940" cy="4724400"/>
+          </a:xfrm>
+        </p:spPr>
         <p:txBody>
           <a:bodyPr>
-            <a:normAutofit/>
+            <a:normAutofit fontScale="92500" lnSpcReduction="10000"/>
           </a:bodyPr>
           <a:lstStyle/>
           <a:p>
@@ -5809,8 +5837,13 @@
           <a:p>
             <a:r>
               <a:rPr lang="de-CH" dirty="0" smtClean="0"/>
-              <a:t>Handles transmission of ARP requests</a:t>
-            </a:r>
+              <a:t>Handles transmission of ARP </a:t>
+            </a:r>
+            <a:r>
+              <a:rPr lang="de-CH" dirty="0" smtClean="0"/>
+              <a:t>requests and timeout if no response received</a:t>
+            </a:r>
+            <a:endParaRPr lang="de-CH" dirty="0" smtClean="0"/>
           </a:p>
           <a:p>
             <a:r>
@@ -5847,8 +5880,130 @@
           <a:p>
             <a:r>
               <a:rPr lang="de-CH" dirty="0" smtClean="0"/>
-              <a:t>Input signals to module indicate our IP and MAC addresses</a:t>
-            </a:r>
+              <a:t>Input signals to module indicate our IP and MAC </a:t>
+            </a:r>
+            <a:r>
+              <a:rPr lang="de-CH" dirty="0" smtClean="0"/>
+              <a:t>addresses</a:t>
+            </a:r>
+          </a:p>
+          <a:p>
+            <a:r>
+              <a:rPr lang="de-CH" dirty="0" smtClean="0"/>
+              <a:t>ARP timeout is configured by generics in the ARP, IP, and UDP modules:</a:t>
+            </a:r>
+          </a:p>
+          <a:p>
+            <a:r>
+              <a:rPr lang="de-CH" sz="1300" dirty="0">
+                <a:latin typeface="Courier New" pitchFamily="49" charset="0"/>
+                <a:cs typeface="Courier New" pitchFamily="49" charset="0"/>
+              </a:rPr>
+              <a:t>	</a:t>
+            </a:r>
+            <a:r>
+              <a:rPr lang="en-US" sz="1300" dirty="0" smtClean="0">
+                <a:latin typeface="Courier New" pitchFamily="49" charset="0"/>
+                <a:cs typeface="Courier New" pitchFamily="49" charset="0"/>
+              </a:rPr>
+              <a:t>CLOCK_FREQ</a:t>
+            </a:r>
+            <a:r>
+              <a:rPr lang="en-US" sz="1300" dirty="0">
+                <a:latin typeface="Courier New" pitchFamily="49" charset="0"/>
+                <a:cs typeface="Courier New" pitchFamily="49" charset="0"/>
+              </a:rPr>
+              <a:t> </a:t>
+            </a:r>
+            <a:r>
+              <a:rPr lang="en-US" sz="1300" dirty="0" smtClean="0">
+                <a:latin typeface="Courier New" pitchFamily="49" charset="0"/>
+                <a:cs typeface="Courier New" pitchFamily="49" charset="0"/>
+              </a:rPr>
+              <a:t>  : </a:t>
+            </a:r>
+            <a:r>
+              <a:rPr lang="en-US" sz="1300" dirty="0">
+                <a:latin typeface="Courier New" pitchFamily="49" charset="0"/>
+                <a:cs typeface="Courier New" pitchFamily="49" charset="0"/>
+              </a:rPr>
+              <a:t>integer := 125000000;				</a:t>
+            </a:r>
+            <a:r>
+              <a:rPr lang="en-US" sz="1300" dirty="0" smtClean="0">
+                <a:latin typeface="Courier New" pitchFamily="49" charset="0"/>
+                <a:cs typeface="Courier New" pitchFamily="49" charset="0"/>
+              </a:rPr>
+              <a:t/>
+            </a:r>
+            <a:br>
+              <a:rPr lang="en-US" sz="1300" dirty="0" smtClean="0">
+                <a:latin typeface="Courier New" pitchFamily="49" charset="0"/>
+                <a:cs typeface="Courier New" pitchFamily="49" charset="0"/>
+              </a:rPr>
+            </a:br>
+            <a:r>
+              <a:rPr lang="en-US" sz="1300" dirty="0" smtClean="0">
+                <a:latin typeface="Courier New" pitchFamily="49" charset="0"/>
+                <a:cs typeface="Courier New" pitchFamily="49" charset="0"/>
+              </a:rPr>
+              <a:t>ARP_TIMEOUT  : </a:t>
+            </a:r>
+            <a:r>
+              <a:rPr lang="en-US" sz="1300" dirty="0">
+                <a:latin typeface="Courier New" pitchFamily="49" charset="0"/>
+                <a:cs typeface="Courier New" pitchFamily="49" charset="0"/>
+              </a:rPr>
+              <a:t>integer := 60			</a:t>
+            </a:r>
+            <a:r>
+              <a:rPr lang="en-US" dirty="0"/>
+              <a:t>			</a:t>
+            </a:r>
+          </a:p>
+          <a:p>
+            <a:r>
+              <a:rPr lang="en-US" dirty="0" smtClean="0"/>
+              <a:t>CLOCK_FREQ is used to scale the </a:t>
+            </a:r>
+            <a:r>
+              <a:rPr lang="en-US" dirty="0" err="1" smtClean="0"/>
+              <a:t>rx_clk</a:t>
+            </a:r>
+            <a:r>
+              <a:rPr lang="en-US" dirty="0" smtClean="0"/>
+              <a:t> to produce a 1Hz signal for timing.</a:t>
+            </a:r>
+          </a:p>
+          <a:p>
+            <a:r>
+              <a:rPr lang="en-US" dirty="0" smtClean="0"/>
+              <a:t>ARP_TIMEOUT specifies the timeout in seconds.</a:t>
+            </a:r>
+          </a:p>
+          <a:p>
+            <a:r>
+              <a:rPr lang="en-US" dirty="0" smtClean="0"/>
+              <a:t>Note: on timeout, ARP does not retransmit the ARP </a:t>
+            </a:r>
+            <a:r>
+              <a:rPr lang="en-US" dirty="0" err="1" smtClean="0"/>
+              <a:t>req</a:t>
+            </a:r>
+            <a:r>
+              <a:rPr lang="en-US" dirty="0" smtClean="0"/>
+              <a:t>, but reports a transmit error. </a:t>
+            </a:r>
+          </a:p>
+          <a:p>
+            <a:r>
+              <a:rPr lang="en-US" dirty="0" smtClean="0"/>
+              <a:t>Send again, to send extra ARP requests.</a:t>
+            </a:r>
+            <a:endParaRPr lang="en-US" dirty="0"/>
+          </a:p>
+          <a:p>
+            <a:endParaRPr lang="de-CH" dirty="0" smtClean="0"/>
           </a:p>
           <a:p>
             <a:endParaRPr lang="de-CH" dirty="0"/>
@@ -6128,7 +6283,7 @@
         </p:nvSpPr>
         <p:spPr>
           <a:xfrm>
-            <a:off x="457200" y="1600200"/>
+            <a:off x="457200" y="1447800"/>
             <a:ext cx="8229600" cy="4953000"/>
           </a:xfrm>
         </p:spPr>
@@ -7982,7 +8137,7 @@
         <p:spPr/>
         <p:txBody>
           <a:bodyPr>
-            <a:normAutofit lnSpcReduction="10000"/>
+            <a:normAutofit/>
           </a:bodyPr>
           <a:lstStyle/>
           <a:p>
@@ -8021,13 +8176,11 @@
           <a:p>
             <a:r>
               <a:rPr lang="de-CH" sz="2000" dirty="0" smtClean="0"/>
-              <a:t> Doesnt always detect error situations (although these are flagged as TODO in the code)</a:t>
-            </a:r>
-          </a:p>
-          <a:p>
+              <a:t>Doesnt </a:t>
+            </a:r>
             <a:r>
               <a:rPr lang="de-CH" sz="2000" dirty="0" smtClean="0"/>
-              <a:t>Doesnt currently double register signals where they cross between tx &amp; rx clock domain in a couple of places.</a:t>
+              <a:t>currently double register signals where they cross between tx &amp; rx clock domain in a couple of places.</a:t>
             </a:r>
             <a:endParaRPr lang="de-CH" sz="2000" dirty="0"/>
           </a:p>
@@ -8335,7 +8488,7 @@
         <p:spPr>
           <a:xfrm>
             <a:off x="2624070" y="5385378"/>
-            <a:ext cx="1033530" cy="646331"/>
+            <a:ext cx="1033530" cy="923330"/>
           </a:xfrm>
           <a:prstGeom prst="rect">
             <a:avLst/>
@@ -8351,7 +8504,11 @@
             <a:pPr algn="ctr"/>
             <a:r>
               <a:rPr lang="de-CH" dirty="0" smtClean="0"/>
-              <a:t>Clocks &amp; reset</a:t>
+              <a:t>Clocks, controls </a:t>
+            </a:r>
+            <a:r>
+              <a:rPr lang="de-CH" dirty="0" smtClean="0"/>
+              <a:t>&amp; reset</a:t>
             </a:r>
             <a:endParaRPr lang="de-CH" dirty="0"/>
           </a:p>
@@ -8527,8 +8684,8 @@
         </p:nvSpPr>
         <p:spPr>
           <a:xfrm>
-            <a:off x="3962400" y="5413784"/>
-            <a:ext cx="1524000" cy="646331"/>
+            <a:off x="4191000" y="5413784"/>
+            <a:ext cx="1066800" cy="923330"/>
           </a:xfrm>
           <a:prstGeom prst="rect">
             <a:avLst/>
@@ -8553,13 +8710,15 @@
       <p:cxnSp>
         <p:nvCxnSpPr>
           <p:cNvPr id="24" name="Straight Arrow Connector 23"/>
-          <p:cNvCxnSpPr/>
+          <p:cNvCxnSpPr>
+            <a:endCxn id="23" idx="0"/>
+          </p:cNvCxnSpPr>
           <p:nvPr/>
         </p:nvCxnSpPr>
         <p:spPr>
           <a:xfrm>
-            <a:off x="4691130" y="4724400"/>
-            <a:ext cx="0" cy="653534"/>
+            <a:off x="4724400" y="4724400"/>
+            <a:ext cx="0" cy="689384"/>
           </a:xfrm>
           <a:prstGeom prst="straightConnector1">
             <a:avLst/>
@@ -8592,8 +8751,8 @@
         </p:nvSpPr>
         <p:spPr>
           <a:xfrm>
-            <a:off x="5486400" y="5413784"/>
-            <a:ext cx="1524000" cy="646331"/>
+            <a:off x="5638800" y="5413784"/>
+            <a:ext cx="1143000" cy="646331"/>
           </a:xfrm>
           <a:prstGeom prst="rect">
             <a:avLst/>
@@ -8923,8 +9082,8 @@
         </p:nvSpPr>
         <p:spPr>
           <a:xfrm>
-            <a:off x="1972947" y="6172200"/>
-            <a:ext cx="1033530" cy="646331"/>
+            <a:off x="1219200" y="6172200"/>
+            <a:ext cx="1752600" cy="646331"/>
           </a:xfrm>
           <a:prstGeom prst="rect">
             <a:avLst/>
@@ -8940,7 +9099,11 @@
             <a:pPr algn="ctr"/>
             <a:r>
               <a:rPr lang="de-CH" dirty="0" smtClean="0"/>
-              <a:t>Clocks &amp; reset</a:t>
+              <a:t>Clocks, controls </a:t>
+            </a:r>
+            <a:r>
+              <a:rPr lang="de-CH" dirty="0" smtClean="0"/>
+              <a:t>&amp; reset</a:t>
             </a:r>
             <a:endParaRPr lang="de-CH" dirty="0"/>
           </a:p>
@@ -10073,7 +10236,7 @@
         </p:nvSpPr>
         <p:spPr>
           <a:xfrm>
-            <a:off x="457200" y="76200"/>
+            <a:off x="457200" y="0"/>
             <a:ext cx="8229600" cy="487362"/>
           </a:xfrm>
         </p:spPr>
@@ -10101,7 +10264,7 @@
         </p:nvSpPr>
         <p:spPr>
           <a:xfrm>
-            <a:off x="381000" y="609600"/>
+            <a:off x="381000" y="381000"/>
             <a:ext cx="8229600" cy="5867400"/>
           </a:xfrm>
         </p:spPr>
@@ -10879,8 +11042,44 @@
                 <a:latin typeface="Courier New" pitchFamily="49" charset="0"/>
                 <a:cs typeface="Courier New" pitchFamily="49" charset="0"/>
               </a:rPr>
-              <a:t>in std_logic_vector (47 downto 0);</a:t>
-            </a:r>
+              <a:t>in std_logic_vector (47 downto 0</a:t>
+            </a:r>
+            <a:r>
+              <a:rPr lang="de-CH" sz="1000" dirty="0" smtClean="0">
+                <a:latin typeface="Courier New" pitchFamily="49" charset="0"/>
+                <a:cs typeface="Courier New" pitchFamily="49" charset="0"/>
+              </a:rPr>
+              <a:t>);</a:t>
+            </a:r>
+          </a:p>
+          <a:p>
+            <a:pPr marL="0" indent="0">
+              <a:lnSpc>
+                <a:spcPct val="120000"/>
+              </a:lnSpc>
+              <a:spcBef>
+                <a:spcPts val="0"/>
+              </a:spcBef>
+              <a:buNone/>
+            </a:pPr>
+            <a:r>
+              <a:rPr lang="de-CH" sz="1000" dirty="0">
+                <a:latin typeface="Courier New" pitchFamily="49" charset="0"/>
+                <a:cs typeface="Courier New" pitchFamily="49" charset="0"/>
+              </a:rPr>
+              <a:t>	</a:t>
+            </a:r>
+            <a:r>
+              <a:rPr lang="de-CH" sz="1000" dirty="0" smtClean="0">
+                <a:latin typeface="Courier New" pitchFamily="49" charset="0"/>
+                <a:cs typeface="Courier New" pitchFamily="49" charset="0"/>
+              </a:rPr>
+              <a:t>control	    : in upd_control_type;</a:t>
+            </a:r>
+            <a:endParaRPr lang="de-CH" sz="1000" dirty="0">
+              <a:latin typeface="Courier New" pitchFamily="49" charset="0"/>
+              <a:cs typeface="Courier New" pitchFamily="49" charset="0"/>
+            </a:endParaRPr>
           </a:p>
           <a:p>
             <a:pPr marL="0" indent="0">

</xml_diff>